<commit_message>
Changed ConceptRoleProperties to be ConceptRole concepts and moved them to SDMX
</commit_message>
<xml_diff>
--- a/specs/src/main/html/qb-fig1.pptx
+++ b/specs/src/main/html/qb-fig1.pptx
@@ -362,13 +362,51 @@
       </p:grpSpPr>
       <p:sp>
         <p:nvSpPr>
+          <p:cNvPr id="183" name="TextBox 182"/>
+          <p:cNvSpPr txBox="1"/>
+          <p:nvPr/>
+        </p:nvSpPr>
+        <p:spPr>
+          <a:xfrm>
+            <a:off x="785786" y="2416726"/>
+            <a:ext cx="1214446" cy="369332"/>
+          </a:xfrm>
+          <a:prstGeom prst="rect">
+            <a:avLst/>
+          </a:prstGeom>
+          <a:solidFill>
+            <a:schemeClr val="bg1"/>
+          </a:solidFill>
+        </p:spPr>
+        <p:txBody>
+          <a:bodyPr wrap="square" rtlCol="0">
+            <a:spAutoFit/>
+          </a:bodyPr>
+          <a:lstStyle/>
+          <a:p>
+            <a:r>
+              <a:rPr lang="en-GB" sz="900" smtClean="0"/>
+              <a:t>specialization of </a:t>
+            </a:r>
+            <a:br>
+              <a:rPr lang="en-GB" sz="900" smtClean="0"/>
+            </a:br>
+            <a:r>
+              <a:rPr lang="en-GB" sz="900" smtClean="0"/>
+              <a:t>skos:Concept</a:t>
+            </a:r>
+          </a:p>
+        </p:txBody>
+      </p:sp>
+      <p:sp>
+        <p:nvSpPr>
           <p:cNvPr id="3" name="CustomShape 1"/>
           <p:cNvSpPr/>
           <p:nvPr/>
         </p:nvSpPr>
         <p:spPr>
           <a:xfrm>
-            <a:off x="6345824" y="3646812"/>
+            <a:off x="6143636" y="3646812"/>
             <a:ext cx="1428760" cy="284400"/>
           </a:xfrm>
           <a:prstGeom prst="rect">
@@ -417,7 +455,7 @@
         </p:nvSpPr>
         <p:spPr>
           <a:xfrm>
-            <a:off x="6345824" y="4574154"/>
+            <a:off x="6143636" y="4574154"/>
             <a:ext cx="1428760" cy="284400"/>
           </a:xfrm>
           <a:prstGeom prst="rect">
@@ -557,7 +595,7 @@
         </p:nvCxnSpPr>
         <p:spPr>
           <a:xfrm rot="5400000">
-            <a:off x="6738733" y="4252683"/>
+            <a:off x="6536545" y="4252683"/>
             <a:ext cx="642942" cy="1588"/>
           </a:xfrm>
           <a:prstGeom prst="bentConnector3">
@@ -595,7 +633,7 @@
         </p:nvSpPr>
         <p:spPr>
           <a:xfrm>
-            <a:off x="6703014" y="4123501"/>
+            <a:off x="6500826" y="4123501"/>
             <a:ext cx="663964" cy="261610"/>
           </a:xfrm>
           <a:prstGeom prst="rect">
@@ -627,7 +665,7 @@
         </p:nvSpPr>
         <p:spPr>
           <a:xfrm>
-            <a:off x="6345824" y="5502054"/>
+            <a:off x="6143636" y="5502054"/>
             <a:ext cx="1428760" cy="284400"/>
           </a:xfrm>
           <a:prstGeom prst="rect">
@@ -679,7 +717,7 @@
         </p:nvCxnSpPr>
         <p:spPr>
           <a:xfrm rot="5400000">
-            <a:off x="6738454" y="5180304"/>
+            <a:off x="6536266" y="5180304"/>
             <a:ext cx="643500" cy="1588"/>
           </a:xfrm>
           <a:prstGeom prst="bentConnector3">
@@ -717,7 +755,7 @@
         </p:nvSpPr>
         <p:spPr>
           <a:xfrm>
-            <a:off x="6488700" y="5051401"/>
+            <a:off x="6286512" y="5051401"/>
             <a:ext cx="1109599" cy="261610"/>
           </a:xfrm>
           <a:prstGeom prst="rect">
@@ -752,7 +790,7 @@
         </p:nvCxnSpPr>
         <p:spPr>
           <a:xfrm flipV="1">
-            <a:off x="7774584" y="3789012"/>
+            <a:off x="7572396" y="3789012"/>
             <a:ext cx="1588" cy="1855242"/>
           </a:xfrm>
           <a:prstGeom prst="bentConnector3">
@@ -790,7 +828,7 @@
         </p:nvSpPr>
         <p:spPr>
           <a:xfrm>
-            <a:off x="7802069" y="4385334"/>
+            <a:off x="7599881" y="4385334"/>
             <a:ext cx="841897" cy="261610"/>
           </a:xfrm>
           <a:prstGeom prst="rect">
@@ -819,13 +857,12 @@
           <p:cNvPr id="34" name="Elbow Connector 33"/>
           <p:cNvCxnSpPr>
             <a:stCxn id="3" idx="0"/>
-            <a:endCxn id="32" idx="2"/>
           </p:cNvCxnSpPr>
           <p:nvPr/>
         </p:nvCxnSpPr>
         <p:spPr>
           <a:xfrm rot="16200000" flipV="1">
-            <a:off x="6324325" y="2910932"/>
+            <a:off x="6122137" y="2910932"/>
             <a:ext cx="884896" cy="586863"/>
           </a:xfrm>
           <a:prstGeom prst="bentConnector3">
@@ -863,7 +900,7 @@
         </p:nvSpPr>
         <p:spPr>
           <a:xfrm>
-            <a:off x="6560138" y="3238828"/>
+            <a:off x="6357950" y="3238828"/>
             <a:ext cx="926857" cy="261610"/>
           </a:xfrm>
           <a:prstGeom prst="rect">
@@ -1717,7 +1754,7 @@
         <p:spPr>
           <a:xfrm>
             <a:off x="7616349" y="2619716"/>
-            <a:ext cx="634660" cy="266298"/>
+            <a:ext cx="563254" cy="266298"/>
           </a:xfrm>
           <a:prstGeom prst="bentConnector2">
             <a:avLst/>
@@ -1752,7 +1789,7 @@
         </p:nvSpPr>
         <p:spPr>
           <a:xfrm>
-            <a:off x="7778858" y="2428868"/>
+            <a:off x="7715272" y="2428868"/>
             <a:ext cx="1436612" cy="261610"/>
           </a:xfrm>
           <a:prstGeom prst="rect">
@@ -1783,7 +1820,7 @@
         </p:nvSpPr>
         <p:spPr>
           <a:xfrm>
-            <a:off x="7286612" y="2886014"/>
+            <a:off x="7215206" y="2886014"/>
             <a:ext cx="1928794" cy="400110"/>
           </a:xfrm>
           <a:prstGeom prst="rect">
@@ -1814,8 +1851,8 @@
         </p:nvSpPr>
         <p:spPr>
           <a:xfrm>
-            <a:off x="2071701" y="3571876"/>
-            <a:ext cx="2071702" cy="284400"/>
+            <a:off x="285720" y="3144600"/>
+            <a:ext cx="1500198" cy="284400"/>
           </a:xfrm>
           <a:prstGeom prst="rect">
             <a:avLst/>
@@ -1849,8 +1886,14 @@
                 </a:solidFill>
                 <a:latin typeface="Calibri"/>
               </a:rPr>
-              <a:t>qb:ConceptRoleProperty</a:t>
-            </a:r>
+              <a:t>qb:ConceptRole</a:t>
+            </a:r>
+            <a:endParaRPr lang="en-GB" sz="1400" smtClean="0">
+              <a:solidFill>
+                <a:srgbClr val="000000"/>
+              </a:solidFill>
+              <a:latin typeface="Calibri"/>
+            </a:endParaRPr>
           </a:p>
         </p:txBody>
       </p:sp>
@@ -1858,20 +1901,19 @@
         <p:nvCxnSpPr>
           <p:cNvPr id="126" name="Elbow Connector 42"/>
           <p:cNvCxnSpPr>
-            <a:stCxn id="125" idx="1"/>
-            <a:endCxn id="47" idx="3"/>
+            <a:stCxn id="125" idx="0"/>
+            <a:endCxn id="71" idx="3"/>
           </p:cNvCxnSpPr>
           <p:nvPr/>
         </p:nvCxnSpPr>
         <p:spPr>
-          <a:xfrm rot="10800000" flipH="1">
-            <a:off x="2071700" y="1285860"/>
-            <a:ext cx="107157" cy="2428216"/>
-          </a:xfrm>
-          <a:prstGeom prst="bentConnector4">
+          <a:xfrm rot="16200000" flipV="1">
+            <a:off x="570796" y="2679577"/>
+            <a:ext cx="572856" cy="357190"/>
+          </a:xfrm>
+          <a:prstGeom prst="bentConnector3">
             <a:avLst>
-              <a:gd name="adj1" fmla="val -213332"/>
-              <a:gd name="adj2" fmla="val 52928"/>
+              <a:gd name="adj1" fmla="val 50000"/>
             </a:avLst>
           </a:prstGeom>
           <a:ln>
@@ -1904,8 +1946,8 @@
         </p:nvSpPr>
         <p:spPr>
           <a:xfrm>
-            <a:off x="2500329" y="4279496"/>
-            <a:ext cx="2071702" cy="284400"/>
+            <a:off x="1214444" y="3850868"/>
+            <a:ext cx="2285985" cy="284400"/>
           </a:xfrm>
           <a:prstGeom prst="rect">
             <a:avLst/>
@@ -1915,7 +1957,9 @@
           </a:solidFill>
           <a:ln w="12600">
             <a:solidFill>
-              <a:srgbClr val="000000"/>
+              <a:schemeClr val="bg1">
+                <a:lumMod val="85000"/>
+              </a:schemeClr>
             </a:solidFill>
             <a:round/>
           </a:ln>
@@ -1935,12 +1979,22 @@
             <a:r>
               <a:rPr lang="en-GB" sz="1400" smtClean="0">
                 <a:solidFill>
-                  <a:srgbClr val="000000"/>
+                  <a:schemeClr val="bg1">
+                    <a:lumMod val="65000"/>
+                  </a:schemeClr>
                 </a:solidFill>
                 <a:latin typeface="Calibri"/>
               </a:rPr>
-              <a:t>qb:FrequencyProperty</a:t>
-            </a:r>
+              <a:t>sdmx:FrequencyProperty</a:t>
+            </a:r>
+            <a:endParaRPr lang="en-GB" sz="1400" smtClean="0">
+              <a:solidFill>
+                <a:schemeClr val="bg1">
+                  <a:lumMod val="65000"/>
+                </a:schemeClr>
+              </a:solidFill>
+              <a:latin typeface="Calibri"/>
+            </a:endParaRPr>
           </a:p>
         </p:txBody>
       </p:sp>
@@ -1952,7 +2006,7 @@
         </p:nvSpPr>
         <p:spPr>
           <a:xfrm>
-            <a:off x="2224101" y="3857628"/>
+            <a:off x="938217" y="3429000"/>
             <a:ext cx="214314" cy="142876"/>
           </a:xfrm>
           <a:prstGeom prst="triangle">
@@ -1963,7 +2017,9 @@
           </a:solidFill>
           <a:ln w="12700">
             <a:solidFill>
-              <a:schemeClr val="tx1"/>
+              <a:schemeClr val="bg1">
+                <a:lumMod val="85000"/>
+              </a:schemeClr>
             </a:solidFill>
           </a:ln>
         </p:spPr>
@@ -1988,7 +2044,13 @@
           <a:lstStyle/>
           <a:p>
             <a:pPr algn="ctr"/>
-            <a:endParaRPr lang="en-GB"/>
+            <a:endParaRPr lang="en-GB">
+              <a:solidFill>
+                <a:schemeClr val="bg1">
+                  <a:lumMod val="65000"/>
+                </a:schemeClr>
+              </a:solidFill>
+            </a:endParaRPr>
           </a:p>
         </p:txBody>
       </p:sp>
@@ -2003,15 +2065,17 @@
         </p:nvCxnSpPr>
         <p:spPr>
           <a:xfrm rot="10800000">
-            <a:off x="2331259" y="4000504"/>
-            <a:ext cx="169071" cy="421192"/>
+            <a:off x="1045374" y="3571876"/>
+            <a:ext cx="169070" cy="421192"/>
           </a:xfrm>
           <a:prstGeom prst="bentConnector2">
             <a:avLst/>
           </a:prstGeom>
           <a:ln>
             <a:solidFill>
-              <a:schemeClr val="tx1"/>
+              <a:schemeClr val="bg1">
+                <a:lumMod val="85000"/>
+              </a:schemeClr>
             </a:solidFill>
             <a:tailEnd type="none"/>
           </a:ln>
@@ -2039,8 +2103,8 @@
         </p:nvSpPr>
         <p:spPr>
           <a:xfrm>
-            <a:off x="2500329" y="4565248"/>
-            <a:ext cx="2071702" cy="284400"/>
+            <a:off x="1214414" y="4143380"/>
+            <a:ext cx="2286016" cy="284400"/>
           </a:xfrm>
           <a:prstGeom prst="rect">
             <a:avLst/>
@@ -2050,7 +2114,9 @@
           </a:solidFill>
           <a:ln w="12600">
             <a:solidFill>
-              <a:srgbClr val="000000"/>
+              <a:schemeClr val="bg1">
+                <a:lumMod val="85000"/>
+              </a:schemeClr>
             </a:solidFill>
             <a:round/>
           </a:ln>
@@ -2070,12 +2136,33 @@
             <a:r>
               <a:rPr lang="en-GB" sz="1400" smtClean="0">
                 <a:solidFill>
-                  <a:srgbClr val="000000"/>
+                  <a:schemeClr val="bg1">
+                    <a:lumMod val="65000"/>
+                  </a:schemeClr>
                 </a:solidFill>
                 <a:latin typeface="Calibri"/>
               </a:rPr>
-              <a:t>qb:CountProperty</a:t>
-            </a:r>
+              <a:t>sdmx</a:t>
+            </a:r>
+            <a:r>
+              <a:rPr lang="en-GB" sz="1400" smtClean="0">
+                <a:solidFill>
+                  <a:schemeClr val="bg1">
+                    <a:lumMod val="65000"/>
+                  </a:schemeClr>
+                </a:solidFill>
+                <a:latin typeface="Calibri"/>
+              </a:rPr>
+              <a:t>:CountProperty</a:t>
+            </a:r>
+            <a:endParaRPr lang="en-GB" sz="1400" smtClean="0">
+              <a:solidFill>
+                <a:schemeClr val="bg1">
+                  <a:lumMod val="65000"/>
+                </a:schemeClr>
+              </a:solidFill>
+              <a:latin typeface="Calibri"/>
+            </a:endParaRPr>
           </a:p>
         </p:txBody>
       </p:sp>
@@ -2087,8 +2174,8 @@
         </p:nvSpPr>
         <p:spPr>
           <a:xfrm>
-            <a:off x="2500329" y="4852352"/>
-            <a:ext cx="2071702" cy="284400"/>
+            <a:off x="1214444" y="4423724"/>
+            <a:ext cx="2285985" cy="284400"/>
           </a:xfrm>
           <a:prstGeom prst="rect">
             <a:avLst/>
@@ -2098,7 +2185,9 @@
           </a:solidFill>
           <a:ln w="12600">
             <a:solidFill>
-              <a:srgbClr val="000000"/>
+              <a:schemeClr val="bg1">
+                <a:lumMod val="85000"/>
+              </a:schemeClr>
             </a:solidFill>
             <a:round/>
           </a:ln>
@@ -2118,12 +2207,33 @@
             <a:r>
               <a:rPr lang="en-GB" sz="1400" smtClean="0">
                 <a:solidFill>
-                  <a:srgbClr val="000000"/>
+                  <a:schemeClr val="bg1">
+                    <a:lumMod val="65000"/>
+                  </a:schemeClr>
                 </a:solidFill>
                 <a:latin typeface="Calibri"/>
               </a:rPr>
-              <a:t>qb:EntityProperty</a:t>
-            </a:r>
+              <a:t>sdmx</a:t>
+            </a:r>
+            <a:r>
+              <a:rPr lang="en-GB" sz="1400" smtClean="0">
+                <a:solidFill>
+                  <a:schemeClr val="bg1">
+                    <a:lumMod val="65000"/>
+                  </a:schemeClr>
+                </a:solidFill>
+                <a:latin typeface="Calibri"/>
+              </a:rPr>
+              <a:t>:EntityProperty</a:t>
+            </a:r>
+            <a:endParaRPr lang="en-GB" sz="1400" smtClean="0">
+              <a:solidFill>
+                <a:schemeClr val="bg1">
+                  <a:lumMod val="65000"/>
+                </a:schemeClr>
+              </a:solidFill>
+              <a:latin typeface="Calibri"/>
+            </a:endParaRPr>
           </a:p>
         </p:txBody>
       </p:sp>
@@ -2135,8 +2245,8 @@
         </p:nvSpPr>
         <p:spPr>
           <a:xfrm>
-            <a:off x="2500329" y="5139456"/>
-            <a:ext cx="2071702" cy="284400"/>
+            <a:off x="1214444" y="4710828"/>
+            <a:ext cx="2285985" cy="284400"/>
           </a:xfrm>
           <a:prstGeom prst="rect">
             <a:avLst/>
@@ -2146,7 +2256,9 @@
           </a:solidFill>
           <a:ln w="12600">
             <a:solidFill>
-              <a:srgbClr val="000000"/>
+              <a:schemeClr val="bg1">
+                <a:lumMod val="85000"/>
+              </a:schemeClr>
             </a:solidFill>
             <a:round/>
           </a:ln>
@@ -2166,12 +2278,33 @@
             <a:r>
               <a:rPr lang="en-GB" sz="1400" smtClean="0">
                 <a:solidFill>
-                  <a:srgbClr val="000000"/>
+                  <a:schemeClr val="bg1">
+                    <a:lumMod val="65000"/>
+                  </a:schemeClr>
                 </a:solidFill>
                 <a:latin typeface="Calibri"/>
               </a:rPr>
-              <a:t>qb:TimeProperty</a:t>
-            </a:r>
+              <a:t>sdmx</a:t>
+            </a:r>
+            <a:r>
+              <a:rPr lang="en-GB" sz="1400" smtClean="0">
+                <a:solidFill>
+                  <a:schemeClr val="bg1">
+                    <a:lumMod val="65000"/>
+                  </a:schemeClr>
+                </a:solidFill>
+                <a:latin typeface="Calibri"/>
+              </a:rPr>
+              <a:t>:TimeProperty</a:t>
+            </a:r>
+            <a:endParaRPr lang="en-GB" sz="1400" smtClean="0">
+              <a:solidFill>
+                <a:schemeClr val="bg1">
+                  <a:lumMod val="65000"/>
+                </a:schemeClr>
+              </a:solidFill>
+              <a:latin typeface="Calibri"/>
+            </a:endParaRPr>
           </a:p>
         </p:txBody>
       </p:sp>
@@ -2183,8 +2316,8 @@
         </p:nvSpPr>
         <p:spPr>
           <a:xfrm>
-            <a:off x="2500329" y="5426560"/>
-            <a:ext cx="2071702" cy="284400"/>
+            <a:off x="1214444" y="4997932"/>
+            <a:ext cx="2285986" cy="284400"/>
           </a:xfrm>
           <a:prstGeom prst="rect">
             <a:avLst/>
@@ -2194,7 +2327,9 @@
           </a:solidFill>
           <a:ln w="12600">
             <a:solidFill>
-              <a:srgbClr val="000000"/>
+              <a:schemeClr val="bg1">
+                <a:lumMod val="85000"/>
+              </a:schemeClr>
             </a:solidFill>
             <a:round/>
           </a:ln>
@@ -2214,12 +2349,33 @@
             <a:r>
               <a:rPr lang="en-GB" sz="1400" smtClean="0">
                 <a:solidFill>
-                  <a:srgbClr val="000000"/>
+                  <a:schemeClr val="bg1">
+                    <a:lumMod val="65000"/>
+                  </a:schemeClr>
                 </a:solidFill>
                 <a:latin typeface="Calibri"/>
               </a:rPr>
-              <a:t>qb:MeasureTypeProperty</a:t>
-            </a:r>
+              <a:t>sdmx</a:t>
+            </a:r>
+            <a:r>
+              <a:rPr lang="en-GB" sz="1400" smtClean="0">
+                <a:solidFill>
+                  <a:schemeClr val="bg1">
+                    <a:lumMod val="65000"/>
+                  </a:schemeClr>
+                </a:solidFill>
+                <a:latin typeface="Calibri"/>
+              </a:rPr>
+              <a:t>:MeasureTypeProperty</a:t>
+            </a:r>
+            <a:endParaRPr lang="en-GB" sz="1400" smtClean="0">
+              <a:solidFill>
+                <a:schemeClr val="bg1">
+                  <a:lumMod val="65000"/>
+                </a:schemeClr>
+              </a:solidFill>
+              <a:latin typeface="Calibri"/>
+            </a:endParaRPr>
           </a:p>
         </p:txBody>
       </p:sp>
@@ -2231,8 +2387,8 @@
         </p:nvSpPr>
         <p:spPr>
           <a:xfrm>
-            <a:off x="2500329" y="5713664"/>
-            <a:ext cx="2071702" cy="284400"/>
+            <a:off x="1214444" y="5285036"/>
+            <a:ext cx="2285985" cy="284400"/>
           </a:xfrm>
           <a:prstGeom prst="rect">
             <a:avLst/>
@@ -2242,7 +2398,9 @@
           </a:solidFill>
           <a:ln w="12600">
             <a:solidFill>
-              <a:srgbClr val="000000"/>
+              <a:schemeClr val="bg1">
+                <a:lumMod val="85000"/>
+              </a:schemeClr>
             </a:solidFill>
             <a:round/>
           </a:ln>
@@ -2262,12 +2420,33 @@
             <a:r>
               <a:rPr lang="en-GB" sz="1400" smtClean="0">
                 <a:solidFill>
-                  <a:srgbClr val="000000"/>
+                  <a:schemeClr val="bg1">
+                    <a:lumMod val="65000"/>
+                  </a:schemeClr>
                 </a:solidFill>
                 <a:latin typeface="Calibri"/>
               </a:rPr>
-              <a:t>qb:NonObsTimeProperty</a:t>
-            </a:r>
+              <a:t>sdmx</a:t>
+            </a:r>
+            <a:r>
+              <a:rPr lang="en-GB" sz="1400" smtClean="0">
+                <a:solidFill>
+                  <a:schemeClr val="bg1">
+                    <a:lumMod val="65000"/>
+                  </a:schemeClr>
+                </a:solidFill>
+                <a:latin typeface="Calibri"/>
+              </a:rPr>
+              <a:t>:NonObsTimeProperty</a:t>
+            </a:r>
+            <a:endParaRPr lang="en-GB" sz="1400" smtClean="0">
+              <a:solidFill>
+                <a:schemeClr val="bg1">
+                  <a:lumMod val="65000"/>
+                </a:schemeClr>
+              </a:solidFill>
+              <a:latin typeface="Calibri"/>
+            </a:endParaRPr>
           </a:p>
         </p:txBody>
       </p:sp>
@@ -2279,8 +2458,8 @@
         </p:nvSpPr>
         <p:spPr>
           <a:xfrm>
-            <a:off x="2500329" y="6000768"/>
-            <a:ext cx="2071702" cy="284400"/>
+            <a:off x="1214444" y="5572140"/>
+            <a:ext cx="2285985" cy="284400"/>
           </a:xfrm>
           <a:prstGeom prst="rect">
             <a:avLst/>
@@ -2290,7 +2469,9 @@
           </a:solidFill>
           <a:ln w="12600">
             <a:solidFill>
-              <a:srgbClr val="000000"/>
+              <a:schemeClr val="bg1">
+                <a:lumMod val="85000"/>
+              </a:schemeClr>
             </a:solidFill>
             <a:round/>
           </a:ln>
@@ -2310,12 +2491,33 @@
             <a:r>
               <a:rPr lang="en-GB" sz="1400" smtClean="0">
                 <a:solidFill>
-                  <a:srgbClr val="000000"/>
+                  <a:schemeClr val="bg1">
+                    <a:lumMod val="65000"/>
+                  </a:schemeClr>
                 </a:solidFill>
                 <a:latin typeface="Calibri"/>
               </a:rPr>
-              <a:t>qb:IdentityProperty</a:t>
-            </a:r>
+              <a:t>sdmx</a:t>
+            </a:r>
+            <a:r>
+              <a:rPr lang="en-GB" sz="1400" smtClean="0">
+                <a:solidFill>
+                  <a:schemeClr val="bg1">
+                    <a:lumMod val="65000"/>
+                  </a:schemeClr>
+                </a:solidFill>
+                <a:latin typeface="Calibri"/>
+              </a:rPr>
+              <a:t>:IdentityProperty</a:t>
+            </a:r>
+            <a:endParaRPr lang="en-GB" sz="1400" smtClean="0">
+              <a:solidFill>
+                <a:schemeClr val="bg1">
+                  <a:lumMod val="65000"/>
+                </a:schemeClr>
+              </a:solidFill>
+              <a:latin typeface="Calibri"/>
+            </a:endParaRPr>
           </a:p>
         </p:txBody>
       </p:sp>
@@ -2327,8 +2529,8 @@
         </p:nvSpPr>
         <p:spPr>
           <a:xfrm>
-            <a:off x="2500329" y="6287872"/>
-            <a:ext cx="2286016" cy="284400"/>
+            <a:off x="1214444" y="5859244"/>
+            <a:ext cx="2571738" cy="284400"/>
           </a:xfrm>
           <a:prstGeom prst="rect">
             <a:avLst/>
@@ -2338,7 +2540,9 @@
           </a:solidFill>
           <a:ln w="12600">
             <a:solidFill>
-              <a:srgbClr val="000000"/>
+              <a:schemeClr val="bg1">
+                <a:lumMod val="85000"/>
+              </a:schemeClr>
             </a:solidFill>
             <a:round/>
           </a:ln>
@@ -2358,12 +2562,33 @@
             <a:r>
               <a:rPr lang="en-GB" sz="1400" smtClean="0">
                 <a:solidFill>
-                  <a:srgbClr val="000000"/>
+                  <a:schemeClr val="bg1">
+                    <a:lumMod val="65000"/>
+                  </a:schemeClr>
                 </a:solidFill>
                 <a:latin typeface="Calibri"/>
               </a:rPr>
-              <a:t>qb:PrimaryMeasureProperty</a:t>
-            </a:r>
+              <a:t>sdmx</a:t>
+            </a:r>
+            <a:r>
+              <a:rPr lang="en-GB" sz="1400" smtClean="0">
+                <a:solidFill>
+                  <a:schemeClr val="bg1">
+                    <a:lumMod val="65000"/>
+                  </a:schemeClr>
+                </a:solidFill>
+                <a:latin typeface="Calibri"/>
+              </a:rPr>
+              <a:t>:PrimaryMeasureProperty</a:t>
+            </a:r>
+            <a:endParaRPr lang="en-GB" sz="1400" smtClean="0">
+              <a:solidFill>
+                <a:schemeClr val="bg1">
+                  <a:lumMod val="65000"/>
+                </a:schemeClr>
+              </a:solidFill>
+              <a:latin typeface="Calibri"/>
+            </a:endParaRPr>
           </a:p>
         </p:txBody>
       </p:sp>
@@ -2378,15 +2603,17 @@
         </p:nvCxnSpPr>
         <p:spPr>
           <a:xfrm rot="10800000">
-            <a:off x="2331259" y="4000504"/>
-            <a:ext cx="169071" cy="706944"/>
+            <a:off x="1045374" y="3571876"/>
+            <a:ext cx="169040" cy="713704"/>
           </a:xfrm>
           <a:prstGeom prst="bentConnector2">
             <a:avLst/>
           </a:prstGeom>
           <a:ln>
             <a:solidFill>
-              <a:schemeClr val="tx1"/>
+              <a:schemeClr val="bg1">
+                <a:lumMod val="85000"/>
+              </a:schemeClr>
             </a:solidFill>
             <a:tailEnd type="none"/>
           </a:ln>
@@ -2417,15 +2644,17 @@
         </p:nvCxnSpPr>
         <p:spPr>
           <a:xfrm rot="10800000">
-            <a:off x="2331259" y="4000504"/>
-            <a:ext cx="169071" cy="994048"/>
+            <a:off x="1045374" y="3571876"/>
+            <a:ext cx="169070" cy="994048"/>
           </a:xfrm>
           <a:prstGeom prst="bentConnector2">
             <a:avLst/>
           </a:prstGeom>
           <a:ln>
             <a:solidFill>
-              <a:schemeClr val="tx1"/>
+              <a:schemeClr val="bg1">
+                <a:lumMod val="85000"/>
+              </a:schemeClr>
             </a:solidFill>
             <a:tailEnd type="none"/>
           </a:ln>
@@ -2456,15 +2685,17 @@
         </p:nvCxnSpPr>
         <p:spPr>
           <a:xfrm rot="10800000">
-            <a:off x="2331259" y="4000504"/>
-            <a:ext cx="169071" cy="1281152"/>
+            <a:off x="1045374" y="3571876"/>
+            <a:ext cx="169070" cy="1281152"/>
           </a:xfrm>
           <a:prstGeom prst="bentConnector2">
             <a:avLst/>
           </a:prstGeom>
           <a:ln>
             <a:solidFill>
-              <a:schemeClr val="tx1"/>
+              <a:schemeClr val="bg1">
+                <a:lumMod val="85000"/>
+              </a:schemeClr>
             </a:solidFill>
             <a:tailEnd type="none"/>
           </a:ln>
@@ -2495,15 +2726,17 @@
         </p:nvCxnSpPr>
         <p:spPr>
           <a:xfrm rot="10800000">
-            <a:off x="2331259" y="4000504"/>
-            <a:ext cx="169071" cy="1568256"/>
+            <a:off x="1045374" y="3571876"/>
+            <a:ext cx="169070" cy="1568256"/>
           </a:xfrm>
           <a:prstGeom prst="bentConnector2">
             <a:avLst/>
           </a:prstGeom>
           <a:ln>
             <a:solidFill>
-              <a:schemeClr val="tx1"/>
+              <a:schemeClr val="bg1">
+                <a:lumMod val="85000"/>
+              </a:schemeClr>
             </a:solidFill>
             <a:tailEnd type="none"/>
           </a:ln>
@@ -2534,15 +2767,17 @@
         </p:nvCxnSpPr>
         <p:spPr>
           <a:xfrm rot="10800000">
-            <a:off x="2331259" y="4000504"/>
-            <a:ext cx="169071" cy="1855360"/>
+            <a:off x="1045374" y="3571876"/>
+            <a:ext cx="169070" cy="1855360"/>
           </a:xfrm>
           <a:prstGeom prst="bentConnector2">
             <a:avLst/>
           </a:prstGeom>
           <a:ln>
             <a:solidFill>
-              <a:schemeClr val="tx1"/>
+              <a:schemeClr val="bg1">
+                <a:lumMod val="85000"/>
+              </a:schemeClr>
             </a:solidFill>
             <a:tailEnd type="none"/>
           </a:ln>
@@ -2573,15 +2808,17 @@
         </p:nvCxnSpPr>
         <p:spPr>
           <a:xfrm rot="10800000">
-            <a:off x="2331259" y="4000504"/>
-            <a:ext cx="169071" cy="2142464"/>
+            <a:off x="1045374" y="3571876"/>
+            <a:ext cx="169070" cy="2142464"/>
           </a:xfrm>
           <a:prstGeom prst="bentConnector2">
             <a:avLst/>
           </a:prstGeom>
           <a:ln>
             <a:solidFill>
-              <a:schemeClr val="tx1"/>
+              <a:schemeClr val="bg1">
+                <a:lumMod val="85000"/>
+              </a:schemeClr>
             </a:solidFill>
             <a:tailEnd type="none"/>
           </a:ln>
@@ -2612,15 +2849,17 @@
         </p:nvCxnSpPr>
         <p:spPr>
           <a:xfrm rot="10800000">
-            <a:off x="2331259" y="4000504"/>
-            <a:ext cx="169071" cy="2429568"/>
+            <a:off x="1045374" y="3571876"/>
+            <a:ext cx="169070" cy="2429568"/>
           </a:xfrm>
           <a:prstGeom prst="bentConnector2">
             <a:avLst/>
           </a:prstGeom>
           <a:ln>
             <a:solidFill>
-              <a:schemeClr val="tx1"/>
+              <a:schemeClr val="bg1">
+                <a:lumMod val="85000"/>
+              </a:schemeClr>
             </a:solidFill>
             <a:tailEnd type="none"/>
           </a:ln>
@@ -2700,8 +2939,8 @@
         </p:nvCxnSpPr>
         <p:spPr>
           <a:xfrm rot="16200000" flipH="1">
-            <a:off x="3053620" y="2911428"/>
-            <a:ext cx="357866" cy="250002"/>
+            <a:off x="2982858" y="2982190"/>
+            <a:ext cx="427952" cy="178564"/>
           </a:xfrm>
           <a:prstGeom prst="bentConnector2">
             <a:avLst/>
@@ -2736,7 +2975,7 @@
         </p:nvSpPr>
         <p:spPr>
           <a:xfrm>
-            <a:off x="3357554" y="3073162"/>
+            <a:off x="3286116" y="3143248"/>
             <a:ext cx="1714512" cy="284400"/>
           </a:xfrm>
           <a:prstGeom prst="rect">
@@ -2882,51 +3121,13 @@
       </p:sp>
       <p:sp>
         <p:nvSpPr>
-          <p:cNvPr id="183" name="TextBox 182"/>
-          <p:cNvSpPr txBox="1"/>
-          <p:nvPr/>
-        </p:nvSpPr>
-        <p:spPr>
-          <a:xfrm>
-            <a:off x="214282" y="2528824"/>
-            <a:ext cx="1214446" cy="400110"/>
-          </a:xfrm>
-          <a:prstGeom prst="rect">
-            <a:avLst/>
-          </a:prstGeom>
-          <a:solidFill>
-            <a:schemeClr val="bg1"/>
-          </a:solidFill>
-        </p:spPr>
-        <p:txBody>
-          <a:bodyPr wrap="square" rtlCol="0">
-            <a:spAutoFit/>
-          </a:bodyPr>
-          <a:lstStyle/>
-          <a:p>
-            <a:r>
-              <a:rPr lang="en-GB" sz="1000" smtClean="0"/>
-              <a:t>specialization of </a:t>
-            </a:r>
-            <a:br>
-              <a:rPr lang="en-GB" sz="1000" smtClean="0"/>
-            </a:br>
-            <a:r>
-              <a:rPr lang="en-GB" sz="1000" smtClean="0"/>
-              <a:t>skos:Concept</a:t>
-            </a:r>
-          </a:p>
-        </p:txBody>
-      </p:sp>
-      <p:sp>
-        <p:nvSpPr>
           <p:cNvPr id="195" name="CustomShape 2"/>
           <p:cNvSpPr/>
           <p:nvPr/>
         </p:nvSpPr>
         <p:spPr>
           <a:xfrm>
-            <a:off x="4857752" y="3786190"/>
+            <a:off x="4643438" y="3786190"/>
             <a:ext cx="1214446" cy="284400"/>
           </a:xfrm>
           <a:prstGeom prst="rect">
@@ -2978,8 +3179,8 @@
         </p:nvCxnSpPr>
         <p:spPr>
           <a:xfrm rot="10800000">
-            <a:off x="5464976" y="4070590"/>
-            <a:ext cx="880849" cy="645764"/>
+            <a:off x="5250662" y="4070590"/>
+            <a:ext cx="892975" cy="645764"/>
           </a:xfrm>
           <a:prstGeom prst="bentConnector2">
             <a:avLst/>
@@ -3049,12 +3250,12 @@
         </p:nvCxnSpPr>
         <p:spPr>
           <a:xfrm rot="16200000" flipV="1">
-            <a:off x="4085645" y="2406859"/>
-            <a:ext cx="2500330" cy="258331"/>
+            <a:off x="3978488" y="2514016"/>
+            <a:ext cx="2500330" cy="44017"/>
           </a:xfrm>
           <a:prstGeom prst="bentConnector3">
             <a:avLst>
-              <a:gd name="adj1" fmla="val 33660"/>
+              <a:gd name="adj1" fmla="val 50000"/>
             </a:avLst>
           </a:prstGeom>
           <a:ln>
@@ -3124,6 +3325,54 @@
               </a:rPr>
               <a:t>qb:DataStructureDefinition</a:t>
             </a:r>
+          </a:p>
+        </p:txBody>
+      </p:sp>
+      <p:sp>
+        <p:nvSpPr>
+          <p:cNvPr id="71" name="Isosceles Triangle 70"/>
+          <p:cNvSpPr/>
+          <p:nvPr/>
+        </p:nvSpPr>
+        <p:spPr>
+          <a:xfrm>
+            <a:off x="571472" y="2428868"/>
+            <a:ext cx="214314" cy="142876"/>
+          </a:xfrm>
+          <a:prstGeom prst="triangle">
+            <a:avLst/>
+          </a:prstGeom>
+          <a:solidFill>
+            <a:schemeClr val="bg1"/>
+          </a:solidFill>
+          <a:ln w="12700">
+            <a:solidFill>
+              <a:schemeClr val="tx1"/>
+            </a:solidFill>
+          </a:ln>
+        </p:spPr>
+        <p:style>
+          <a:lnRef idx="2">
+            <a:schemeClr val="accent1">
+              <a:shade val="50000"/>
+            </a:schemeClr>
+          </a:lnRef>
+          <a:fillRef idx="1">
+            <a:schemeClr val="accent1"/>
+          </a:fillRef>
+          <a:effectRef idx="0">
+            <a:schemeClr val="accent1"/>
+          </a:effectRef>
+          <a:fontRef idx="minor">
+            <a:schemeClr val="lt1"/>
+          </a:fontRef>
+        </p:style>
+        <p:txBody>
+          <a:bodyPr rtlCol="0" anchor="ctr"/>
+          <a:lstStyle/>
+          <a:p>
+            <a:pPr algn="ctr"/>
+            <a:endParaRPr lang="en-GB"/>
           </a:p>
         </p:txBody>
       </p:sp>

</xml_diff>

<commit_message>
Added default obsValue and measureType support
</commit_message>
<xml_diff>
--- a/specs/src/main/html/qb-fig1.pptx
+++ b/specs/src/main/html/qb-fig1.pptx
@@ -596,10 +596,6 @@
               <a:rPr lang="en-GB" sz="1000" smtClean="0"/>
               <a:t>qb:componentRequired : boolean</a:t>
             </a:r>
-            <a:r>
-              <a:rPr lang="en-GB" sz="1000" smtClean="0"/>
-              <a:t/>
-            </a:r>
             <a:br>
               <a:rPr lang="en-GB" sz="1000" smtClean="0"/>
             </a:br>
@@ -614,7 +610,6 @@
               <a:rPr lang="en-GB" sz="1000" smtClean="0"/>
               <a:t>qb:order : xsd:int</a:t>
             </a:r>
-            <a:endParaRPr lang="en-GB" sz="1000" smtClean="0"/>
           </a:p>
         </p:txBody>
       </p:sp>
@@ -722,7 +717,7 @@
         </p:nvSpPr>
         <p:spPr>
           <a:xfrm>
-            <a:off x="6429419" y="2144468"/>
+            <a:off x="6429419" y="2357430"/>
             <a:ext cx="2071702" cy="284400"/>
           </a:xfrm>
           <a:prstGeom prst="rect">
@@ -770,7 +765,7 @@
         </p:nvSpPr>
         <p:spPr>
           <a:xfrm>
-            <a:off x="6429419" y="2573096"/>
+            <a:off x="6429419" y="2787410"/>
             <a:ext cx="2071702" cy="284400"/>
           </a:xfrm>
           <a:prstGeom prst="rect">
@@ -818,7 +813,7 @@
         </p:nvSpPr>
         <p:spPr>
           <a:xfrm>
-            <a:off x="5857915" y="3001724"/>
+            <a:off x="5857915" y="3500438"/>
             <a:ext cx="2071702" cy="284400"/>
           </a:xfrm>
           <a:prstGeom prst="rect">
@@ -949,7 +944,7 @@
         <p:nvCxnSpPr>
           <p:cNvPr id="49" name="Elbow Connector 42"/>
           <p:cNvCxnSpPr>
-            <a:stCxn id="40" idx="1"/>
+            <a:stCxn id="41" idx="1"/>
             <a:endCxn id="47" idx="3"/>
           </p:cNvCxnSpPr>
           <p:nvPr/>
@@ -957,7 +952,7 @@
         <p:spPr>
           <a:xfrm rot="10800000">
             <a:off x="5965073" y="1714488"/>
-            <a:ext cx="464347" cy="572180"/>
+            <a:ext cx="464347" cy="1215122"/>
           </a:xfrm>
           <a:prstGeom prst="bentConnector2">
             <a:avLst/>
@@ -996,12 +991,12 @@
         <p:spPr>
           <a:xfrm rot="10800000" flipH="1">
             <a:off x="5857914" y="1714488"/>
-            <a:ext cx="107157" cy="1429436"/>
+            <a:ext cx="107157" cy="1928150"/>
           </a:xfrm>
           <a:prstGeom prst="bentConnector4">
             <a:avLst>
               <a:gd name="adj1" fmla="val -213332"/>
-              <a:gd name="adj2" fmla="val 54974"/>
+              <a:gd name="adj2" fmla="val 53687"/>
             </a:avLst>
           </a:prstGeom>
           <a:ln>
@@ -1030,7 +1025,7 @@
         <p:nvCxnSpPr>
           <p:cNvPr id="53" name="Elbow Connector 42"/>
           <p:cNvCxnSpPr>
-            <a:stCxn id="41" idx="1"/>
+            <a:stCxn id="40" idx="1"/>
             <a:endCxn id="47" idx="3"/>
           </p:cNvCxnSpPr>
           <p:nvPr/>
@@ -1038,7 +1033,7 @@
         <p:spPr>
           <a:xfrm rot="10800000">
             <a:off x="5965073" y="1714488"/>
-            <a:ext cx="464347" cy="1000808"/>
+            <a:ext cx="464347" cy="785142"/>
           </a:xfrm>
           <a:prstGeom prst="bentConnector2">
             <a:avLst/>
@@ -1114,7 +1109,7 @@
         </p:nvSpPr>
         <p:spPr>
           <a:xfrm>
-            <a:off x="3786182" y="3360890"/>
+            <a:off x="3571868" y="3432328"/>
             <a:ext cx="1643074" cy="284400"/>
           </a:xfrm>
           <a:prstGeom prst="rect">
@@ -1154,27 +1149,8 @@
                 </a:solidFill>
                 <a:latin typeface="Calibri"/>
               </a:rPr>
-              <a:t>sdmx</a:t>
-            </a:r>
-            <a:r>
-              <a:rPr lang="en-GB" sz="1400" smtClean="0">
-                <a:solidFill>
-                  <a:schemeClr val="bg1">
-                    <a:lumMod val="65000"/>
-                  </a:schemeClr>
-                </a:solidFill>
-                <a:latin typeface="Calibri"/>
-              </a:rPr>
-              <a:t>:ConceptRole</a:t>
-            </a:r>
-            <a:endParaRPr lang="en-GB" sz="1400" smtClean="0">
-              <a:solidFill>
-                <a:schemeClr val="bg1">
-                  <a:lumMod val="65000"/>
-                </a:schemeClr>
-              </a:solidFill>
-              <a:latin typeface="Calibri"/>
-            </a:endParaRPr>
+              <a:t>sdmx:ConceptRole</a:t>
+            </a:r>
           </a:p>
         </p:txBody>
       </p:sp>
@@ -1189,7 +1165,7 @@
         </p:nvCxnSpPr>
         <p:spPr>
           <a:xfrm rot="5400000" flipH="1" flipV="1">
-            <a:off x="4536281" y="2643182"/>
+            <a:off x="4321967" y="2714620"/>
             <a:ext cx="142876" cy="1588"/>
           </a:xfrm>
           <a:prstGeom prst="bentConnector3">
@@ -1230,7 +1206,7 @@
         </p:nvSpPr>
         <p:spPr>
           <a:xfrm>
-            <a:off x="4510117" y="3645290"/>
+            <a:off x="4295803" y="3716728"/>
             <a:ext cx="214314" cy="142876"/>
           </a:xfrm>
           <a:prstGeom prst="triangle">
@@ -1289,7 +1265,7 @@
         </p:nvCxnSpPr>
         <p:spPr>
           <a:xfrm rot="10800000">
-            <a:off x="4617274" y="3788166"/>
+            <a:off x="4402960" y="3859604"/>
             <a:ext cx="169070" cy="421192"/>
           </a:xfrm>
           <a:prstGeom prst="bentConnector2">
@@ -1330,7 +1306,7 @@
         </p:nvCxnSpPr>
         <p:spPr>
           <a:xfrm rot="10800000">
-            <a:off x="4617274" y="3788166"/>
+            <a:off x="4402960" y="3859604"/>
             <a:ext cx="169040" cy="713704"/>
           </a:xfrm>
           <a:prstGeom prst="bentConnector2">
@@ -1371,7 +1347,7 @@
         </p:nvCxnSpPr>
         <p:spPr>
           <a:xfrm rot="10800000">
-            <a:off x="4617274" y="3788166"/>
+            <a:off x="4402960" y="3859604"/>
             <a:ext cx="169070" cy="994048"/>
           </a:xfrm>
           <a:prstGeom prst="bentConnector2">
@@ -1412,7 +1388,7 @@
         </p:nvCxnSpPr>
         <p:spPr>
           <a:xfrm rot="10800000">
-            <a:off x="4617274" y="3788166"/>
+            <a:off x="4402960" y="3859604"/>
             <a:ext cx="169070" cy="1281152"/>
           </a:xfrm>
           <a:prstGeom prst="bentConnector2">
@@ -1451,7 +1427,7 @@
         </p:nvSpPr>
         <p:spPr>
           <a:xfrm>
-            <a:off x="4000496" y="2143116"/>
+            <a:off x="3786182" y="2214554"/>
             <a:ext cx="1214446" cy="284400"/>
           </a:xfrm>
           <a:prstGeom prst="rect">
@@ -1490,18 +1466,7 @@
                 </a:solidFill>
                 <a:latin typeface="Calibri"/>
               </a:rPr>
-              <a:t>skos</a:t>
-            </a:r>
-            <a:r>
-              <a:rPr lang="en-GB" sz="1400" smtClean="0">
-                <a:solidFill>
-                  <a:schemeClr val="bg1">
-                    <a:lumMod val="65000"/>
-                  </a:schemeClr>
-                </a:solidFill>
-                <a:latin typeface="Calibri"/>
-              </a:rPr>
-              <a:t>:Concept</a:t>
+              <a:t>skos:Concept</a:t>
             </a:r>
             <a:endParaRPr sz="1600">
               <a:solidFill>
@@ -1524,7 +1489,7 @@
         </p:nvCxnSpPr>
         <p:spPr>
           <a:xfrm rot="16200000" flipH="1">
-            <a:off x="6769072" y="3410818"/>
+            <a:off x="6769072" y="3909532"/>
             <a:ext cx="427952" cy="178564"/>
           </a:xfrm>
           <a:prstGeom prst="bentConnector2">
@@ -1560,7 +1525,7 @@
         </p:nvSpPr>
         <p:spPr>
           <a:xfrm>
-            <a:off x="7072330" y="3571876"/>
+            <a:off x="7072330" y="4070590"/>
             <a:ext cx="1714512" cy="284400"/>
           </a:xfrm>
           <a:prstGeom prst="rect">
@@ -1595,16 +1560,7 @@
                 </a:solidFill>
                 <a:latin typeface="Calibri"/>
               </a:rPr>
-              <a:t>skos</a:t>
-            </a:r>
-            <a:r>
-              <a:rPr lang="en-GB" sz="1400" smtClean="0">
-                <a:solidFill>
-                  <a:srgbClr val="000000"/>
-                </a:solidFill>
-                <a:latin typeface="Calibri"/>
-              </a:rPr>
-              <a:t>:ConceptScheme</a:t>
+              <a:t>skos:ConceptScheme</a:t>
             </a:r>
             <a:endParaRPr sz="1600"/>
           </a:p>
@@ -1618,7 +1574,7 @@
         </p:nvSpPr>
         <p:spPr>
           <a:xfrm>
-            <a:off x="6166313" y="3357562"/>
+            <a:off x="6166313" y="3856276"/>
             <a:ext cx="906017" cy="261610"/>
           </a:xfrm>
           <a:prstGeom prst="rect">
@@ -1653,8 +1609,8 @@
         </p:nvCxnSpPr>
         <p:spPr>
           <a:xfrm rot="10800000" flipV="1">
-            <a:off x="4607719" y="1428060"/>
-            <a:ext cx="244064" cy="715056"/>
+            <a:off x="4393405" y="1428060"/>
+            <a:ext cx="458378" cy="786494"/>
           </a:xfrm>
           <a:prstGeom prst="bentConnector2">
             <a:avLst/>
@@ -1689,7 +1645,7 @@
         </p:nvSpPr>
         <p:spPr>
           <a:xfrm>
-            <a:off x="4143372" y="1643050"/>
+            <a:off x="4198109" y="1714488"/>
             <a:ext cx="873957" cy="261610"/>
           </a:xfrm>
           <a:prstGeom prst="rect">
@@ -1721,7 +1677,7 @@
         </p:nvSpPr>
         <p:spPr>
           <a:xfrm>
-            <a:off x="4500562" y="2428868"/>
+            <a:off x="4286248" y="2500306"/>
             <a:ext cx="214314" cy="142876"/>
           </a:xfrm>
           <a:prstGeom prst="triangle">
@@ -2498,7 +2454,7 @@
         </p:nvSpPr>
         <p:spPr>
           <a:xfrm>
-            <a:off x="4786314" y="3859604"/>
+            <a:off x="4572000" y="3931042"/>
             <a:ext cx="1869871" cy="1569660"/>
           </a:xfrm>
           <a:prstGeom prst="rect">
@@ -2599,14 +2555,6 @@
               </a:rPr>
               <a:t>sdmx:MeasureTypeRole</a:t>
             </a:r>
-            <a:endParaRPr lang="en-GB" sz="1200" smtClean="0">
-              <a:solidFill>
-                <a:schemeClr val="bg1">
-                  <a:lumMod val="65000"/>
-                </a:schemeClr>
-              </a:solidFill>
-              <a:latin typeface="Calibri"/>
-            </a:endParaRPr>
           </a:p>
           <a:p>
             <a:r>
@@ -2618,27 +2566,8 @@
                 </a:solidFill>
                 <a:latin typeface="Calibri"/>
               </a:rPr>
-              <a:t>s</a:t>
-            </a:r>
-            <a:r>
-              <a:rPr lang="en-GB" sz="1200" smtClean="0">
-                <a:solidFill>
-                  <a:schemeClr val="bg1">
-                    <a:lumMod val="65000"/>
-                  </a:schemeClr>
-                </a:solidFill>
-                <a:latin typeface="Calibri"/>
-              </a:rPr>
-              <a:t>dmx:NonObsTimeRole</a:t>
-            </a:r>
-            <a:endParaRPr lang="en-GB" sz="1200" smtClean="0">
-              <a:solidFill>
-                <a:schemeClr val="bg1">
-                  <a:lumMod val="65000"/>
-                </a:schemeClr>
-              </a:solidFill>
-              <a:latin typeface="Calibri"/>
-            </a:endParaRPr>
+              <a:t>sdmx:NonObsTimeRole</a:t>
+            </a:r>
           </a:p>
           <a:p>
             <a:r>
@@ -2652,14 +2581,6 @@
               </a:rPr>
               <a:t>sdmx:IdentityRole</a:t>
             </a:r>
-            <a:endParaRPr lang="en-GB" sz="1200" smtClean="0">
-              <a:solidFill>
-                <a:schemeClr val="bg1">
-                  <a:lumMod val="65000"/>
-                </a:schemeClr>
-              </a:solidFill>
-              <a:latin typeface="Calibri"/>
-            </a:endParaRPr>
           </a:p>
           <a:p>
             <a:r>
@@ -2673,14 +2594,6 @@
               </a:rPr>
               <a:t>sdmx:PrimaryMeasureRole</a:t>
             </a:r>
-            <a:endParaRPr lang="en-GB" sz="1200" smtClean="0">
-              <a:solidFill>
-                <a:schemeClr val="bg1">
-                  <a:lumMod val="65000"/>
-                </a:schemeClr>
-              </a:solidFill>
-              <a:latin typeface="Calibri"/>
-            </a:endParaRPr>
           </a:p>
         </p:txBody>
       </p:sp>
@@ -2695,7 +2608,7 @@
         </p:nvCxnSpPr>
         <p:spPr>
           <a:xfrm rot="5400000" flipH="1" flipV="1">
-            <a:off x="4498898" y="3252069"/>
+            <a:off x="4284584" y="3323507"/>
             <a:ext cx="217642" cy="1588"/>
           </a:xfrm>
           <a:prstGeom prst="bentConnector3">
@@ -2736,7 +2649,7 @@
         </p:nvSpPr>
         <p:spPr>
           <a:xfrm>
-            <a:off x="4000496" y="2714620"/>
+            <a:off x="3786182" y="2786058"/>
             <a:ext cx="1214446" cy="284400"/>
           </a:xfrm>
           <a:prstGeom prst="rect">
@@ -2795,7 +2708,7 @@
         </p:nvSpPr>
         <p:spPr>
           <a:xfrm>
-            <a:off x="4500562" y="3000372"/>
+            <a:off x="4286248" y="3071810"/>
             <a:ext cx="214314" cy="142876"/>
           </a:xfrm>
           <a:prstGeom prst="triangle">
@@ -2852,7 +2765,7 @@
         </p:nvSpPr>
         <p:spPr>
           <a:xfrm>
-            <a:off x="7143768" y="4218146"/>
+            <a:off x="7143768" y="4716860"/>
             <a:ext cx="1643074" cy="284400"/>
           </a:xfrm>
           <a:prstGeom prst="rect">
@@ -2892,18 +2805,7 @@
                 </a:solidFill>
                 <a:latin typeface="Calibri"/>
               </a:rPr>
-              <a:t>sdmx</a:t>
-            </a:r>
-            <a:r>
-              <a:rPr lang="en-GB" sz="1400" smtClean="0">
-                <a:solidFill>
-                  <a:schemeClr val="bg1">
-                    <a:lumMod val="65000"/>
-                  </a:schemeClr>
-                </a:solidFill>
-                <a:latin typeface="Calibri"/>
-              </a:rPr>
-              <a:t>:CodeList</a:t>
+              <a:t>sdmx:CodeList</a:t>
             </a:r>
           </a:p>
         </p:txBody>
@@ -2919,7 +2821,7 @@
         </p:nvCxnSpPr>
         <p:spPr>
           <a:xfrm rot="5400000" flipH="1" flipV="1">
-            <a:off x="7856484" y="4109325"/>
+            <a:off x="7856484" y="4608039"/>
             <a:ext cx="217642" cy="1588"/>
           </a:xfrm>
           <a:prstGeom prst="bentConnector3">
@@ -2960,7 +2862,7 @@
         </p:nvSpPr>
         <p:spPr>
           <a:xfrm>
-            <a:off x="7858148" y="3857628"/>
+            <a:off x="7858148" y="4356342"/>
             <a:ext cx="214314" cy="142876"/>
           </a:xfrm>
           <a:prstGeom prst="triangle">
@@ -3080,6 +2982,122 @@
               <a:t>qb:component</a:t>
             </a:r>
             <a:endParaRPr lang="en-GB" sz="1100"/>
+          </a:p>
+        </p:txBody>
+      </p:sp>
+      <p:sp>
+        <p:nvSpPr>
+          <p:cNvPr id="76" name="Rounded Rectangle 75"/>
+          <p:cNvSpPr/>
+          <p:nvPr/>
+        </p:nvSpPr>
+        <p:spPr>
+          <a:xfrm>
+            <a:off x="7000892" y="3071810"/>
+            <a:ext cx="1500198" cy="214314"/>
+          </a:xfrm>
+          <a:prstGeom prst="roundRect">
+            <a:avLst/>
+          </a:prstGeom>
+          <a:solidFill>
+            <a:schemeClr val="bg1"/>
+          </a:solidFill>
+          <a:ln w="12700"/>
+        </p:spPr>
+        <p:style>
+          <a:lnRef idx="2">
+            <a:schemeClr val="accent1">
+              <a:shade val="50000"/>
+            </a:schemeClr>
+          </a:lnRef>
+          <a:fillRef idx="1">
+            <a:schemeClr val="accent1"/>
+          </a:fillRef>
+          <a:effectRef idx="0">
+            <a:schemeClr val="accent1"/>
+          </a:effectRef>
+          <a:fontRef idx="minor">
+            <a:schemeClr val="lt1"/>
+          </a:fontRef>
+        </p:style>
+        <p:txBody>
+          <a:bodyPr rtlCol="0" anchor="ctr"/>
+          <a:lstStyle/>
+          <a:p>
+            <a:pPr algn="ctr"/>
+            <a:r>
+              <a:rPr lang="en-GB" sz="1400" smtClean="0">
+                <a:solidFill>
+                  <a:schemeClr val="accent1"/>
+                </a:solidFill>
+                <a:latin typeface="Calibri" pitchFamily="34" charset="0"/>
+              </a:rPr>
+              <a:t>qb:obsValue</a:t>
+            </a:r>
+            <a:endParaRPr lang="en-GB" sz="1400">
+              <a:solidFill>
+                <a:schemeClr val="accent1"/>
+              </a:solidFill>
+              <a:latin typeface="Calibri" pitchFamily="34" charset="0"/>
+            </a:endParaRPr>
+          </a:p>
+        </p:txBody>
+      </p:sp>
+      <p:sp>
+        <p:nvSpPr>
+          <p:cNvPr id="77" name="Rounded Rectangle 76"/>
+          <p:cNvSpPr/>
+          <p:nvPr/>
+        </p:nvSpPr>
+        <p:spPr>
+          <a:xfrm>
+            <a:off x="7000892" y="2000240"/>
+            <a:ext cx="1500198" cy="214314"/>
+          </a:xfrm>
+          <a:prstGeom prst="roundRect">
+            <a:avLst/>
+          </a:prstGeom>
+          <a:solidFill>
+            <a:schemeClr val="bg1"/>
+          </a:solidFill>
+          <a:ln w="12700"/>
+        </p:spPr>
+        <p:style>
+          <a:lnRef idx="2">
+            <a:schemeClr val="accent1">
+              <a:shade val="50000"/>
+            </a:schemeClr>
+          </a:lnRef>
+          <a:fillRef idx="1">
+            <a:schemeClr val="accent1"/>
+          </a:fillRef>
+          <a:effectRef idx="0">
+            <a:schemeClr val="accent1"/>
+          </a:effectRef>
+          <a:fontRef idx="minor">
+            <a:schemeClr val="lt1"/>
+          </a:fontRef>
+        </p:style>
+        <p:txBody>
+          <a:bodyPr rtlCol="0" anchor="ctr"/>
+          <a:lstStyle/>
+          <a:p>
+            <a:pPr algn="ctr"/>
+            <a:r>
+              <a:rPr lang="en-GB" sz="1400" smtClean="0">
+                <a:solidFill>
+                  <a:schemeClr val="accent1"/>
+                </a:solidFill>
+                <a:latin typeface="Calibri" pitchFamily="34" charset="0"/>
+              </a:rPr>
+              <a:t>qb:measureType</a:t>
+            </a:r>
+            <a:endParaRPr lang="en-GB" sz="1400">
+              <a:solidFill>
+                <a:schemeClr val="accent1"/>
+              </a:solidFill>
+              <a:latin typeface="Calibri" pitchFamily="34" charset="0"/>
+            </a:endParaRPr>
           </a:p>
         </p:txBody>
       </p:sp>

</xml_diff>

<commit_message>
Updated diagram and vocabulary to match changed terminology agreed on telecon
</commit_message>
<xml_diff>
--- a/specs/src/main/html/qb-fig1.pptx
+++ b/specs/src/main/html/qb-fig1.pptx
@@ -369,7 +369,7 @@
         <p:spPr>
           <a:xfrm>
             <a:off x="2985683" y="381308"/>
-            <a:ext cx="1157689" cy="261610"/>
+            <a:ext cx="1077539" cy="261610"/>
           </a:xfrm>
           <a:prstGeom prst="rect">
             <a:avLst/>
@@ -386,7 +386,7 @@
           <a:p>
             <a:r>
               <a:rPr lang="en-GB" sz="1100" smtClean="0"/>
-              <a:t>qb:specification</a:t>
+              <a:t>qb:component</a:t>
             </a:r>
             <a:endParaRPr lang="en-GB" sz="1100"/>
           </a:p>
@@ -1109,7 +1109,7 @@
         </p:nvSpPr>
         <p:spPr>
           <a:xfrm>
-            <a:off x="3571868" y="3432328"/>
+            <a:off x="3714744" y="3432328"/>
             <a:ext cx="1643074" cy="284400"/>
           </a:xfrm>
           <a:prstGeom prst="rect">
@@ -1165,7 +1165,7 @@
         </p:nvCxnSpPr>
         <p:spPr>
           <a:xfrm rot="5400000" flipH="1" flipV="1">
-            <a:off x="4321967" y="2714620"/>
+            <a:off x="4464843" y="2714620"/>
             <a:ext cx="142876" cy="1588"/>
           </a:xfrm>
           <a:prstGeom prst="bentConnector3">
@@ -1206,7 +1206,7 @@
         </p:nvSpPr>
         <p:spPr>
           <a:xfrm>
-            <a:off x="4295803" y="3716728"/>
+            <a:off x="4000496" y="3714752"/>
             <a:ext cx="214314" cy="142876"/>
           </a:xfrm>
           <a:prstGeom prst="triangle">
@@ -1265,7 +1265,7 @@
         </p:nvCxnSpPr>
         <p:spPr>
           <a:xfrm rot="10800000">
-            <a:off x="4402960" y="3859604"/>
+            <a:off x="4107653" y="3857628"/>
             <a:ext cx="169070" cy="421192"/>
           </a:xfrm>
           <a:prstGeom prst="bentConnector2">
@@ -1306,7 +1306,7 @@
         </p:nvCxnSpPr>
         <p:spPr>
           <a:xfrm rot="10800000">
-            <a:off x="4402960" y="3859604"/>
+            <a:off x="4107653" y="3857628"/>
             <a:ext cx="169040" cy="713704"/>
           </a:xfrm>
           <a:prstGeom prst="bentConnector2">
@@ -1347,7 +1347,7 @@
         </p:nvCxnSpPr>
         <p:spPr>
           <a:xfrm rot="10800000">
-            <a:off x="4402960" y="3859604"/>
+            <a:off x="4107653" y="3857628"/>
             <a:ext cx="169070" cy="994048"/>
           </a:xfrm>
           <a:prstGeom prst="bentConnector2">
@@ -1388,7 +1388,7 @@
         </p:nvCxnSpPr>
         <p:spPr>
           <a:xfrm rot="10800000">
-            <a:off x="4402960" y="3859604"/>
+            <a:off x="4107653" y="3857628"/>
             <a:ext cx="169070" cy="1281152"/>
           </a:xfrm>
           <a:prstGeom prst="bentConnector2">
@@ -1419,16 +1419,55 @@
           </a:fontRef>
         </p:style>
       </p:cxnSp>
-      <p:sp>
-        <p:nvSpPr>
-          <p:cNvPr id="171" name="CustomShape 1"/>
+      <p:cxnSp>
+        <p:nvCxnSpPr>
+          <p:cNvPr id="172" name="Elbow Connector 171"/>
+          <p:cNvCxnSpPr>
+            <a:stCxn id="42" idx="2"/>
+            <a:endCxn id="175" idx="1"/>
+          </p:cNvCxnSpPr>
+          <p:nvPr/>
+        </p:nvCxnSpPr>
+        <p:spPr>
+          <a:xfrm rot="16200000" flipH="1">
+            <a:off x="6769072" y="3909532"/>
+            <a:ext cx="427952" cy="178564"/>
+          </a:xfrm>
+          <a:prstGeom prst="bentConnector2">
+            <a:avLst/>
+          </a:prstGeom>
+          <a:ln>
+            <a:solidFill>
+              <a:schemeClr val="tx1"/>
+            </a:solidFill>
+            <a:tailEnd type="triangle"/>
+          </a:ln>
+        </p:spPr>
+        <p:style>
+          <a:lnRef idx="1">
+            <a:schemeClr val="accent1"/>
+          </a:lnRef>
+          <a:fillRef idx="0">
+            <a:schemeClr val="accent1"/>
+          </a:fillRef>
+          <a:effectRef idx="0">
+            <a:schemeClr val="accent1"/>
+          </a:effectRef>
+          <a:fontRef idx="minor">
+            <a:schemeClr val="tx1"/>
+          </a:fontRef>
+        </p:style>
+      </p:cxnSp>
+      <p:sp>
+        <p:nvSpPr>
+          <p:cNvPr id="175" name="CustomShape 1"/>
           <p:cNvSpPr/>
           <p:nvPr/>
         </p:nvSpPr>
         <p:spPr>
           <a:xfrm>
-            <a:off x="3786182" y="2214554"/>
-            <a:ext cx="1214446" cy="284400"/>
+            <a:off x="7072330" y="4070590"/>
+            <a:ext cx="1714512" cy="284400"/>
           </a:xfrm>
           <a:prstGeom prst="rect">
             <a:avLst/>
@@ -1438,9 +1477,7 @@
           </a:solidFill>
           <a:ln w="12600">
             <a:solidFill>
-              <a:schemeClr val="bg1">
-                <a:lumMod val="65000"/>
-              </a:schemeClr>
+              <a:srgbClr val="000000"/>
             </a:solidFill>
             <a:round/>
           </a:ln>
@@ -1460,102 +1497,6 @@
             <a:r>
               <a:rPr lang="en-GB" sz="1400" smtClean="0">
                 <a:solidFill>
-                  <a:schemeClr val="bg1">
-                    <a:lumMod val="65000"/>
-                  </a:schemeClr>
-                </a:solidFill>
-                <a:latin typeface="Calibri"/>
-              </a:rPr>
-              <a:t>skos:Concept</a:t>
-            </a:r>
-            <a:endParaRPr sz="1600">
-              <a:solidFill>
-                <a:schemeClr val="bg1">
-                  <a:lumMod val="65000"/>
-                </a:schemeClr>
-              </a:solidFill>
-            </a:endParaRPr>
-          </a:p>
-        </p:txBody>
-      </p:sp>
-      <p:cxnSp>
-        <p:nvCxnSpPr>
-          <p:cNvPr id="172" name="Elbow Connector 171"/>
-          <p:cNvCxnSpPr>
-            <a:stCxn id="42" idx="2"/>
-            <a:endCxn id="175" idx="1"/>
-          </p:cNvCxnSpPr>
-          <p:nvPr/>
-        </p:nvCxnSpPr>
-        <p:spPr>
-          <a:xfrm rot="16200000" flipH="1">
-            <a:off x="6769072" y="3909532"/>
-            <a:ext cx="427952" cy="178564"/>
-          </a:xfrm>
-          <a:prstGeom prst="bentConnector2">
-            <a:avLst/>
-          </a:prstGeom>
-          <a:ln>
-            <a:solidFill>
-              <a:schemeClr val="tx1"/>
-            </a:solidFill>
-            <a:tailEnd type="triangle"/>
-          </a:ln>
-        </p:spPr>
-        <p:style>
-          <a:lnRef idx="1">
-            <a:schemeClr val="accent1"/>
-          </a:lnRef>
-          <a:fillRef idx="0">
-            <a:schemeClr val="accent1"/>
-          </a:fillRef>
-          <a:effectRef idx="0">
-            <a:schemeClr val="accent1"/>
-          </a:effectRef>
-          <a:fontRef idx="minor">
-            <a:schemeClr val="tx1"/>
-          </a:fontRef>
-        </p:style>
-      </p:cxnSp>
-      <p:sp>
-        <p:nvSpPr>
-          <p:cNvPr id="175" name="CustomShape 1"/>
-          <p:cNvSpPr/>
-          <p:nvPr/>
-        </p:nvSpPr>
-        <p:spPr>
-          <a:xfrm>
-            <a:off x="7072330" y="4070590"/>
-            <a:ext cx="1714512" cy="284400"/>
-          </a:xfrm>
-          <a:prstGeom prst="rect">
-            <a:avLst/>
-          </a:prstGeom>
-          <a:solidFill>
-            <a:srgbClr val="FFFFFF"/>
-          </a:solidFill>
-          <a:ln w="12600">
-            <a:solidFill>
-              <a:srgbClr val="000000"/>
-            </a:solidFill>
-            <a:round/>
-          </a:ln>
-          <a:effectLst>
-            <a:outerShdw blurRad="50800" dist="38100" dir="2700000" algn="tl" rotWithShape="0">
-              <a:prstClr val="black">
-                <a:alpha val="40000"/>
-              </a:prstClr>
-            </a:outerShdw>
-          </a:effectLst>
-        </p:spPr>
-        <p:txBody>
-          <a:bodyPr lIns="90000" tIns="45000" rIns="90000" bIns="45000" anchor="ctr"/>
-          <a:lstStyle/>
-          <a:p>
-            <a:pPr algn="ctr"/>
-            <a:r>
-              <a:rPr lang="en-GB" sz="1400" smtClean="0">
-                <a:solidFill>
                   <a:srgbClr val="000000"/>
                 </a:solidFill>
                 <a:latin typeface="Calibri"/>
@@ -1609,8 +1550,8 @@
         </p:nvCxnSpPr>
         <p:spPr>
           <a:xfrm rot="10800000" flipV="1">
-            <a:off x="4393405" y="1428060"/>
-            <a:ext cx="458378" cy="786494"/>
+            <a:off x="4536281" y="1428060"/>
+            <a:ext cx="315502" cy="786494"/>
           </a:xfrm>
           <a:prstGeom prst="bentConnector2">
             <a:avLst/>
@@ -1645,7 +1586,7 @@
         </p:nvSpPr>
         <p:spPr>
           <a:xfrm>
-            <a:off x="4198109" y="1714488"/>
+            <a:off x="4340985" y="1714488"/>
             <a:ext cx="873957" cy="261610"/>
           </a:xfrm>
           <a:prstGeom prst="rect">
@@ -1677,7 +1618,7 @@
         </p:nvSpPr>
         <p:spPr>
           <a:xfrm>
-            <a:off x="4286248" y="2500306"/>
+            <a:off x="4429124" y="2500306"/>
             <a:ext cx="214314" cy="142876"/>
           </a:xfrm>
           <a:prstGeom prst="triangle">
@@ -1734,8 +1675,8 @@
         </p:nvSpPr>
         <p:spPr>
           <a:xfrm>
-            <a:off x="785786" y="1646549"/>
-            <a:ext cx="1428760" cy="284400"/>
+            <a:off x="428596" y="1646549"/>
+            <a:ext cx="1285884" cy="284400"/>
           </a:xfrm>
           <a:prstGeom prst="rect">
             <a:avLst/>
@@ -1783,8 +1724,8 @@
         </p:nvSpPr>
         <p:spPr>
           <a:xfrm>
-            <a:off x="785786" y="2573891"/>
-            <a:ext cx="1428760" cy="284400"/>
+            <a:off x="1643042" y="2430220"/>
+            <a:ext cx="1143008" cy="284400"/>
           </a:xfrm>
           <a:prstGeom prst="rect">
             <a:avLst/>
@@ -1828,20 +1769,18 @@
         <p:nvCxnSpPr>
           <p:cNvPr id="10" name="Elbow Connector 9"/>
           <p:cNvCxnSpPr>
-            <a:stCxn id="3" idx="2"/>
+            <a:stCxn id="3" idx="3"/>
             <a:endCxn id="4" idx="0"/>
           </p:cNvCxnSpPr>
           <p:nvPr/>
         </p:nvCxnSpPr>
         <p:spPr>
-          <a:xfrm rot="5400000">
-            <a:off x="1178695" y="2252420"/>
-            <a:ext cx="642942" cy="1588"/>
-          </a:xfrm>
-          <a:prstGeom prst="bentConnector3">
-            <a:avLst>
-              <a:gd name="adj1" fmla="val 50000"/>
-            </a:avLst>
+          <a:xfrm>
+            <a:off x="1714480" y="1788749"/>
+            <a:ext cx="500066" cy="641471"/>
+          </a:xfrm>
+          <a:prstGeom prst="bentConnector2">
+            <a:avLst/>
           </a:prstGeom>
           <a:ln>
             <a:solidFill>
@@ -1873,7 +1812,7 @@
         </p:nvSpPr>
         <p:spPr>
           <a:xfrm>
-            <a:off x="1142976" y="2123238"/>
+            <a:off x="1785918" y="2000240"/>
             <a:ext cx="663964" cy="261610"/>
           </a:xfrm>
           <a:prstGeom prst="rect">
@@ -1905,7 +1844,7 @@
         </p:nvSpPr>
         <p:spPr>
           <a:xfrm>
-            <a:off x="785786" y="3501791"/>
+            <a:off x="357158" y="3143248"/>
             <a:ext cx="1428760" cy="284400"/>
           </a:xfrm>
           <a:prstGeom prst="rect">
@@ -1951,19 +1890,17 @@
           <p:cNvPr id="23" name="Elbow Connector 22"/>
           <p:cNvCxnSpPr>
             <a:stCxn id="4" idx="2"/>
-            <a:endCxn id="22" idx="0"/>
+            <a:endCxn id="22" idx="3"/>
           </p:cNvCxnSpPr>
           <p:nvPr/>
         </p:nvCxnSpPr>
         <p:spPr>
           <a:xfrm rot="5400000">
-            <a:off x="1178416" y="3180041"/>
-            <a:ext cx="643500" cy="1588"/>
-          </a:xfrm>
-          <a:prstGeom prst="bentConnector3">
-            <a:avLst>
-              <a:gd name="adj1" fmla="val 50000"/>
-            </a:avLst>
+            <a:off x="1714818" y="2785720"/>
+            <a:ext cx="570828" cy="428628"/>
+          </a:xfrm>
+          <a:prstGeom prst="bentConnector2">
+            <a:avLst/>
           </a:prstGeom>
           <a:ln>
             <a:solidFill>
@@ -1995,7 +1932,7 @@
         </p:nvSpPr>
         <p:spPr>
           <a:xfrm>
-            <a:off x="928662" y="3051138"/>
+            <a:off x="1857356" y="2786058"/>
             <a:ext cx="1109599" cy="261610"/>
           </a:xfrm>
           <a:prstGeom prst="rect">
@@ -2023,19 +1960,19 @@
         <p:nvCxnSpPr>
           <p:cNvPr id="27" name="Elbow Connector 26"/>
           <p:cNvCxnSpPr>
-            <a:stCxn id="22" idx="1"/>
-            <a:endCxn id="3" idx="1"/>
+            <a:stCxn id="22" idx="0"/>
+            <a:endCxn id="3" idx="2"/>
           </p:cNvCxnSpPr>
           <p:nvPr/>
         </p:nvCxnSpPr>
         <p:spPr>
-          <a:xfrm rot="10800000">
-            <a:off x="785786" y="1788749"/>
-            <a:ext cx="1588" cy="1855242"/>
+          <a:xfrm rot="5400000" flipH="1" flipV="1">
+            <a:off x="465389" y="2537099"/>
+            <a:ext cx="1212299" cy="1588"/>
           </a:xfrm>
           <a:prstGeom prst="bentConnector3">
             <a:avLst>
-              <a:gd name="adj1" fmla="val 14395466"/>
+              <a:gd name="adj1" fmla="val 50000"/>
             </a:avLst>
           </a:prstGeom>
           <a:ln>
@@ -2068,7 +2005,7 @@
         </p:nvSpPr>
         <p:spPr>
           <a:xfrm>
-            <a:off x="86765" y="2167258"/>
+            <a:off x="658269" y="2310134"/>
             <a:ext cx="841897" cy="261610"/>
           </a:xfrm>
           <a:prstGeom prst="rect">
@@ -2103,8 +2040,8 @@
         </p:nvCxnSpPr>
         <p:spPr>
           <a:xfrm rot="5400000" flipH="1" flipV="1">
-            <a:off x="1126808" y="1157801"/>
-            <a:ext cx="862107" cy="115391"/>
+            <a:off x="912494" y="943487"/>
+            <a:ext cx="862107" cy="544019"/>
           </a:xfrm>
           <a:prstGeom prst="bentConnector3">
             <a:avLst>
@@ -2141,7 +2078,7 @@
         </p:nvSpPr>
         <p:spPr>
           <a:xfrm>
-            <a:off x="1000100" y="1238565"/>
+            <a:off x="642910" y="1285860"/>
             <a:ext cx="926857" cy="261610"/>
           </a:xfrm>
           <a:prstGeom prst="rect">
@@ -2225,8 +2162,8 @@
         </p:nvCxnSpPr>
         <p:spPr>
           <a:xfrm flipV="1">
-            <a:off x="2214546" y="1927450"/>
-            <a:ext cx="964413" cy="788641"/>
+            <a:off x="2786050" y="1927450"/>
+            <a:ext cx="392909" cy="644970"/>
           </a:xfrm>
           <a:prstGeom prst="bentConnector2">
             <a:avLst/>
@@ -2261,7 +2198,7 @@
         </p:nvSpPr>
         <p:spPr>
           <a:xfrm>
-            <a:off x="2285984" y="2571744"/>
+            <a:off x="2571736" y="2095820"/>
             <a:ext cx="1234633" cy="261610"/>
           </a:xfrm>
           <a:prstGeom prst="rect">
@@ -2454,7 +2391,7 @@
         </p:nvSpPr>
         <p:spPr>
           <a:xfrm>
-            <a:off x="4572000" y="3931042"/>
+            <a:off x="4286248" y="3931042"/>
             <a:ext cx="1869871" cy="1569660"/>
           </a:xfrm>
           <a:prstGeom prst="rect">
@@ -2540,7 +2477,7 @@
                 </a:solidFill>
                 <a:latin typeface="Calibri"/>
               </a:rPr>
-              <a:t>sdnx:TimeRole</a:t>
+              <a:t>sdmx:TimeRole</a:t>
             </a:r>
           </a:p>
           <a:p>
@@ -2608,7 +2545,7 @@
         </p:nvCxnSpPr>
         <p:spPr>
           <a:xfrm rot="5400000" flipH="1" flipV="1">
-            <a:off x="4284584" y="3323507"/>
+            <a:off x="4427460" y="3323507"/>
             <a:ext cx="217642" cy="1588"/>
           </a:xfrm>
           <a:prstGeom prst="bentConnector3">
@@ -2649,7 +2586,7 @@
         </p:nvSpPr>
         <p:spPr>
           <a:xfrm>
-            <a:off x="3786182" y="2786058"/>
+            <a:off x="3929058" y="2786058"/>
             <a:ext cx="1214446" cy="284400"/>
           </a:xfrm>
           <a:prstGeom prst="rect">
@@ -2708,7 +2645,7 @@
         </p:nvSpPr>
         <p:spPr>
           <a:xfrm>
-            <a:off x="4286248" y="3071810"/>
+            <a:off x="4429124" y="3071810"/>
             <a:ext cx="214314" cy="142876"/>
           </a:xfrm>
           <a:prstGeom prst="triangle">
@@ -2961,8 +2898,8 @@
         </p:nvSpPr>
         <p:spPr>
           <a:xfrm>
-            <a:off x="4714876" y="952812"/>
-            <a:ext cx="1077539" cy="261610"/>
+            <a:off x="4214810" y="952812"/>
+            <a:ext cx="1609736" cy="261610"/>
           </a:xfrm>
           <a:prstGeom prst="rect">
             <a:avLst/>
@@ -2979,7 +2916,7 @@
           <a:p>
             <a:r>
               <a:rPr lang="en-GB" sz="1100" smtClean="0"/>
-              <a:t>qb:component</a:t>
+              <a:t>qb:componentProperty</a:t>
             </a:r>
             <a:endParaRPr lang="en-GB" sz="1100"/>
           </a:p>
@@ -3097,6 +3034,65 @@
                 <a:schemeClr val="accent1"/>
               </a:solidFill>
               <a:latin typeface="Calibri" pitchFamily="34" charset="0"/>
+            </a:endParaRPr>
+          </a:p>
+        </p:txBody>
+      </p:sp>
+      <p:sp>
+        <p:nvSpPr>
+          <p:cNvPr id="171" name="CustomShape 1"/>
+          <p:cNvSpPr/>
+          <p:nvPr/>
+        </p:nvSpPr>
+        <p:spPr>
+          <a:xfrm>
+            <a:off x="3929058" y="2214554"/>
+            <a:ext cx="1214446" cy="284400"/>
+          </a:xfrm>
+          <a:prstGeom prst="rect">
+            <a:avLst/>
+          </a:prstGeom>
+          <a:solidFill>
+            <a:srgbClr val="FFFFFF"/>
+          </a:solidFill>
+          <a:ln w="12600">
+            <a:solidFill>
+              <a:schemeClr val="bg1">
+                <a:lumMod val="65000"/>
+              </a:schemeClr>
+            </a:solidFill>
+            <a:round/>
+          </a:ln>
+          <a:effectLst>
+            <a:outerShdw blurRad="50800" dist="38100" dir="2700000" algn="tl" rotWithShape="0">
+              <a:prstClr val="black">
+                <a:alpha val="40000"/>
+              </a:prstClr>
+            </a:outerShdw>
+          </a:effectLst>
+        </p:spPr>
+        <p:txBody>
+          <a:bodyPr lIns="90000" tIns="45000" rIns="90000" bIns="45000" anchor="ctr"/>
+          <a:lstStyle/>
+          <a:p>
+            <a:pPr algn="ctr"/>
+            <a:r>
+              <a:rPr lang="en-GB" sz="1400" smtClean="0">
+                <a:solidFill>
+                  <a:schemeClr val="bg1">
+                    <a:lumMod val="65000"/>
+                  </a:schemeClr>
+                </a:solidFill>
+                <a:latin typeface="Calibri"/>
+              </a:rPr>
+              <a:t>skos:Concept</a:t>
+            </a:r>
+            <a:endParaRPr sz="1600">
+              <a:solidFill>
+                <a:schemeClr val="bg1">
+                  <a:lumMod val="65000"/>
+                </a:schemeClr>
+              </a:solidFill>
             </a:endParaRPr>
           </a:p>
         </p:txBody>

</xml_diff>

<commit_message>
Updated diagram to match multi-measure changes, plus minor typo fixes.
</commit_message>
<xml_diff>
--- a/specs/src/main/html/qb-fig1.pptx
+++ b/specs/src/main/html/qb-fig1.pptx
@@ -621,7 +621,7 @@
         </p:nvSpPr>
         <p:spPr>
           <a:xfrm>
-            <a:off x="4851783" y="1285860"/>
+            <a:off x="4851783" y="2000240"/>
             <a:ext cx="2286016" cy="284400"/>
           </a:xfrm>
           <a:prstGeom prst="rect">
@@ -669,7 +669,7 @@
         </p:nvSpPr>
         <p:spPr>
           <a:xfrm>
-            <a:off x="6429419" y="1715840"/>
+            <a:off x="6429419" y="2430220"/>
             <a:ext cx="2071702" cy="284400"/>
           </a:xfrm>
           <a:prstGeom prst="rect">
@@ -717,7 +717,7 @@
         </p:nvSpPr>
         <p:spPr>
           <a:xfrm>
-            <a:off x="6429419" y="2357430"/>
+            <a:off x="6429419" y="3071810"/>
             <a:ext cx="2071702" cy="284400"/>
           </a:xfrm>
           <a:prstGeom prst="rect">
@@ -765,7 +765,7 @@
         </p:nvSpPr>
         <p:spPr>
           <a:xfrm>
-            <a:off x="6429419" y="2787410"/>
+            <a:off x="6429419" y="3501790"/>
             <a:ext cx="2071702" cy="284400"/>
           </a:xfrm>
           <a:prstGeom prst="rect">
@@ -813,7 +813,7 @@
         </p:nvSpPr>
         <p:spPr>
           <a:xfrm>
-            <a:off x="5857915" y="3500438"/>
+            <a:off x="5857915" y="4214818"/>
             <a:ext cx="2071702" cy="284400"/>
           </a:xfrm>
           <a:prstGeom prst="rect">
@@ -858,13 +858,12 @@
           <p:cNvPr id="43" name="Elbow Connector 42"/>
           <p:cNvCxnSpPr>
             <a:stCxn id="39" idx="1"/>
-            <a:endCxn id="47" idx="3"/>
           </p:cNvCxnSpPr>
           <p:nvPr/>
         </p:nvCxnSpPr>
         <p:spPr>
           <a:xfrm rot="10800000">
-            <a:off x="5965073" y="1714488"/>
+            <a:off x="5965073" y="2428868"/>
             <a:ext cx="464347" cy="143552"/>
           </a:xfrm>
           <a:prstGeom prst="bentConnector2">
@@ -900,7 +899,7 @@
         </p:nvSpPr>
         <p:spPr>
           <a:xfrm>
-            <a:off x="5857915" y="1571612"/>
+            <a:off x="5857915" y="2285992"/>
             <a:ext cx="214314" cy="142876"/>
           </a:xfrm>
           <a:prstGeom prst="triangle">
@@ -945,13 +944,12 @@
           <p:cNvPr id="49" name="Elbow Connector 42"/>
           <p:cNvCxnSpPr>
             <a:stCxn id="41" idx="1"/>
-            <a:endCxn id="47" idx="3"/>
           </p:cNvCxnSpPr>
           <p:nvPr/>
         </p:nvCxnSpPr>
         <p:spPr>
           <a:xfrm rot="10800000">
-            <a:off x="5965073" y="1714488"/>
+            <a:off x="5965073" y="2428868"/>
             <a:ext cx="464347" cy="1215122"/>
           </a:xfrm>
           <a:prstGeom prst="bentConnector2">
@@ -984,13 +982,12 @@
           <p:cNvPr id="52" name="Elbow Connector 42"/>
           <p:cNvCxnSpPr>
             <a:stCxn id="42" idx="1"/>
-            <a:endCxn id="47" idx="3"/>
           </p:cNvCxnSpPr>
           <p:nvPr/>
         </p:nvCxnSpPr>
         <p:spPr>
           <a:xfrm rot="10800000" flipH="1">
-            <a:off x="5857914" y="1714488"/>
+            <a:off x="5857914" y="2428868"/>
             <a:ext cx="107157" cy="1928150"/>
           </a:xfrm>
           <a:prstGeom prst="bentConnector4">
@@ -1026,13 +1023,12 @@
           <p:cNvPr id="53" name="Elbow Connector 42"/>
           <p:cNvCxnSpPr>
             <a:stCxn id="40" idx="1"/>
-            <a:endCxn id="47" idx="3"/>
           </p:cNvCxnSpPr>
           <p:nvPr/>
         </p:nvCxnSpPr>
         <p:spPr>
           <a:xfrm rot="10800000">
-            <a:off x="5965073" y="1714488"/>
+            <a:off x="5965073" y="2428868"/>
             <a:ext cx="464347" cy="785142"/>
           </a:xfrm>
           <a:prstGeom prst="bentConnector2">
@@ -1071,8 +1067,8 @@
         </p:nvCxnSpPr>
         <p:spPr>
           <a:xfrm rot="16200000" flipH="1">
-            <a:off x="5497033" y="788102"/>
-            <a:ext cx="501418" cy="494097"/>
+            <a:off x="5139843" y="1145292"/>
+            <a:ext cx="1215798" cy="494097"/>
           </a:xfrm>
           <a:prstGeom prst="bentConnector3">
             <a:avLst>
@@ -1109,7 +1105,7 @@
         </p:nvSpPr>
         <p:spPr>
           <a:xfrm>
-            <a:off x="3714744" y="3432328"/>
+            <a:off x="3714744" y="4146708"/>
             <a:ext cx="1643074" cy="284400"/>
           </a:xfrm>
           <a:prstGeom prst="rect">
@@ -1165,7 +1161,7 @@
         </p:nvCxnSpPr>
         <p:spPr>
           <a:xfrm rot="5400000" flipH="1" flipV="1">
-            <a:off x="4464843" y="2714620"/>
+            <a:off x="4464843" y="3429000"/>
             <a:ext cx="142876" cy="1588"/>
           </a:xfrm>
           <a:prstGeom prst="bentConnector3">
@@ -1206,7 +1202,7 @@
         </p:nvSpPr>
         <p:spPr>
           <a:xfrm>
-            <a:off x="4000496" y="3714752"/>
+            <a:off x="4000496" y="4429132"/>
             <a:ext cx="214314" cy="142876"/>
           </a:xfrm>
           <a:prstGeom prst="triangle">
@@ -1265,7 +1261,7 @@
         </p:nvCxnSpPr>
         <p:spPr>
           <a:xfrm rot="10800000">
-            <a:off x="4107653" y="3857628"/>
+            <a:off x="4107653" y="4572008"/>
             <a:ext cx="169070" cy="421192"/>
           </a:xfrm>
           <a:prstGeom prst="bentConnector2">
@@ -1306,7 +1302,7 @@
         </p:nvCxnSpPr>
         <p:spPr>
           <a:xfrm rot="10800000">
-            <a:off x="4107653" y="3857628"/>
+            <a:off x="4107653" y="4572008"/>
             <a:ext cx="169040" cy="713704"/>
           </a:xfrm>
           <a:prstGeom prst="bentConnector2">
@@ -1347,7 +1343,7 @@
         </p:nvCxnSpPr>
         <p:spPr>
           <a:xfrm rot="10800000">
-            <a:off x="4107653" y="3857628"/>
+            <a:off x="4107653" y="4572008"/>
             <a:ext cx="169070" cy="994048"/>
           </a:xfrm>
           <a:prstGeom prst="bentConnector2">
@@ -1388,7 +1384,7 @@
         </p:nvCxnSpPr>
         <p:spPr>
           <a:xfrm rot="10800000">
-            <a:off x="4107653" y="3857628"/>
+            <a:off x="4107653" y="4572008"/>
             <a:ext cx="169070" cy="1281152"/>
           </a:xfrm>
           <a:prstGeom prst="bentConnector2">
@@ -1430,7 +1426,7 @@
         </p:nvCxnSpPr>
         <p:spPr>
           <a:xfrm rot="16200000" flipH="1">
-            <a:off x="6769072" y="3909532"/>
+            <a:off x="6769072" y="4623912"/>
             <a:ext cx="427952" cy="178564"/>
           </a:xfrm>
           <a:prstGeom prst="bentConnector2">
@@ -1466,7 +1462,7 @@
         </p:nvSpPr>
         <p:spPr>
           <a:xfrm>
-            <a:off x="7072330" y="4070590"/>
+            <a:off x="7072330" y="4784970"/>
             <a:ext cx="1714512" cy="284400"/>
           </a:xfrm>
           <a:prstGeom prst="rect">
@@ -1515,7 +1511,7 @@
         </p:nvSpPr>
         <p:spPr>
           <a:xfrm>
-            <a:off x="6166313" y="3856276"/>
+            <a:off x="6166313" y="4570656"/>
             <a:ext cx="906017" cy="261610"/>
           </a:xfrm>
           <a:prstGeom prst="rect">
@@ -1550,7 +1546,7 @@
         </p:nvCxnSpPr>
         <p:spPr>
           <a:xfrm rot="10800000" flipV="1">
-            <a:off x="4536281" y="1428060"/>
+            <a:off x="4536281" y="2142440"/>
             <a:ext cx="315502" cy="786494"/>
           </a:xfrm>
           <a:prstGeom prst="bentConnector2">
@@ -1586,7 +1582,7 @@
         </p:nvSpPr>
         <p:spPr>
           <a:xfrm>
-            <a:off x="4340985" y="1714488"/>
+            <a:off x="4340985" y="1524316"/>
             <a:ext cx="873957" cy="261610"/>
           </a:xfrm>
           <a:prstGeom prst="rect">
@@ -1618,7 +1614,7 @@
         </p:nvSpPr>
         <p:spPr>
           <a:xfrm>
-            <a:off x="4429124" y="2500306"/>
+            <a:off x="4429124" y="3214686"/>
             <a:ext cx="214314" cy="142876"/>
           </a:xfrm>
           <a:prstGeom prst="triangle">
@@ -2391,7 +2387,7 @@
         </p:nvSpPr>
         <p:spPr>
           <a:xfrm>
-            <a:off x="4286248" y="3931042"/>
+            <a:off x="4286248" y="4645422"/>
             <a:ext cx="1869871" cy="1569660"/>
           </a:xfrm>
           <a:prstGeom prst="rect">
@@ -2545,7 +2541,7 @@
         </p:nvCxnSpPr>
         <p:spPr>
           <a:xfrm rot="5400000" flipH="1" flipV="1">
-            <a:off x="4427460" y="3323507"/>
+            <a:off x="4427460" y="4037887"/>
             <a:ext cx="217642" cy="1588"/>
           </a:xfrm>
           <a:prstGeom prst="bentConnector3">
@@ -2586,7 +2582,7 @@
         </p:nvSpPr>
         <p:spPr>
           <a:xfrm>
-            <a:off x="3929058" y="2786058"/>
+            <a:off x="3929058" y="3500438"/>
             <a:ext cx="1214446" cy="284400"/>
           </a:xfrm>
           <a:prstGeom prst="rect">
@@ -2645,7 +2641,7 @@
         </p:nvSpPr>
         <p:spPr>
           <a:xfrm>
-            <a:off x="4429124" y="3071810"/>
+            <a:off x="4429124" y="3786190"/>
             <a:ext cx="214314" cy="142876"/>
           </a:xfrm>
           <a:prstGeom prst="triangle">
@@ -2702,7 +2698,7 @@
         </p:nvSpPr>
         <p:spPr>
           <a:xfrm>
-            <a:off x="7143768" y="4716860"/>
+            <a:off x="7143768" y="5431240"/>
             <a:ext cx="1643074" cy="284400"/>
           </a:xfrm>
           <a:prstGeom prst="rect">
@@ -2758,7 +2754,7 @@
         </p:nvCxnSpPr>
         <p:spPr>
           <a:xfrm rot="5400000" flipH="1" flipV="1">
-            <a:off x="7856484" y="4608039"/>
+            <a:off x="7856484" y="5322419"/>
             <a:ext cx="217642" cy="1588"/>
           </a:xfrm>
           <a:prstGeom prst="bentConnector3">
@@ -2799,7 +2795,7 @@
         </p:nvSpPr>
         <p:spPr>
           <a:xfrm>
-            <a:off x="7858148" y="4356342"/>
+            <a:off x="7858148" y="5070722"/>
             <a:ext cx="214314" cy="142876"/>
           </a:xfrm>
           <a:prstGeom prst="triangle">
@@ -2858,15 +2854,12 @@
           <p:nvPr/>
         </p:nvCxnSpPr>
         <p:spPr>
-          <a:xfrm flipV="1">
-            <a:off x="3786182" y="1285860"/>
-            <a:ext cx="2208609" cy="499390"/>
-          </a:xfrm>
-          <a:prstGeom prst="bentConnector4">
-            <a:avLst>
-              <a:gd name="adj1" fmla="val 15683"/>
-              <a:gd name="adj2" fmla="val 149331"/>
-            </a:avLst>
+          <a:xfrm>
+            <a:off x="3786182" y="1785250"/>
+            <a:ext cx="2208609" cy="214990"/>
+          </a:xfrm>
+          <a:prstGeom prst="bentConnector2">
+            <a:avLst/>
           </a:prstGeom>
           <a:ln>
             <a:solidFill>
@@ -2898,7 +2891,7 @@
         </p:nvSpPr>
         <p:spPr>
           <a:xfrm>
-            <a:off x="4214810" y="952812"/>
+            <a:off x="4500562" y="928670"/>
             <a:ext cx="1609736" cy="261610"/>
           </a:xfrm>
           <a:prstGeom prst="rect">
@@ -2924,13 +2917,13 @@
       </p:sp>
       <p:sp>
         <p:nvSpPr>
-          <p:cNvPr id="76" name="Rounded Rectangle 75"/>
+          <p:cNvPr id="77" name="Rounded Rectangle 76"/>
           <p:cNvSpPr/>
           <p:nvPr/>
         </p:nvSpPr>
         <p:spPr>
           <a:xfrm>
-            <a:off x="7000892" y="3071810"/>
+            <a:off x="7000892" y="2714620"/>
             <a:ext cx="1500198" cy="214314"/>
           </a:xfrm>
           <a:prstGeom prst="roundRect">
@@ -2969,7 +2962,7 @@
                 </a:solidFill>
                 <a:latin typeface="Calibri" pitchFamily="34" charset="0"/>
               </a:rPr>
-              <a:t>qb:obsValue</a:t>
+              <a:t>qb:measureType</a:t>
             </a:r>
             <a:endParaRPr lang="en-GB" sz="1400">
               <a:solidFill>
@@ -2982,71 +2975,13 @@
       </p:sp>
       <p:sp>
         <p:nvSpPr>
-          <p:cNvPr id="77" name="Rounded Rectangle 76"/>
-          <p:cNvSpPr/>
-          <p:nvPr/>
-        </p:nvSpPr>
-        <p:spPr>
-          <a:xfrm>
-            <a:off x="7000892" y="2000240"/>
-            <a:ext cx="1500198" cy="214314"/>
-          </a:xfrm>
-          <a:prstGeom prst="roundRect">
-            <a:avLst/>
-          </a:prstGeom>
-          <a:solidFill>
-            <a:schemeClr val="bg1"/>
-          </a:solidFill>
-          <a:ln w="12700"/>
-        </p:spPr>
-        <p:style>
-          <a:lnRef idx="2">
-            <a:schemeClr val="accent1">
-              <a:shade val="50000"/>
-            </a:schemeClr>
-          </a:lnRef>
-          <a:fillRef idx="1">
-            <a:schemeClr val="accent1"/>
-          </a:fillRef>
-          <a:effectRef idx="0">
-            <a:schemeClr val="accent1"/>
-          </a:effectRef>
-          <a:fontRef idx="minor">
-            <a:schemeClr val="lt1"/>
-          </a:fontRef>
-        </p:style>
-        <p:txBody>
-          <a:bodyPr rtlCol="0" anchor="ctr"/>
-          <a:lstStyle/>
-          <a:p>
-            <a:pPr algn="ctr"/>
-            <a:r>
-              <a:rPr lang="en-GB" sz="1400" smtClean="0">
-                <a:solidFill>
-                  <a:schemeClr val="accent1"/>
-                </a:solidFill>
-                <a:latin typeface="Calibri" pitchFamily="34" charset="0"/>
-              </a:rPr>
-              <a:t>qb:measureType</a:t>
-            </a:r>
-            <a:endParaRPr lang="en-GB" sz="1400">
-              <a:solidFill>
-                <a:schemeClr val="accent1"/>
-              </a:solidFill>
-              <a:latin typeface="Calibri" pitchFamily="34" charset="0"/>
-            </a:endParaRPr>
-          </a:p>
-        </p:txBody>
-      </p:sp>
-      <p:sp>
-        <p:nvSpPr>
           <p:cNvPr id="171" name="CustomShape 1"/>
           <p:cNvSpPr/>
           <p:nvPr/>
         </p:nvSpPr>
         <p:spPr>
           <a:xfrm>
-            <a:off x="3929058" y="2214554"/>
+            <a:off x="3929058" y="2928934"/>
             <a:ext cx="1214446" cy="284400"/>
           </a:xfrm>
           <a:prstGeom prst="rect">
@@ -3097,6 +3032,137 @@
           </a:p>
         </p:txBody>
       </p:sp>
+      <p:sp>
+        <p:nvSpPr>
+          <p:cNvPr id="66" name="Isosceles Triangle 65"/>
+          <p:cNvSpPr/>
+          <p:nvPr/>
+        </p:nvSpPr>
+        <p:spPr>
+          <a:xfrm rot="16200000">
+            <a:off x="6036479" y="1000108"/>
+            <a:ext cx="214314" cy="142876"/>
+          </a:xfrm>
+          <a:prstGeom prst="triangle">
+            <a:avLst/>
+          </a:prstGeom>
+          <a:solidFill>
+            <a:schemeClr val="bg1"/>
+          </a:solidFill>
+          <a:ln w="12700">
+            <a:solidFill>
+              <a:schemeClr val="tx1"/>
+            </a:solidFill>
+          </a:ln>
+        </p:spPr>
+        <p:style>
+          <a:lnRef idx="2">
+            <a:schemeClr val="accent1">
+              <a:shade val="50000"/>
+            </a:schemeClr>
+          </a:lnRef>
+          <a:fillRef idx="1">
+            <a:schemeClr val="accent1"/>
+          </a:fillRef>
+          <a:effectRef idx="0">
+            <a:schemeClr val="accent1"/>
+          </a:effectRef>
+          <a:fontRef idx="minor">
+            <a:schemeClr val="lt1"/>
+          </a:fontRef>
+        </p:style>
+        <p:txBody>
+          <a:bodyPr rtlCol="0" anchor="ctr"/>
+          <a:lstStyle/>
+          <a:p>
+            <a:pPr algn="ctr"/>
+            <a:endParaRPr lang="en-GB"/>
+          </a:p>
+        </p:txBody>
+      </p:sp>
+      <p:sp>
+        <p:nvSpPr>
+          <p:cNvPr id="67" name="TextBox 66"/>
+          <p:cNvSpPr txBox="1"/>
+          <p:nvPr/>
+        </p:nvSpPr>
+        <p:spPr>
+          <a:xfrm>
+            <a:off x="6786578" y="1142984"/>
+            <a:ext cx="1095172" cy="646331"/>
+          </a:xfrm>
+          <a:prstGeom prst="rect">
+            <a:avLst/>
+          </a:prstGeom>
+          <a:noFill/>
+        </p:spPr>
+        <p:txBody>
+          <a:bodyPr wrap="none" rtlCol="0">
+            <a:spAutoFit/>
+          </a:bodyPr>
+          <a:lstStyle/>
+          <a:p>
+            <a:r>
+              <a:rPr lang="en-GB" sz="1200" smtClean="0"/>
+              <a:t>qb:dimension</a:t>
+            </a:r>
+            <a:br>
+              <a:rPr lang="en-GB" sz="1200" smtClean="0"/>
+            </a:br>
+            <a:r>
+              <a:rPr lang="en-GB" sz="1200" smtClean="0"/>
+              <a:t>qb:attribute</a:t>
+            </a:r>
+            <a:r>
+              <a:rPr lang="en-GB" sz="1200" smtClean="0"/>
+              <a:t/>
+            </a:r>
+            <a:br>
+              <a:rPr lang="en-GB" sz="1200" smtClean="0"/>
+            </a:br>
+            <a:r>
+              <a:rPr lang="en-GB" sz="1200" smtClean="0"/>
+              <a:t>qb:measure</a:t>
+            </a:r>
+            <a:endParaRPr lang="en-GB" sz="1200" smtClean="0"/>
+          </a:p>
+        </p:txBody>
+      </p:sp>
+      <p:cxnSp>
+        <p:nvCxnSpPr>
+          <p:cNvPr id="70" name="Elbow Connector 69"/>
+          <p:cNvCxnSpPr>
+            <a:stCxn id="66" idx="3"/>
+            <a:endCxn id="67" idx="1"/>
+          </p:cNvCxnSpPr>
+          <p:nvPr/>
+        </p:nvCxnSpPr>
+        <p:spPr>
+          <a:xfrm>
+            <a:off x="6215074" y="1071546"/>
+            <a:ext cx="571504" cy="394604"/>
+          </a:xfrm>
+          <a:prstGeom prst="bentConnector3">
+            <a:avLst>
+              <a:gd name="adj1" fmla="val 50000"/>
+            </a:avLst>
+          </a:prstGeom>
+        </p:spPr>
+        <p:style>
+          <a:lnRef idx="1">
+            <a:schemeClr val="accent1"/>
+          </a:lnRef>
+          <a:fillRef idx="0">
+            <a:schemeClr val="accent1"/>
+          </a:fillRef>
+          <a:effectRef idx="0">
+            <a:schemeClr val="accent1"/>
+          </a:effectRef>
+          <a:fontRef idx="minor">
+            <a:schemeClr val="tx1"/>
+          </a:fontRef>
+        </p:style>
+      </p:cxnSp>
     </p:spTree>
   </p:cSld>
   <p:clrMapOvr>

</xml_diff>

<commit_message>
Draft of updated documentation
</commit_message>
<xml_diff>
--- a/specs/src/main/html/qb-fig1.pptx
+++ b/specs/src/main/html/qb-fig1.pptx
@@ -1582,7 +1582,7 @@
         </p:nvSpPr>
         <p:spPr>
           <a:xfrm>
-            <a:off x="4340985" y="1524316"/>
+            <a:off x="4143372" y="2381572"/>
             <a:ext cx="873957" cy="261610"/>
           </a:xfrm>
           <a:prstGeom prst="rect">
@@ -3113,10 +3113,6 @@
               <a:rPr lang="en-GB" sz="1200" smtClean="0"/>
               <a:t>qb:attribute</a:t>
             </a:r>
-            <a:r>
-              <a:rPr lang="en-GB" sz="1200" smtClean="0"/>
-              <a:t/>
-            </a:r>
             <a:br>
               <a:rPr lang="en-GB" sz="1200" smtClean="0"/>
             </a:br>
@@ -3124,7 +3120,6 @@
               <a:rPr lang="en-GB" sz="1200" smtClean="0"/>
               <a:t>qb:measure</a:t>
             </a:r>
-            <a:endParaRPr lang="en-GB" sz="1200" smtClean="0"/>
           </a:p>
         </p:txBody>
       </p:sp>
@@ -3163,6 +3158,38 @@
           </a:fontRef>
         </p:style>
       </p:cxnSp>
+      <p:sp>
+        <p:nvSpPr>
+          <p:cNvPr id="69" name="TextBox 68"/>
+          <p:cNvSpPr txBox="1"/>
+          <p:nvPr/>
+        </p:nvSpPr>
+        <p:spPr>
+          <a:xfrm>
+            <a:off x="4071934" y="1524316"/>
+            <a:ext cx="1609736" cy="261610"/>
+          </a:xfrm>
+          <a:prstGeom prst="rect">
+            <a:avLst/>
+          </a:prstGeom>
+          <a:solidFill>
+            <a:schemeClr val="bg1"/>
+          </a:solidFill>
+        </p:spPr>
+        <p:txBody>
+          <a:bodyPr wrap="none" rtlCol="0">
+            <a:spAutoFit/>
+          </a:bodyPr>
+          <a:lstStyle/>
+          <a:p>
+            <a:r>
+              <a:rPr lang="en-GB" sz="1100" smtClean="0"/>
+              <a:t>qb:componentProperty</a:t>
+            </a:r>
+            <a:endParaRPr lang="en-GB" sz="1100"/>
+          </a:p>
+        </p:txBody>
+      </p:sp>
     </p:spTree>
   </p:cSld>
   <p:clrMapOvr>

</xml_diff>

<commit_message>
Updated documentation and diagram to account for the addition of qb:subSlice
</commit_message>
<xml_diff>
--- a/specs/src/main/html/qb-fig1.pptx
+++ b/specs/src/main/html/qb-fig1.pptx
@@ -1840,7 +1840,7 @@
         </p:nvSpPr>
         <p:spPr>
           <a:xfrm>
-            <a:off x="357158" y="3143248"/>
+            <a:off x="357158" y="3644666"/>
             <a:ext cx="1428760" cy="284400"/>
           </a:xfrm>
           <a:prstGeom prst="rect">
@@ -1892,8 +1892,8 @@
         </p:nvCxnSpPr>
         <p:spPr>
           <a:xfrm rot="5400000">
-            <a:off x="1714818" y="2785720"/>
-            <a:ext cx="570828" cy="428628"/>
+            <a:off x="1464109" y="3036429"/>
+            <a:ext cx="1072246" cy="428628"/>
           </a:xfrm>
           <a:prstGeom prst="bentConnector2">
             <a:avLst/>
@@ -1928,7 +1928,7 @@
         </p:nvSpPr>
         <p:spPr>
           <a:xfrm>
-            <a:off x="1857356" y="2786058"/>
+            <a:off x="1857356" y="3381704"/>
             <a:ext cx="1109599" cy="261610"/>
           </a:xfrm>
           <a:prstGeom prst="rect">
@@ -1945,10 +1945,10 @@
           <a:lstStyle/>
           <a:p>
             <a:r>
-              <a:rPr lang="en-GB" sz="1100" smtClean="0"/>
+              <a:rPr lang="en-GB" sz="1100" dirty="0" err="1" smtClean="0"/>
               <a:t>qb:observation</a:t>
             </a:r>
-            <a:endParaRPr lang="en-GB" sz="1100"/>
+            <a:endParaRPr lang="en-GB" sz="1100" dirty="0"/>
           </a:p>
         </p:txBody>
       </p:sp>
@@ -1963,8 +1963,8 @@
         </p:nvCxnSpPr>
         <p:spPr>
           <a:xfrm rot="5400000" flipH="1" flipV="1">
-            <a:off x="465389" y="2537099"/>
-            <a:ext cx="1212299" cy="1588"/>
+            <a:off x="214680" y="2787808"/>
+            <a:ext cx="1713717" cy="1588"/>
           </a:xfrm>
           <a:prstGeom prst="bentConnector3">
             <a:avLst>
@@ -2211,10 +2211,10 @@
           <a:lstStyle/>
           <a:p>
             <a:r>
-              <a:rPr lang="en-GB" sz="1100" smtClean="0"/>
+              <a:rPr lang="en-GB" sz="1100" dirty="0" err="1" smtClean="0"/>
               <a:t>qb:sliceStructure</a:t>
             </a:r>
-            <a:endParaRPr lang="en-GB" sz="1100"/>
+            <a:endParaRPr lang="en-GB" sz="1100" dirty="0"/>
           </a:p>
         </p:txBody>
       </p:sp>
@@ -3187,6 +3187,131 @@
               <a:t>qb:componentProperty</a:t>
             </a:r>
             <a:endParaRPr lang="en-GB" sz="1100"/>
+          </a:p>
+        </p:txBody>
+      </p:sp>
+      <p:sp>
+        <p:nvSpPr>
+          <p:cNvPr id="98" name="Freeform 97"/>
+          <p:cNvSpPr/>
+          <p:nvPr/>
+        </p:nvSpPr>
+        <p:spPr>
+          <a:xfrm>
+            <a:off x="2571736" y="2678249"/>
+            <a:ext cx="433617" cy="393561"/>
+          </a:xfrm>
+          <a:custGeom>
+            <a:avLst/>
+            <a:gdLst>
+              <a:gd name="connsiteX0" fmla="*/ 294752 w 602901"/>
+              <a:gd name="connsiteY0" fmla="*/ 0 h 393561"/>
+              <a:gd name="connsiteX1" fmla="*/ 566057 w 602901"/>
+              <a:gd name="connsiteY1" fmla="*/ 231112 h 393561"/>
+              <a:gd name="connsiteX2" fmla="*/ 73688 w 602901"/>
+              <a:gd name="connsiteY2" fmla="*/ 361741 h 393561"/>
+              <a:gd name="connsiteX3" fmla="*/ 123930 w 602901"/>
+              <a:gd name="connsiteY3" fmla="*/ 40194 h 393561"/>
+            </a:gdLst>
+            <a:ahLst/>
+            <a:cxnLst>
+              <a:cxn ang="0">
+                <a:pos x="connsiteX0" y="connsiteY0"/>
+              </a:cxn>
+              <a:cxn ang="0">
+                <a:pos x="connsiteX1" y="connsiteY1"/>
+              </a:cxn>
+              <a:cxn ang="0">
+                <a:pos x="connsiteX2" y="connsiteY2"/>
+              </a:cxn>
+              <a:cxn ang="0">
+                <a:pos x="connsiteX3" y="connsiteY3"/>
+              </a:cxn>
+            </a:cxnLst>
+            <a:rect l="l" t="t" r="r" b="b"/>
+            <a:pathLst>
+              <a:path w="602901" h="393561">
+                <a:moveTo>
+                  <a:pt x="294752" y="0"/>
+                </a:moveTo>
+                <a:cubicBezTo>
+                  <a:pt x="448826" y="85411"/>
+                  <a:pt x="602901" y="170822"/>
+                  <a:pt x="566057" y="231112"/>
+                </a:cubicBezTo>
+                <a:cubicBezTo>
+                  <a:pt x="529213" y="291402"/>
+                  <a:pt x="147376" y="393561"/>
+                  <a:pt x="73688" y="361741"/>
+                </a:cubicBezTo>
+                <a:cubicBezTo>
+                  <a:pt x="0" y="329921"/>
+                  <a:pt x="123930" y="40194"/>
+                  <a:pt x="123930" y="40194"/>
+                </a:cubicBezTo>
+              </a:path>
+            </a:pathLst>
+          </a:custGeom>
+          <a:ln>
+            <a:solidFill>
+              <a:schemeClr val="tx1"/>
+            </a:solidFill>
+            <a:headEnd type="none" w="med" len="med"/>
+            <a:tailEnd type="triangle" w="med" len="med"/>
+          </a:ln>
+        </p:spPr>
+        <p:style>
+          <a:lnRef idx="1">
+            <a:schemeClr val="accent1"/>
+          </a:lnRef>
+          <a:fillRef idx="0">
+            <a:schemeClr val="accent1"/>
+          </a:fillRef>
+          <a:effectRef idx="0">
+            <a:schemeClr val="accent1"/>
+          </a:effectRef>
+          <a:fontRef idx="minor">
+            <a:schemeClr val="tx1"/>
+          </a:fontRef>
+        </p:style>
+        <p:txBody>
+          <a:bodyPr rtlCol="0" anchor="ctr"/>
+          <a:lstStyle/>
+          <a:p>
+            <a:pPr algn="ctr"/>
+            <a:endParaRPr lang="en-GB"/>
+          </a:p>
+        </p:txBody>
+      </p:sp>
+      <p:sp>
+        <p:nvSpPr>
+          <p:cNvPr id="99" name="TextBox 98"/>
+          <p:cNvSpPr txBox="1"/>
+          <p:nvPr/>
+        </p:nvSpPr>
+        <p:spPr>
+          <a:xfrm>
+            <a:off x="2724136" y="2810200"/>
+            <a:ext cx="915635" cy="261610"/>
+          </a:xfrm>
+          <a:prstGeom prst="rect">
+            <a:avLst/>
+          </a:prstGeom>
+          <a:solidFill>
+            <a:schemeClr val="bg1"/>
+          </a:solidFill>
+        </p:spPr>
+        <p:txBody>
+          <a:bodyPr wrap="none" rtlCol="0">
+            <a:spAutoFit/>
+          </a:bodyPr>
+          <a:lstStyle/>
+          <a:p>
+            <a:r>
+              <a:rPr lang="en-GB" sz="1100" dirty="0" err="1" smtClean="0"/>
+              <a:t>qb:subSlice</a:t>
+            </a:r>
+            <a:endParaRPr lang="en-GB" sz="1100" dirty="0"/>
           </a:p>
         </p:txBody>
       </p:sp>

</xml_diff>

<commit_message>
Applied patch and changes from csarven, Issue 43
</commit_message>
<xml_diff>
--- a/specs/src/main/html/qb-fig1.pptx
+++ b/specs/src/main/html/qb-fig1.pptx
@@ -2002,7 +2002,7 @@
         <p:spPr>
           <a:xfrm>
             <a:off x="658269" y="2310134"/>
-            <a:ext cx="841897" cy="261610"/>
+            <a:ext cx="865943" cy="261610"/>
           </a:xfrm>
           <a:prstGeom prst="rect">
             <a:avLst/>
@@ -2019,9 +2019,9 @@
           <a:p>
             <a:r>
               <a:rPr lang="en-GB" sz="1100" smtClean="0"/>
-              <a:t>qb:dataset</a:t>
-            </a:r>
-            <a:endParaRPr lang="en-GB" sz="1100"/>
+              <a:t>qb:dataSet</a:t>
+            </a:r>
+            <a:endParaRPr lang="en-GB" sz="1100" dirty="0"/>
           </a:p>
         </p:txBody>
       </p:sp>

</xml_diff>

<commit_message>
Updated version of diagram in response to W3C Last Call
</commit_message>
<xml_diff>
--- a/specs/src/main/html/qb-fig1.pptx
+++ b/specs/src/main/html/qb-fig1.pptx
@@ -362,14 +362,14 @@
       </p:grpSpPr>
       <p:sp>
         <p:nvSpPr>
-          <p:cNvPr id="155" name="TextBox 154"/>
+          <p:cNvPr id="177" name="TextBox 176"/>
           <p:cNvSpPr txBox="1"/>
           <p:nvPr/>
         </p:nvSpPr>
         <p:spPr>
           <a:xfrm>
-            <a:off x="2985683" y="381308"/>
-            <a:ext cx="1077539" cy="261610"/>
+            <a:off x="6715140" y="3929066"/>
+            <a:ext cx="906017" cy="261610"/>
           </a:xfrm>
           <a:prstGeom prst="rect">
             <a:avLst/>
@@ -385,10 +385,42 @@
           <a:lstStyle/>
           <a:p>
             <a:r>
-              <a:rPr lang="en-GB" sz="1100" smtClean="0"/>
+              <a:rPr lang="en-GB" sz="1100" noProof="1" smtClean="0"/>
+              <a:t>qb:codeList</a:t>
+            </a:r>
+            <a:endParaRPr lang="en-GB" sz="1100" noProof="1"/>
+          </a:p>
+        </p:txBody>
+      </p:sp>
+      <p:sp>
+        <p:nvSpPr>
+          <p:cNvPr id="155" name="TextBox 154"/>
+          <p:cNvSpPr txBox="1"/>
+          <p:nvPr/>
+        </p:nvSpPr>
+        <p:spPr>
+          <a:xfrm>
+            <a:off x="2699931" y="71414"/>
+            <a:ext cx="1077539" cy="261610"/>
+          </a:xfrm>
+          <a:prstGeom prst="rect">
+            <a:avLst/>
+          </a:prstGeom>
+          <a:solidFill>
+            <a:schemeClr val="bg1"/>
+          </a:solidFill>
+        </p:spPr>
+        <p:txBody>
+          <a:bodyPr wrap="none" rtlCol="0">
+            <a:spAutoFit/>
+          </a:bodyPr>
+          <a:lstStyle/>
+          <a:p>
+            <a:r>
+              <a:rPr lang="en-GB" sz="1100" noProof="1" smtClean="0"/>
               <a:t>qb:component</a:t>
             </a:r>
-            <a:endParaRPr lang="en-GB" sz="1100"/>
+            <a:endParaRPr lang="en-GB" sz="1100" noProof="1"/>
           </a:p>
         </p:txBody>
       </p:sp>
@@ -488,7 +520,7 @@
         </p:nvSpPr>
         <p:spPr>
           <a:xfrm>
-            <a:off x="4357686" y="500042"/>
+            <a:off x="4071934" y="190148"/>
             <a:ext cx="2286016" cy="284400"/>
           </a:xfrm>
           <a:prstGeom prst="rect">
@@ -517,7 +549,7 @@
           <a:p>
             <a:pPr algn="ctr"/>
             <a:r>
-              <a:rPr lang="en-GB" sz="1400" smtClean="0">
+              <a:rPr lang="en-GB" sz="1400" noProof="1" smtClean="0">
                 <a:solidFill>
                   <a:srgbClr val="000000"/>
                 </a:solidFill>
@@ -538,7 +570,7 @@
         </p:nvCxnSpPr>
         <p:spPr>
           <a:xfrm>
-            <a:off x="6643702" y="642242"/>
+            <a:off x="6357950" y="332348"/>
             <a:ext cx="2000264" cy="143552"/>
           </a:xfrm>
           <a:prstGeom prst="bentConnector3">
@@ -576,7 +608,7 @@
         </p:nvSpPr>
         <p:spPr>
           <a:xfrm>
-            <a:off x="6833784" y="428604"/>
+            <a:off x="6548032" y="118710"/>
             <a:ext cx="2310248" cy="553998"/>
           </a:xfrm>
           <a:prstGeom prst="rect">
@@ -593,21 +625,21 @@
           <a:lstStyle/>
           <a:p>
             <a:r>
-              <a:rPr lang="en-GB" sz="1000" smtClean="0"/>
+              <a:rPr lang="en-GB" sz="1000" noProof="1" smtClean="0"/>
               <a:t>qb:componentRequired : boolean</a:t>
             </a:r>
             <a:br>
-              <a:rPr lang="en-GB" sz="1000" smtClean="0"/>
+              <a:rPr lang="en-GB" sz="1000" noProof="1" smtClean="0"/>
             </a:br>
             <a:r>
-              <a:rPr lang="en-GB" sz="1000" smtClean="0"/>
+              <a:rPr lang="en-GB" sz="1000" noProof="1" smtClean="0"/>
               <a:t>qb:componentAttachment : rdfs:Class</a:t>
             </a:r>
             <a:br>
-              <a:rPr lang="en-GB" sz="1000" smtClean="0"/>
+              <a:rPr lang="en-GB" sz="1000" noProof="1" smtClean="0"/>
             </a:br>
             <a:r>
-              <a:rPr lang="en-GB" sz="1000" smtClean="0"/>
+              <a:rPr lang="en-GB" sz="1000" noProof="1" smtClean="0"/>
               <a:t>qb:order : xsd:int</a:t>
             </a:r>
           </a:p>
@@ -621,7 +653,7 @@
         </p:nvSpPr>
         <p:spPr>
           <a:xfrm>
-            <a:off x="4851783" y="2000240"/>
+            <a:off x="4566031" y="1690346"/>
             <a:ext cx="2286016" cy="284400"/>
           </a:xfrm>
           <a:prstGeom prst="rect">
@@ -650,7 +682,7 @@
           <a:p>
             <a:pPr algn="ctr"/>
             <a:r>
-              <a:rPr lang="en-GB" sz="1400" i="1" smtClean="0">
+              <a:rPr lang="en-GB" sz="1400" i="1" noProof="1" smtClean="0">
                 <a:solidFill>
                   <a:srgbClr val="000000"/>
                 </a:solidFill>
@@ -669,7 +701,7 @@
         </p:nvSpPr>
         <p:spPr>
           <a:xfrm>
-            <a:off x="6429419" y="2430220"/>
+            <a:off x="6143667" y="2120326"/>
             <a:ext cx="2071702" cy="284400"/>
           </a:xfrm>
           <a:prstGeom prst="rect">
@@ -698,7 +730,7 @@
           <a:p>
             <a:pPr algn="ctr"/>
             <a:r>
-              <a:rPr lang="en-GB" sz="1400" smtClean="0">
+              <a:rPr lang="en-GB" sz="1400" noProof="1" smtClean="0">
                 <a:solidFill>
                   <a:srgbClr val="000000"/>
                 </a:solidFill>
@@ -717,7 +749,7 @@
         </p:nvSpPr>
         <p:spPr>
           <a:xfrm>
-            <a:off x="6429419" y="3071810"/>
+            <a:off x="6143667" y="2761916"/>
             <a:ext cx="2071702" cy="284400"/>
           </a:xfrm>
           <a:prstGeom prst="rect">
@@ -746,7 +778,7 @@
           <a:p>
             <a:pPr algn="ctr"/>
             <a:r>
-              <a:rPr lang="en-GB" sz="1400" smtClean="0">
+              <a:rPr lang="en-GB" sz="1400" noProof="1" smtClean="0">
                 <a:solidFill>
                   <a:srgbClr val="000000"/>
                 </a:solidFill>
@@ -765,7 +797,7 @@
         </p:nvSpPr>
         <p:spPr>
           <a:xfrm>
-            <a:off x="6429419" y="3501790"/>
+            <a:off x="6143667" y="3191896"/>
             <a:ext cx="2071702" cy="284400"/>
           </a:xfrm>
           <a:prstGeom prst="rect">
@@ -794,7 +826,7 @@
           <a:p>
             <a:pPr algn="ctr"/>
             <a:r>
-              <a:rPr lang="en-GB" sz="1400" smtClean="0">
+              <a:rPr lang="en-GB" sz="1400" noProof="1" smtClean="0">
                 <a:solidFill>
                   <a:srgbClr val="000000"/>
                 </a:solidFill>
@@ -813,7 +845,7 @@
         </p:nvSpPr>
         <p:spPr>
           <a:xfrm>
-            <a:off x="5857915" y="4214818"/>
+            <a:off x="5572163" y="3619172"/>
             <a:ext cx="2071702" cy="284400"/>
           </a:xfrm>
           <a:prstGeom prst="rect">
@@ -842,7 +874,7 @@
           <a:p>
             <a:pPr algn="ctr"/>
             <a:r>
-              <a:rPr lang="en-GB" sz="1400" smtClean="0">
+              <a:rPr lang="en-GB" sz="1400" noProof="1" smtClean="0">
                 <a:solidFill>
                   <a:srgbClr val="000000"/>
                 </a:solidFill>
@@ -863,7 +895,7 @@
         </p:nvCxnSpPr>
         <p:spPr>
           <a:xfrm rot="10800000">
-            <a:off x="5965073" y="2428868"/>
+            <a:off x="5679321" y="2118974"/>
             <a:ext cx="464347" cy="143552"/>
           </a:xfrm>
           <a:prstGeom prst="bentConnector2">
@@ -899,7 +931,7 @@
         </p:nvSpPr>
         <p:spPr>
           <a:xfrm>
-            <a:off x="5857915" y="2285992"/>
+            <a:off x="5572163" y="1976098"/>
             <a:ext cx="214314" cy="142876"/>
           </a:xfrm>
           <a:prstGeom prst="triangle">
@@ -935,7 +967,7 @@
           <a:lstStyle/>
           <a:p>
             <a:pPr algn="ctr"/>
-            <a:endParaRPr lang="en-GB"/>
+            <a:endParaRPr lang="en-GB" noProof="1"/>
           </a:p>
         </p:txBody>
       </p:sp>
@@ -949,7 +981,7 @@
         </p:nvCxnSpPr>
         <p:spPr>
           <a:xfrm rot="10800000">
-            <a:off x="5965073" y="2428868"/>
+            <a:off x="5679321" y="2118974"/>
             <a:ext cx="464347" cy="1215122"/>
           </a:xfrm>
           <a:prstGeom prst="bentConnector2">
@@ -982,18 +1014,19 @@
           <p:cNvPr id="52" name="Elbow Connector 42"/>
           <p:cNvCxnSpPr>
             <a:stCxn id="42" idx="1"/>
+            <a:endCxn id="47" idx="3"/>
           </p:cNvCxnSpPr>
           <p:nvPr/>
         </p:nvCxnSpPr>
         <p:spPr>
           <a:xfrm rot="10800000" flipH="1">
-            <a:off x="5857914" y="2428868"/>
-            <a:ext cx="107157" cy="1928150"/>
+            <a:off x="5572162" y="2118974"/>
+            <a:ext cx="107157" cy="1642398"/>
           </a:xfrm>
           <a:prstGeom prst="bentConnector4">
             <a:avLst>
               <a:gd name="adj1" fmla="val -213332"/>
-              <a:gd name="adj2" fmla="val 53687"/>
+              <a:gd name="adj2" fmla="val 54329"/>
             </a:avLst>
           </a:prstGeom>
           <a:ln>
@@ -1028,7 +1061,7 @@
         </p:nvCxnSpPr>
         <p:spPr>
           <a:xfrm rot="10800000">
-            <a:off x="5965073" y="2428868"/>
+            <a:off x="5679321" y="2118974"/>
             <a:ext cx="464347" cy="785142"/>
           </a:xfrm>
           <a:prstGeom prst="bentConnector2">
@@ -1067,7 +1100,7 @@
         </p:nvCxnSpPr>
         <p:spPr>
           <a:xfrm rot="16200000" flipH="1">
-            <a:off x="5139843" y="1145292"/>
+            <a:off x="4854091" y="835398"/>
             <a:ext cx="1215798" cy="494097"/>
           </a:xfrm>
           <a:prstGeom prst="bentConnector3">
@@ -1105,7 +1138,7 @@
         </p:nvSpPr>
         <p:spPr>
           <a:xfrm>
-            <a:off x="3714744" y="4146708"/>
+            <a:off x="3214678" y="3836814"/>
             <a:ext cx="1643074" cy="284400"/>
           </a:xfrm>
           <a:prstGeom prst="rect">
@@ -1116,10 +1149,7 @@
           </a:solidFill>
           <a:ln w="12600">
             <a:solidFill>
-              <a:schemeClr val="tx2">
-                <a:lumMod val="60000"/>
-                <a:lumOff val="40000"/>
-              </a:schemeClr>
+              <a:schemeClr val="tx1"/>
             </a:solidFill>
             <a:round/>
           </a:ln>
@@ -1137,7 +1167,7 @@
           <a:p>
             <a:pPr algn="ctr"/>
             <a:r>
-              <a:rPr lang="en-GB" sz="1400" smtClean="0">
+              <a:rPr lang="en-GB" sz="1400" noProof="1" smtClean="0">
                 <a:solidFill>
                   <a:schemeClr val="bg1">
                     <a:lumMod val="65000"/>
@@ -1161,7 +1191,7 @@
         </p:nvCxnSpPr>
         <p:spPr>
           <a:xfrm rot="5400000" flipH="1" flipV="1">
-            <a:off x="4464843" y="3429000"/>
+            <a:off x="3964777" y="3119106"/>
             <a:ext cx="142876" cy="1588"/>
           </a:xfrm>
           <a:prstGeom prst="bentConnector3">
@@ -1171,10 +1201,7 @@
           </a:prstGeom>
           <a:ln>
             <a:solidFill>
-              <a:schemeClr val="tx2">
-                <a:lumMod val="60000"/>
-                <a:lumOff val="40000"/>
-              </a:schemeClr>
+              <a:schemeClr val="tx1"/>
             </a:solidFill>
             <a:tailEnd type="none"/>
           </a:ln>
@@ -1202,7 +1229,7 @@
         </p:nvSpPr>
         <p:spPr>
           <a:xfrm>
-            <a:off x="4000496" y="4429132"/>
+            <a:off x="3500430" y="4119238"/>
             <a:ext cx="214314" cy="142876"/>
           </a:xfrm>
           <a:prstGeom prst="triangle">
@@ -1213,10 +1240,7 @@
           </a:solidFill>
           <a:ln w="12700">
             <a:solidFill>
-              <a:schemeClr val="tx2">
-                <a:lumMod val="60000"/>
-                <a:lumOff val="40000"/>
-              </a:schemeClr>
+              <a:schemeClr val="tx1"/>
             </a:solidFill>
           </a:ln>
         </p:spPr>
@@ -1241,7 +1265,7 @@
           <a:lstStyle/>
           <a:p>
             <a:pPr algn="ctr"/>
-            <a:endParaRPr lang="en-GB">
+            <a:endParaRPr lang="en-GB" noProof="1">
               <a:solidFill>
                 <a:schemeClr val="bg1">
                   <a:lumMod val="65000"/>
@@ -1261,7 +1285,7 @@
         </p:nvCxnSpPr>
         <p:spPr>
           <a:xfrm rot="10800000">
-            <a:off x="4107653" y="4572008"/>
+            <a:off x="3607587" y="4262114"/>
             <a:ext cx="169070" cy="421192"/>
           </a:xfrm>
           <a:prstGeom prst="bentConnector2">
@@ -1269,10 +1293,7 @@
           </a:prstGeom>
           <a:ln>
             <a:solidFill>
-              <a:schemeClr val="tx2">
-                <a:lumMod val="60000"/>
-                <a:lumOff val="40000"/>
-              </a:schemeClr>
+              <a:schemeClr val="tx1"/>
             </a:solidFill>
             <a:tailEnd type="none"/>
           </a:ln>
@@ -1302,7 +1323,7 @@
         </p:nvCxnSpPr>
         <p:spPr>
           <a:xfrm rot="10800000">
-            <a:off x="4107653" y="4572008"/>
+            <a:off x="3607587" y="4262114"/>
             <a:ext cx="169040" cy="713704"/>
           </a:xfrm>
           <a:prstGeom prst="bentConnector2">
@@ -1310,10 +1331,7 @@
           </a:prstGeom>
           <a:ln>
             <a:solidFill>
-              <a:schemeClr val="tx2">
-                <a:lumMod val="60000"/>
-                <a:lumOff val="40000"/>
-              </a:schemeClr>
+              <a:schemeClr val="tx1"/>
             </a:solidFill>
             <a:tailEnd type="none"/>
           </a:ln>
@@ -1343,7 +1361,7 @@
         </p:nvCxnSpPr>
         <p:spPr>
           <a:xfrm rot="10800000">
-            <a:off x="4107653" y="4572008"/>
+            <a:off x="3607587" y="4262114"/>
             <a:ext cx="169070" cy="994048"/>
           </a:xfrm>
           <a:prstGeom prst="bentConnector2">
@@ -1351,10 +1369,7 @@
           </a:prstGeom>
           <a:ln>
             <a:solidFill>
-              <a:schemeClr val="tx2">
-                <a:lumMod val="60000"/>
-                <a:lumOff val="40000"/>
-              </a:schemeClr>
+              <a:schemeClr val="tx1"/>
             </a:solidFill>
             <a:tailEnd type="none"/>
           </a:ln>
@@ -1384,7 +1399,7 @@
         </p:nvCxnSpPr>
         <p:spPr>
           <a:xfrm rot="10800000">
-            <a:off x="4107653" y="4572008"/>
+            <a:off x="3607587" y="4262114"/>
             <a:ext cx="169070" cy="1281152"/>
           </a:xfrm>
           <a:prstGeom prst="bentConnector2">
@@ -1392,10 +1407,7 @@
           </a:prstGeom>
           <a:ln>
             <a:solidFill>
-              <a:schemeClr val="tx2">
-                <a:lumMod val="60000"/>
-                <a:lumOff val="40000"/>
-              </a:schemeClr>
+              <a:schemeClr val="tx1"/>
             </a:solidFill>
             <a:tailEnd type="none"/>
           </a:ln>
@@ -1420,17 +1432,18 @@
           <p:cNvPr id="172" name="Elbow Connector 171"/>
           <p:cNvCxnSpPr>
             <a:stCxn id="42" idx="2"/>
-            <a:endCxn id="175" idx="1"/>
           </p:cNvCxnSpPr>
           <p:nvPr/>
         </p:nvCxnSpPr>
         <p:spPr>
-          <a:xfrm rot="16200000" flipH="1">
-            <a:off x="6769072" y="4623912"/>
-            <a:ext cx="427952" cy="178564"/>
-          </a:xfrm>
-          <a:prstGeom prst="bentConnector2">
-            <a:avLst/>
+          <a:xfrm rot="5400000">
+            <a:off x="6148764" y="3755568"/>
+            <a:ext cx="311246" cy="607254"/>
+          </a:xfrm>
+          <a:prstGeom prst="bentConnector3">
+            <a:avLst>
+              <a:gd name="adj1" fmla="val 50000"/>
+            </a:avLst>
           </a:prstGeom>
           <a:ln>
             <a:solidFill>
@@ -1462,7 +1475,7 @@
         </p:nvSpPr>
         <p:spPr>
           <a:xfrm>
-            <a:off x="7072330" y="4784970"/>
+            <a:off x="6143636" y="4643446"/>
             <a:ext cx="1714512" cy="284400"/>
           </a:xfrm>
           <a:prstGeom prst="rect">
@@ -1491,47 +1504,23 @@
           <a:p>
             <a:pPr algn="ctr"/>
             <a:r>
-              <a:rPr lang="en-GB" sz="1400" smtClean="0">
+              <a:rPr lang="en-GB" sz="1400" noProof="1" smtClean="0">
                 <a:solidFill>
-                  <a:srgbClr val="000000"/>
+                  <a:schemeClr val="bg1">
+                    <a:lumMod val="65000"/>
+                  </a:schemeClr>
                 </a:solidFill>
                 <a:latin typeface="Calibri"/>
               </a:rPr>
               <a:t>skos:ConceptScheme</a:t>
             </a:r>
-            <a:endParaRPr sz="1600"/>
-          </a:p>
-        </p:txBody>
-      </p:sp>
-      <p:sp>
-        <p:nvSpPr>
-          <p:cNvPr id="177" name="TextBox 176"/>
-          <p:cNvSpPr txBox="1"/>
-          <p:nvPr/>
-        </p:nvSpPr>
-        <p:spPr>
-          <a:xfrm>
-            <a:off x="6166313" y="4570656"/>
-            <a:ext cx="906017" cy="261610"/>
-          </a:xfrm>
-          <a:prstGeom prst="rect">
-            <a:avLst/>
-          </a:prstGeom>
-          <a:solidFill>
-            <a:schemeClr val="bg1"/>
-          </a:solidFill>
-        </p:spPr>
-        <p:txBody>
-          <a:bodyPr wrap="none" rtlCol="0">
-            <a:spAutoFit/>
-          </a:bodyPr>
-          <a:lstStyle/>
-          <a:p>
-            <a:r>
-              <a:rPr lang="en-GB" sz="1100" smtClean="0"/>
-              <a:t>qb:codeList</a:t>
-            </a:r>
-            <a:endParaRPr lang="en-GB" sz="1100"/>
+            <a:endParaRPr lang="en-GB" sz="1600" noProof="1">
+              <a:solidFill>
+                <a:schemeClr val="bg1">
+                  <a:lumMod val="65000"/>
+                </a:schemeClr>
+              </a:solidFill>
+            </a:endParaRPr>
           </a:p>
         </p:txBody>
       </p:sp>
@@ -1546,8 +1535,8 @@
         </p:nvCxnSpPr>
         <p:spPr>
           <a:xfrm rot="10800000" flipV="1">
-            <a:off x="4536281" y="2142440"/>
-            <a:ext cx="315502" cy="786494"/>
+            <a:off x="4036215" y="1832546"/>
+            <a:ext cx="529816" cy="786494"/>
           </a:xfrm>
           <a:prstGeom prst="bentConnector2">
             <a:avLst/>
@@ -1582,7 +1571,7 @@
         </p:nvSpPr>
         <p:spPr>
           <a:xfrm>
-            <a:off x="4143372" y="2381572"/>
+            <a:off x="3643306" y="2071678"/>
             <a:ext cx="873957" cy="261610"/>
           </a:xfrm>
           <a:prstGeom prst="rect">
@@ -1599,10 +1588,10 @@
           <a:lstStyle/>
           <a:p>
             <a:r>
-              <a:rPr lang="en-GB" sz="1100" smtClean="0"/>
+              <a:rPr lang="en-GB" sz="1100" noProof="1" smtClean="0"/>
               <a:t>qb:concept</a:t>
             </a:r>
-            <a:endParaRPr lang="en-GB" sz="1100"/>
+            <a:endParaRPr lang="en-GB" sz="1100" noProof="1"/>
           </a:p>
         </p:txBody>
       </p:sp>
@@ -1614,7 +1603,7 @@
         </p:nvSpPr>
         <p:spPr>
           <a:xfrm>
-            <a:off x="4429124" y="3214686"/>
+            <a:off x="3929058" y="2904792"/>
             <a:ext cx="214314" cy="142876"/>
           </a:xfrm>
           <a:prstGeom prst="triangle">
@@ -1625,10 +1614,7 @@
           </a:solidFill>
           <a:ln w="12700">
             <a:solidFill>
-              <a:schemeClr val="tx2">
-                <a:lumMod val="60000"/>
-                <a:lumOff val="40000"/>
-              </a:schemeClr>
+              <a:schemeClr val="tx1"/>
             </a:solidFill>
           </a:ln>
         </p:spPr>
@@ -1653,7 +1639,7 @@
           <a:lstStyle/>
           <a:p>
             <a:pPr algn="ctr"/>
-            <a:endParaRPr lang="en-GB">
+            <a:endParaRPr lang="en-GB" noProof="1">
               <a:solidFill>
                 <a:schemeClr val="bg1">
                   <a:lumMod val="65000"/>
@@ -1671,7 +1657,7 @@
         </p:nvSpPr>
         <p:spPr>
           <a:xfrm>
-            <a:off x="428596" y="1646549"/>
+            <a:off x="142844" y="1336655"/>
             <a:ext cx="1285884" cy="284400"/>
           </a:xfrm>
           <a:prstGeom prst="rect">
@@ -1700,7 +1686,7 @@
           <a:p>
             <a:pPr algn="ctr"/>
             <a:r>
-              <a:rPr lang="en-GB" sz="1400">
+              <a:rPr lang="en-GB" sz="1400" noProof="1" smtClean="0">
                 <a:solidFill>
                   <a:srgbClr val="000000"/>
                 </a:solidFill>
@@ -1708,7 +1694,7 @@
               </a:rPr>
               <a:t>qb:DataSet</a:t>
             </a:r>
-            <a:endParaRPr sz="1600"/>
+            <a:endParaRPr lang="en-GB" sz="1600" noProof="1"/>
           </a:p>
         </p:txBody>
       </p:sp>
@@ -1720,7 +1706,7 @@
         </p:nvSpPr>
         <p:spPr>
           <a:xfrm>
-            <a:off x="1643042" y="2430220"/>
+            <a:off x="1357290" y="2120326"/>
             <a:ext cx="1143008" cy="284400"/>
           </a:xfrm>
           <a:prstGeom prst="rect">
@@ -1749,7 +1735,7 @@
           <a:p>
             <a:pPr algn="ctr"/>
             <a:r>
-              <a:rPr lang="en-GB" sz="1400">
+              <a:rPr lang="en-GB" sz="1400" noProof="1" smtClean="0">
                 <a:solidFill>
                   <a:srgbClr val="000000"/>
                 </a:solidFill>
@@ -1757,7 +1743,7 @@
               </a:rPr>
               <a:t>qb:Slice</a:t>
             </a:r>
-            <a:endParaRPr sz="1600"/>
+            <a:endParaRPr lang="en-GB" sz="1600" noProof="1"/>
           </a:p>
         </p:txBody>
       </p:sp>
@@ -1772,7 +1758,7 @@
         </p:nvCxnSpPr>
         <p:spPr>
           <a:xfrm>
-            <a:off x="1714480" y="1788749"/>
+            <a:off x="1428728" y="1478855"/>
             <a:ext cx="500066" cy="641471"/>
           </a:xfrm>
           <a:prstGeom prst="bentConnector2">
@@ -1808,7 +1794,7 @@
         </p:nvSpPr>
         <p:spPr>
           <a:xfrm>
-            <a:off x="1785918" y="2000240"/>
+            <a:off x="1500166" y="1690346"/>
             <a:ext cx="663964" cy="261610"/>
           </a:xfrm>
           <a:prstGeom prst="rect">
@@ -1825,10 +1811,10 @@
           <a:lstStyle/>
           <a:p>
             <a:r>
-              <a:rPr lang="en-GB" sz="1100" smtClean="0"/>
+              <a:rPr lang="en-GB" sz="1100" noProof="1" smtClean="0"/>
               <a:t>qb:slice</a:t>
             </a:r>
-            <a:endParaRPr lang="en-GB" sz="1100"/>
+            <a:endParaRPr lang="en-GB" sz="1100" noProof="1"/>
           </a:p>
         </p:txBody>
       </p:sp>
@@ -1840,7 +1826,7 @@
         </p:nvSpPr>
         <p:spPr>
           <a:xfrm>
-            <a:off x="357158" y="3644666"/>
+            <a:off x="71406" y="3334772"/>
             <a:ext cx="1428760" cy="284400"/>
           </a:xfrm>
           <a:prstGeom prst="rect">
@@ -1869,7 +1855,7 @@
           <a:p>
             <a:pPr algn="ctr"/>
             <a:r>
-              <a:rPr lang="en-GB" sz="1400" smtClean="0">
+              <a:rPr lang="en-GB" sz="1400" noProof="1" smtClean="0">
                 <a:solidFill>
                   <a:srgbClr val="000000"/>
                 </a:solidFill>
@@ -1877,7 +1863,7 @@
               </a:rPr>
               <a:t>qb:Observation</a:t>
             </a:r>
-            <a:endParaRPr sz="1600"/>
+            <a:endParaRPr lang="en-GB" sz="1600" noProof="1"/>
           </a:p>
         </p:txBody>
       </p:sp>
@@ -1886,14 +1872,14 @@
           <p:cNvPr id="23" name="Elbow Connector 22"/>
           <p:cNvCxnSpPr>
             <a:stCxn id="4" idx="2"/>
-            <a:endCxn id="22" idx="3"/>
+            <a:endCxn id="98" idx="6"/>
           </p:cNvCxnSpPr>
           <p:nvPr/>
         </p:nvCxnSpPr>
         <p:spPr>
           <a:xfrm rot="5400000">
-            <a:off x="1464109" y="3036429"/>
-            <a:ext cx="1072246" cy="428628"/>
+            <a:off x="1215576" y="2717624"/>
+            <a:ext cx="1026116" cy="400320"/>
           </a:xfrm>
           <a:prstGeom prst="bentConnector2">
             <a:avLst/>
@@ -1928,7 +1914,7 @@
         </p:nvSpPr>
         <p:spPr>
           <a:xfrm>
-            <a:off x="1857356" y="3381704"/>
+            <a:off x="1571604" y="3071810"/>
             <a:ext cx="1109599" cy="261610"/>
           </a:xfrm>
           <a:prstGeom prst="rect">
@@ -1945,10 +1931,10 @@
           <a:lstStyle/>
           <a:p>
             <a:r>
-              <a:rPr lang="en-GB" sz="1100" dirty="0" err="1" smtClean="0"/>
+              <a:rPr lang="en-GB" sz="1100" noProof="1" smtClean="0"/>
               <a:t>qb:observation</a:t>
             </a:r>
-            <a:endParaRPr lang="en-GB" sz="1100" dirty="0"/>
+            <a:endParaRPr lang="en-GB" sz="1100" noProof="1"/>
           </a:p>
         </p:txBody>
       </p:sp>
@@ -1963,7 +1949,7 @@
         </p:nvCxnSpPr>
         <p:spPr>
           <a:xfrm rot="5400000" flipH="1" flipV="1">
-            <a:off x="214680" y="2787808"/>
+            <a:off x="-71072" y="2477914"/>
             <a:ext cx="1713717" cy="1588"/>
           </a:xfrm>
           <a:prstGeom prst="bentConnector3">
@@ -2001,7 +1987,7 @@
         </p:nvSpPr>
         <p:spPr>
           <a:xfrm>
-            <a:off x="658269" y="2310134"/>
+            <a:off x="372517" y="2000240"/>
             <a:ext cx="865943" cy="261610"/>
           </a:xfrm>
           <a:prstGeom prst="rect">
@@ -2018,10 +2004,10 @@
           <a:lstStyle/>
           <a:p>
             <a:r>
-              <a:rPr lang="en-GB" sz="1100" smtClean="0"/>
+              <a:rPr lang="en-GB" sz="1100" noProof="1" smtClean="0"/>
               <a:t>qb:dataSet</a:t>
             </a:r>
-            <a:endParaRPr lang="en-GB" sz="1100" dirty="0"/>
+            <a:endParaRPr lang="en-GB" sz="1100" noProof="1"/>
           </a:p>
         </p:txBody>
       </p:sp>
@@ -2036,7 +2022,7 @@
         </p:nvCxnSpPr>
         <p:spPr>
           <a:xfrm rot="5400000" flipH="1" flipV="1">
-            <a:off x="912494" y="943487"/>
+            <a:off x="626742" y="633593"/>
             <a:ext cx="862107" cy="544019"/>
           </a:xfrm>
           <a:prstGeom prst="bentConnector3">
@@ -2074,7 +2060,7 @@
         </p:nvSpPr>
         <p:spPr>
           <a:xfrm>
-            <a:off x="642910" y="1285860"/>
+            <a:off x="357158" y="975966"/>
             <a:ext cx="926857" cy="261610"/>
           </a:xfrm>
           <a:prstGeom prst="rect">
@@ -2091,10 +2077,10 @@
           <a:lstStyle/>
           <a:p>
             <a:r>
-              <a:rPr lang="en-GB" sz="1100" smtClean="0"/>
+              <a:rPr lang="en-GB" sz="1100" noProof="1" smtClean="0"/>
               <a:t>qb:structure</a:t>
             </a:r>
-            <a:endParaRPr lang="en-GB" sz="1100"/>
+            <a:endParaRPr lang="en-GB" sz="1100" noProof="1"/>
           </a:p>
         </p:txBody>
       </p:sp>
@@ -2106,7 +2092,7 @@
         </p:nvSpPr>
         <p:spPr>
           <a:xfrm>
-            <a:off x="2571736" y="1643050"/>
+            <a:off x="2285984" y="1333156"/>
             <a:ext cx="1214446" cy="284400"/>
           </a:xfrm>
           <a:prstGeom prst="rect">
@@ -2135,7 +2121,7 @@
           <a:p>
             <a:pPr algn="ctr"/>
             <a:r>
-              <a:rPr lang="en-GB" sz="1400" smtClean="0">
+              <a:rPr lang="en-GB" sz="1400" noProof="1" smtClean="0">
                 <a:solidFill>
                   <a:srgbClr val="000000"/>
                 </a:solidFill>
@@ -2143,7 +2129,7 @@
               </a:rPr>
               <a:t>qb:SliceKey</a:t>
             </a:r>
-            <a:endParaRPr sz="1600"/>
+            <a:endParaRPr lang="en-GB" sz="1600" noProof="1"/>
           </a:p>
         </p:txBody>
       </p:sp>
@@ -2151,15 +2137,15 @@
         <p:nvCxnSpPr>
           <p:cNvPr id="196" name="Elbow Connector 195"/>
           <p:cNvCxnSpPr>
-            <a:stCxn id="4" idx="3"/>
+            <a:stCxn id="93" idx="6"/>
             <a:endCxn id="195" idx="2"/>
           </p:cNvCxnSpPr>
           <p:nvPr/>
         </p:nvCxnSpPr>
         <p:spPr>
           <a:xfrm flipV="1">
-            <a:off x="2786050" y="1927450"/>
-            <a:ext cx="392909" cy="644970"/>
+            <a:off x="2517709" y="1617556"/>
+            <a:ext cx="375498" cy="574298"/>
           </a:xfrm>
           <a:prstGeom prst="bentConnector2">
             <a:avLst/>
@@ -2194,7 +2180,7 @@
         </p:nvSpPr>
         <p:spPr>
           <a:xfrm>
-            <a:off x="2571736" y="2095820"/>
+            <a:off x="2285984" y="1785926"/>
             <a:ext cx="1234633" cy="261610"/>
           </a:xfrm>
           <a:prstGeom prst="rect">
@@ -2211,10 +2197,10 @@
           <a:lstStyle/>
           <a:p>
             <a:r>
-              <a:rPr lang="en-GB" sz="1100" dirty="0" err="1" smtClean="0"/>
+              <a:rPr lang="en-GB" sz="1100" noProof="1" smtClean="0"/>
               <a:t>qb:sliceStructure</a:t>
             </a:r>
-            <a:endParaRPr lang="en-GB" sz="1100" dirty="0"/>
+            <a:endParaRPr lang="en-GB" sz="1100" noProof="1"/>
           </a:p>
         </p:txBody>
       </p:sp>
@@ -2226,7 +2212,7 @@
         </p:nvSpPr>
         <p:spPr>
           <a:xfrm>
-            <a:off x="472549" y="500042"/>
+            <a:off x="186797" y="190148"/>
             <a:ext cx="2286016" cy="284400"/>
           </a:xfrm>
           <a:prstGeom prst="rect">
@@ -2255,7 +2241,7 @@
           <a:p>
             <a:pPr algn="ctr"/>
             <a:r>
-              <a:rPr lang="en-GB" sz="1400" smtClean="0">
+              <a:rPr lang="en-GB" sz="1400" noProof="1" smtClean="0">
                 <a:solidFill>
                   <a:srgbClr val="000000"/>
                 </a:solidFill>
@@ -2276,7 +2262,7 @@
         </p:nvCxnSpPr>
         <p:spPr>
           <a:xfrm rot="16200000" flipH="1">
-            <a:off x="2411000" y="875091"/>
+            <a:off x="2125248" y="565197"/>
             <a:ext cx="857256" cy="678661"/>
           </a:xfrm>
           <a:prstGeom prst="bentConnector3">
@@ -2314,7 +2300,7 @@
         </p:nvSpPr>
         <p:spPr>
           <a:xfrm>
-            <a:off x="2786050" y="928670"/>
+            <a:off x="2500298" y="618776"/>
             <a:ext cx="907621" cy="261610"/>
           </a:xfrm>
           <a:prstGeom prst="rect">
@@ -2331,10 +2317,10 @@
           <a:lstStyle/>
           <a:p>
             <a:r>
-              <a:rPr lang="en-GB" sz="1100" smtClean="0"/>
+              <a:rPr lang="en-GB" sz="1100" noProof="1" smtClean="0"/>
               <a:t>qb:sliceKey</a:t>
             </a:r>
-            <a:endParaRPr lang="en-GB" sz="1100"/>
+            <a:endParaRPr lang="en-GB" sz="1100" noProof="1"/>
           </a:p>
         </p:txBody>
       </p:sp>
@@ -2349,7 +2335,7 @@
         </p:nvCxnSpPr>
         <p:spPr>
           <a:xfrm>
-            <a:off x="2758565" y="642242"/>
+            <a:off x="2472813" y="332348"/>
             <a:ext cx="1599121" cy="1588"/>
           </a:xfrm>
           <a:prstGeom prst="bentConnector3">
@@ -2387,7 +2373,7 @@
         </p:nvSpPr>
         <p:spPr>
           <a:xfrm>
-            <a:off x="4286248" y="4645422"/>
+            <a:off x="3786182" y="4335528"/>
             <a:ext cx="1869871" cy="1569660"/>
           </a:xfrm>
           <a:prstGeom prst="rect">
@@ -2402,7 +2388,7 @@
           <a:lstStyle/>
           <a:p>
             <a:r>
-              <a:rPr lang="en-GB" sz="1200" smtClean="0">
+              <a:rPr lang="en-GB" sz="1200" noProof="1" smtClean="0">
                 <a:solidFill>
                   <a:schemeClr val="bg1">
                     <a:lumMod val="65000"/>
@@ -2413,7 +2399,7 @@
               <a:t>sdmx:FrequencyRole</a:t>
             </a:r>
             <a:br>
-              <a:rPr lang="en-GB" sz="1200" smtClean="0">
+              <a:rPr lang="en-GB" sz="1200" noProof="1" smtClean="0">
                 <a:solidFill>
                   <a:schemeClr val="bg1">
                     <a:lumMod val="65000"/>
@@ -2423,7 +2409,7 @@
               </a:rPr>
             </a:br>
             <a:r>
-              <a:rPr lang="en-GB" sz="1200" smtClean="0">
+              <a:rPr lang="en-GB" sz="1200" noProof="1" smtClean="0">
                 <a:solidFill>
                   <a:schemeClr val="bg1">
                     <a:lumMod val="65000"/>
@@ -2434,7 +2420,7 @@
               <a:t>sdmx:CountRole</a:t>
             </a:r>
             <a:br>
-              <a:rPr lang="en-GB" sz="1200" smtClean="0">
+              <a:rPr lang="en-GB" sz="1200" noProof="1" smtClean="0">
                 <a:solidFill>
                   <a:schemeClr val="bg1">
                     <a:lumMod val="65000"/>
@@ -2444,7 +2430,7 @@
               </a:rPr>
             </a:br>
             <a:r>
-              <a:rPr lang="en-GB" sz="1200" smtClean="0">
+              <a:rPr lang="en-GB" sz="1200" noProof="1" smtClean="0">
                 <a:solidFill>
                   <a:schemeClr val="bg1">
                     <a:lumMod val="65000"/>
@@ -2455,7 +2441,7 @@
               <a:t>sdmx:EntityRole</a:t>
             </a:r>
             <a:br>
-              <a:rPr lang="en-GB" sz="1200" smtClean="0">
+              <a:rPr lang="en-GB" sz="1200" noProof="1" smtClean="0">
                 <a:solidFill>
                   <a:schemeClr val="bg1">
                     <a:lumMod val="65000"/>
@@ -2465,7 +2451,7 @@
               </a:rPr>
             </a:br>
             <a:r>
-              <a:rPr lang="en-GB" sz="1200" smtClean="0">
+              <a:rPr lang="en-GB" sz="1200" noProof="1" smtClean="0">
                 <a:solidFill>
                   <a:schemeClr val="bg1">
                     <a:lumMod val="65000"/>
@@ -2478,7 +2464,7 @@
           </a:p>
           <a:p>
             <a:r>
-              <a:rPr lang="en-GB" sz="1200" smtClean="0">
+              <a:rPr lang="en-GB" sz="1200" noProof="1" smtClean="0">
                 <a:solidFill>
                   <a:schemeClr val="bg1">
                     <a:lumMod val="65000"/>
@@ -2491,7 +2477,7 @@
           </a:p>
           <a:p>
             <a:r>
-              <a:rPr lang="en-GB" sz="1200" smtClean="0">
+              <a:rPr lang="en-GB" sz="1200" noProof="1" smtClean="0">
                 <a:solidFill>
                   <a:schemeClr val="bg1">
                     <a:lumMod val="65000"/>
@@ -2504,7 +2490,7 @@
           </a:p>
           <a:p>
             <a:r>
-              <a:rPr lang="en-GB" sz="1200" smtClean="0">
+              <a:rPr lang="en-GB" sz="1200" noProof="1" smtClean="0">
                 <a:solidFill>
                   <a:schemeClr val="bg1">
                     <a:lumMod val="65000"/>
@@ -2517,7 +2503,7 @@
           </a:p>
           <a:p>
             <a:r>
-              <a:rPr lang="en-GB" sz="1200" smtClean="0">
+              <a:rPr lang="en-GB" sz="1200" noProof="1" smtClean="0">
                 <a:solidFill>
                   <a:schemeClr val="bg1">
                     <a:lumMod val="65000"/>
@@ -2541,7 +2527,7 @@
         </p:nvCxnSpPr>
         <p:spPr>
           <a:xfrm rot="5400000" flipH="1" flipV="1">
-            <a:off x="4427460" y="4037887"/>
+            <a:off x="3927394" y="3727993"/>
             <a:ext cx="217642" cy="1588"/>
           </a:xfrm>
           <a:prstGeom prst="bentConnector3">
@@ -2551,10 +2537,7 @@
           </a:prstGeom>
           <a:ln>
             <a:solidFill>
-              <a:schemeClr val="tx2">
-                <a:lumMod val="60000"/>
-                <a:lumOff val="40000"/>
-              </a:schemeClr>
+              <a:schemeClr val="tx1"/>
             </a:solidFill>
             <a:tailEnd type="none"/>
           </a:ln>
@@ -2582,7 +2565,7 @@
         </p:nvSpPr>
         <p:spPr>
           <a:xfrm>
-            <a:off x="3929058" y="3500438"/>
+            <a:off x="3428992" y="3190544"/>
             <a:ext cx="1214446" cy="284400"/>
           </a:xfrm>
           <a:prstGeom prst="rect">
@@ -2613,7 +2596,7 @@
           <a:p>
             <a:pPr algn="ctr"/>
             <a:r>
-              <a:rPr lang="en-GB" sz="1400" smtClean="0">
+              <a:rPr lang="en-GB" sz="1400" noProof="1" smtClean="0">
                 <a:solidFill>
                   <a:schemeClr val="bg1">
                     <a:lumMod val="65000"/>
@@ -2623,7 +2606,7 @@
               </a:rPr>
               <a:t>sdmx:Concept</a:t>
             </a:r>
-            <a:endParaRPr sz="1600">
+            <a:endParaRPr lang="en-GB" sz="1600" noProof="1">
               <a:solidFill>
                 <a:schemeClr val="bg1">
                   <a:lumMod val="65000"/>
@@ -2641,7 +2624,7 @@
         </p:nvSpPr>
         <p:spPr>
           <a:xfrm>
-            <a:off x="4429124" y="3786190"/>
+            <a:off x="3929058" y="3476296"/>
             <a:ext cx="214314" cy="142876"/>
           </a:xfrm>
           <a:prstGeom prst="triangle">
@@ -2652,10 +2635,7 @@
           </a:solidFill>
           <a:ln w="12700">
             <a:solidFill>
-              <a:schemeClr val="tx2">
-                <a:lumMod val="60000"/>
-                <a:lumOff val="40000"/>
-              </a:schemeClr>
+              <a:schemeClr val="tx1"/>
             </a:solidFill>
           </a:ln>
         </p:spPr>
@@ -2680,7 +2660,7 @@
           <a:lstStyle/>
           <a:p>
             <a:pPr algn="ctr"/>
-            <a:endParaRPr lang="en-GB">
+            <a:endParaRPr lang="en-GB" noProof="1">
               <a:solidFill>
                 <a:schemeClr val="bg1">
                   <a:lumMod val="65000"/>
@@ -2690,16 +2670,145 @@
           </a:p>
         </p:txBody>
       </p:sp>
-      <p:sp>
-        <p:nvSpPr>
-          <p:cNvPr id="189" name="CustomShape 1"/>
+      <p:cxnSp>
+        <p:nvCxnSpPr>
+          <p:cNvPr id="192" name="Elbow Connector 191"/>
+          <p:cNvCxnSpPr>
+            <a:stCxn id="195" idx="3"/>
+            <a:endCxn id="38" idx="0"/>
+          </p:cNvCxnSpPr>
+          <p:nvPr/>
+        </p:nvCxnSpPr>
+        <p:spPr>
+          <a:xfrm>
+            <a:off x="3500430" y="1475356"/>
+            <a:ext cx="2208609" cy="214990"/>
+          </a:xfrm>
+          <a:prstGeom prst="bentConnector2">
+            <a:avLst/>
+          </a:prstGeom>
+          <a:ln>
+            <a:solidFill>
+              <a:schemeClr val="tx1"/>
+            </a:solidFill>
+            <a:tailEnd type="triangle"/>
+          </a:ln>
+        </p:spPr>
+        <p:style>
+          <a:lnRef idx="1">
+            <a:schemeClr val="accent1"/>
+          </a:lnRef>
+          <a:fillRef idx="0">
+            <a:schemeClr val="accent1"/>
+          </a:fillRef>
+          <a:effectRef idx="0">
+            <a:schemeClr val="accent1"/>
+          </a:effectRef>
+          <a:fontRef idx="minor">
+            <a:schemeClr val="tx1"/>
+          </a:fontRef>
+        </p:style>
+      </p:cxnSp>
+      <p:sp>
+        <p:nvSpPr>
+          <p:cNvPr id="61" name="TextBox 60"/>
+          <p:cNvSpPr txBox="1"/>
+          <p:nvPr/>
+        </p:nvSpPr>
+        <p:spPr>
+          <a:xfrm>
+            <a:off x="4214810" y="618776"/>
+            <a:ext cx="1609736" cy="261610"/>
+          </a:xfrm>
+          <a:prstGeom prst="rect">
+            <a:avLst/>
+          </a:prstGeom>
+          <a:solidFill>
+            <a:schemeClr val="bg1"/>
+          </a:solidFill>
+        </p:spPr>
+        <p:txBody>
+          <a:bodyPr wrap="none" rtlCol="0">
+            <a:spAutoFit/>
+          </a:bodyPr>
+          <a:lstStyle/>
+          <a:p>
+            <a:r>
+              <a:rPr lang="en-GB" sz="1100" noProof="1" smtClean="0"/>
+              <a:t>qb:componentProperty</a:t>
+            </a:r>
+            <a:endParaRPr lang="en-GB" sz="1100" noProof="1"/>
+          </a:p>
+        </p:txBody>
+      </p:sp>
+      <p:sp>
+        <p:nvSpPr>
+          <p:cNvPr id="77" name="Rounded Rectangle 76"/>
           <p:cNvSpPr/>
           <p:nvPr/>
         </p:nvSpPr>
         <p:spPr>
           <a:xfrm>
-            <a:off x="7143768" y="5431240"/>
-            <a:ext cx="1643074" cy="284400"/>
+            <a:off x="6715140" y="2404726"/>
+            <a:ext cx="1500198" cy="214314"/>
+          </a:xfrm>
+          <a:prstGeom prst="roundRect">
+            <a:avLst/>
+          </a:prstGeom>
+          <a:solidFill>
+            <a:schemeClr val="bg1"/>
+          </a:solidFill>
+          <a:ln w="12700"/>
+        </p:spPr>
+        <p:style>
+          <a:lnRef idx="2">
+            <a:schemeClr val="accent1">
+              <a:shade val="50000"/>
+            </a:schemeClr>
+          </a:lnRef>
+          <a:fillRef idx="1">
+            <a:schemeClr val="accent1"/>
+          </a:fillRef>
+          <a:effectRef idx="0">
+            <a:schemeClr val="accent1"/>
+          </a:effectRef>
+          <a:fontRef idx="minor">
+            <a:schemeClr val="lt1"/>
+          </a:fontRef>
+        </p:style>
+        <p:txBody>
+          <a:bodyPr rtlCol="0" anchor="ctr"/>
+          <a:lstStyle/>
+          <a:p>
+            <a:pPr algn="ctr"/>
+            <a:r>
+              <a:rPr lang="en-GB" sz="1400" noProof="1" smtClean="0">
+                <a:solidFill>
+                  <a:schemeClr val="tx1"/>
+                </a:solidFill>
+                <a:latin typeface="Calibri" pitchFamily="34" charset="0"/>
+              </a:rPr>
+              <a:t>qb:measureType</a:t>
+            </a:r>
+            <a:endParaRPr lang="en-GB" sz="1400" noProof="1">
+              <a:solidFill>
+                <a:schemeClr val="tx1"/>
+              </a:solidFill>
+              <a:latin typeface="Calibri" pitchFamily="34" charset="0"/>
+            </a:endParaRPr>
+          </a:p>
+        </p:txBody>
+      </p:sp>
+      <p:sp>
+        <p:nvSpPr>
+          <p:cNvPr id="171" name="CustomShape 1"/>
+          <p:cNvSpPr/>
+          <p:nvPr/>
+        </p:nvSpPr>
+        <p:spPr>
+          <a:xfrm>
+            <a:off x="3428992" y="2619040"/>
+            <a:ext cx="1214446" cy="284400"/>
           </a:xfrm>
           <a:prstGeom prst="rect">
             <a:avLst/>
@@ -2709,10 +2818,7 @@
           </a:solidFill>
           <a:ln w="12600">
             <a:solidFill>
-              <a:schemeClr val="tx2">
-                <a:lumMod val="60000"/>
-                <a:lumOff val="40000"/>
-              </a:schemeClr>
+              <a:schemeClr val="tx1"/>
             </a:solidFill>
             <a:round/>
           </a:ln>
@@ -2730,289 +2836,7 @@
           <a:p>
             <a:pPr algn="ctr"/>
             <a:r>
-              <a:rPr lang="en-GB" sz="1400" smtClean="0">
-                <a:solidFill>
-                  <a:schemeClr val="bg1">
-                    <a:lumMod val="65000"/>
-                  </a:schemeClr>
-                </a:solidFill>
-                <a:latin typeface="Calibri"/>
-              </a:rPr>
-              <a:t>sdmx:CodeList</a:t>
-            </a:r>
-          </a:p>
-        </p:txBody>
-      </p:sp>
-      <p:cxnSp>
-        <p:nvCxnSpPr>
-          <p:cNvPr id="190" name="Elbow Connector 42"/>
-          <p:cNvCxnSpPr>
-            <a:stCxn id="189" idx="0"/>
-            <a:endCxn id="191" idx="3"/>
-          </p:cNvCxnSpPr>
-          <p:nvPr/>
-        </p:nvCxnSpPr>
-        <p:spPr>
-          <a:xfrm rot="5400000" flipH="1" flipV="1">
-            <a:off x="7856484" y="5322419"/>
-            <a:ext cx="217642" cy="1588"/>
-          </a:xfrm>
-          <a:prstGeom prst="bentConnector3">
-            <a:avLst>
-              <a:gd name="adj1" fmla="val 50000"/>
-            </a:avLst>
-          </a:prstGeom>
-          <a:ln>
-            <a:solidFill>
-              <a:schemeClr val="tx2">
-                <a:lumMod val="60000"/>
-                <a:lumOff val="40000"/>
-              </a:schemeClr>
-            </a:solidFill>
-            <a:tailEnd type="none"/>
-          </a:ln>
-        </p:spPr>
-        <p:style>
-          <a:lnRef idx="1">
-            <a:schemeClr val="accent1"/>
-          </a:lnRef>
-          <a:fillRef idx="0">
-            <a:schemeClr val="accent1"/>
-          </a:fillRef>
-          <a:effectRef idx="0">
-            <a:schemeClr val="accent1"/>
-          </a:effectRef>
-          <a:fontRef idx="minor">
-            <a:schemeClr val="tx1"/>
-          </a:fontRef>
-        </p:style>
-      </p:cxnSp>
-      <p:sp>
-        <p:nvSpPr>
-          <p:cNvPr id="191" name="Isosceles Triangle 190"/>
-          <p:cNvSpPr/>
-          <p:nvPr/>
-        </p:nvSpPr>
-        <p:spPr>
-          <a:xfrm>
-            <a:off x="7858148" y="5070722"/>
-            <a:ext cx="214314" cy="142876"/>
-          </a:xfrm>
-          <a:prstGeom prst="triangle">
-            <a:avLst/>
-          </a:prstGeom>
-          <a:solidFill>
-            <a:schemeClr val="bg1"/>
-          </a:solidFill>
-          <a:ln w="12700">
-            <a:solidFill>
-              <a:schemeClr val="tx2">
-                <a:lumMod val="60000"/>
-                <a:lumOff val="40000"/>
-              </a:schemeClr>
-            </a:solidFill>
-          </a:ln>
-        </p:spPr>
-        <p:style>
-          <a:lnRef idx="2">
-            <a:schemeClr val="accent1">
-              <a:shade val="50000"/>
-            </a:schemeClr>
-          </a:lnRef>
-          <a:fillRef idx="1">
-            <a:schemeClr val="accent1"/>
-          </a:fillRef>
-          <a:effectRef idx="0">
-            <a:schemeClr val="accent1"/>
-          </a:effectRef>
-          <a:fontRef idx="minor">
-            <a:schemeClr val="lt1"/>
-          </a:fontRef>
-        </p:style>
-        <p:txBody>
-          <a:bodyPr rtlCol="0" anchor="ctr"/>
-          <a:lstStyle/>
-          <a:p>
-            <a:pPr algn="ctr"/>
-            <a:endParaRPr lang="en-GB">
-              <a:solidFill>
-                <a:schemeClr val="bg1">
-                  <a:lumMod val="65000"/>
-                </a:schemeClr>
-              </a:solidFill>
-            </a:endParaRPr>
-          </a:p>
-        </p:txBody>
-      </p:sp>
-      <p:cxnSp>
-        <p:nvCxnSpPr>
-          <p:cNvPr id="192" name="Elbow Connector 191"/>
-          <p:cNvCxnSpPr>
-            <a:stCxn id="195" idx="3"/>
-            <a:endCxn id="38" idx="0"/>
-          </p:cNvCxnSpPr>
-          <p:nvPr/>
-        </p:nvCxnSpPr>
-        <p:spPr>
-          <a:xfrm>
-            <a:off x="3786182" y="1785250"/>
-            <a:ext cx="2208609" cy="214990"/>
-          </a:xfrm>
-          <a:prstGeom prst="bentConnector2">
-            <a:avLst/>
-          </a:prstGeom>
-          <a:ln>
-            <a:solidFill>
-              <a:schemeClr val="tx1"/>
-            </a:solidFill>
-            <a:tailEnd type="triangle"/>
-          </a:ln>
-        </p:spPr>
-        <p:style>
-          <a:lnRef idx="1">
-            <a:schemeClr val="accent1"/>
-          </a:lnRef>
-          <a:fillRef idx="0">
-            <a:schemeClr val="accent1"/>
-          </a:fillRef>
-          <a:effectRef idx="0">
-            <a:schemeClr val="accent1"/>
-          </a:effectRef>
-          <a:fontRef idx="minor">
-            <a:schemeClr val="tx1"/>
-          </a:fontRef>
-        </p:style>
-      </p:cxnSp>
-      <p:sp>
-        <p:nvSpPr>
-          <p:cNvPr id="61" name="TextBox 60"/>
-          <p:cNvSpPr txBox="1"/>
-          <p:nvPr/>
-        </p:nvSpPr>
-        <p:spPr>
-          <a:xfrm>
-            <a:off x="4500562" y="928670"/>
-            <a:ext cx="1609736" cy="261610"/>
-          </a:xfrm>
-          <a:prstGeom prst="rect">
-            <a:avLst/>
-          </a:prstGeom>
-          <a:solidFill>
-            <a:schemeClr val="bg1"/>
-          </a:solidFill>
-        </p:spPr>
-        <p:txBody>
-          <a:bodyPr wrap="none" rtlCol="0">
-            <a:spAutoFit/>
-          </a:bodyPr>
-          <a:lstStyle/>
-          <a:p>
-            <a:r>
-              <a:rPr lang="en-GB" sz="1100" smtClean="0"/>
-              <a:t>qb:componentProperty</a:t>
-            </a:r>
-            <a:endParaRPr lang="en-GB" sz="1100"/>
-          </a:p>
-        </p:txBody>
-      </p:sp>
-      <p:sp>
-        <p:nvSpPr>
-          <p:cNvPr id="77" name="Rounded Rectangle 76"/>
-          <p:cNvSpPr/>
-          <p:nvPr/>
-        </p:nvSpPr>
-        <p:spPr>
-          <a:xfrm>
-            <a:off x="7000892" y="2714620"/>
-            <a:ext cx="1500198" cy="214314"/>
-          </a:xfrm>
-          <a:prstGeom prst="roundRect">
-            <a:avLst/>
-          </a:prstGeom>
-          <a:solidFill>
-            <a:schemeClr val="bg1"/>
-          </a:solidFill>
-          <a:ln w="12700"/>
-        </p:spPr>
-        <p:style>
-          <a:lnRef idx="2">
-            <a:schemeClr val="accent1">
-              <a:shade val="50000"/>
-            </a:schemeClr>
-          </a:lnRef>
-          <a:fillRef idx="1">
-            <a:schemeClr val="accent1"/>
-          </a:fillRef>
-          <a:effectRef idx="0">
-            <a:schemeClr val="accent1"/>
-          </a:effectRef>
-          <a:fontRef idx="minor">
-            <a:schemeClr val="lt1"/>
-          </a:fontRef>
-        </p:style>
-        <p:txBody>
-          <a:bodyPr rtlCol="0" anchor="ctr"/>
-          <a:lstStyle/>
-          <a:p>
-            <a:pPr algn="ctr"/>
-            <a:r>
-              <a:rPr lang="en-GB" sz="1400" smtClean="0">
-                <a:solidFill>
-                  <a:schemeClr val="accent1"/>
-                </a:solidFill>
-                <a:latin typeface="Calibri" pitchFamily="34" charset="0"/>
-              </a:rPr>
-              <a:t>qb:measureType</a:t>
-            </a:r>
-            <a:endParaRPr lang="en-GB" sz="1400">
-              <a:solidFill>
-                <a:schemeClr val="accent1"/>
-              </a:solidFill>
-              <a:latin typeface="Calibri" pitchFamily="34" charset="0"/>
-            </a:endParaRPr>
-          </a:p>
-        </p:txBody>
-      </p:sp>
-      <p:sp>
-        <p:nvSpPr>
-          <p:cNvPr id="171" name="CustomShape 1"/>
-          <p:cNvSpPr/>
-          <p:nvPr/>
-        </p:nvSpPr>
-        <p:spPr>
-          <a:xfrm>
-            <a:off x="3929058" y="2928934"/>
-            <a:ext cx="1214446" cy="284400"/>
-          </a:xfrm>
-          <a:prstGeom prst="rect">
-            <a:avLst/>
-          </a:prstGeom>
-          <a:solidFill>
-            <a:srgbClr val="FFFFFF"/>
-          </a:solidFill>
-          <a:ln w="12600">
-            <a:solidFill>
-              <a:schemeClr val="bg1">
-                <a:lumMod val="65000"/>
-              </a:schemeClr>
-            </a:solidFill>
-            <a:round/>
-          </a:ln>
-          <a:effectLst>
-            <a:outerShdw blurRad="50800" dist="38100" dir="2700000" algn="tl" rotWithShape="0">
-              <a:prstClr val="black">
-                <a:alpha val="40000"/>
-              </a:prstClr>
-            </a:outerShdw>
-          </a:effectLst>
-        </p:spPr>
-        <p:txBody>
-          <a:bodyPr lIns="90000" tIns="45000" rIns="90000" bIns="45000" anchor="ctr"/>
-          <a:lstStyle/>
-          <a:p>
-            <a:pPr algn="ctr"/>
-            <a:r>
-              <a:rPr lang="en-GB" sz="1400" smtClean="0">
+              <a:rPr lang="en-GB" sz="1400" noProof="1" smtClean="0">
                 <a:solidFill>
                   <a:schemeClr val="bg1">
                     <a:lumMod val="65000"/>
@@ -3022,7 +2846,7 @@
               </a:rPr>
               <a:t>skos:Concept</a:t>
             </a:r>
-            <a:endParaRPr sz="1600">
+            <a:endParaRPr lang="en-GB" sz="1600" noProof="1">
               <a:solidFill>
                 <a:schemeClr val="bg1">
                   <a:lumMod val="65000"/>
@@ -3040,7 +2864,7 @@
         </p:nvSpPr>
         <p:spPr>
           <a:xfrm rot="16200000">
-            <a:off x="6036479" y="1000108"/>
+            <a:off x="5750727" y="690214"/>
             <a:ext cx="214314" cy="142876"/>
           </a:xfrm>
           <a:prstGeom prst="triangle">
@@ -3076,7 +2900,7 @@
           <a:lstStyle/>
           <a:p>
             <a:pPr algn="ctr"/>
-            <a:endParaRPr lang="en-GB"/>
+            <a:endParaRPr lang="en-GB" noProof="1"/>
           </a:p>
         </p:txBody>
       </p:sp>
@@ -3088,7 +2912,7 @@
         </p:nvSpPr>
         <p:spPr>
           <a:xfrm>
-            <a:off x="6786578" y="1142984"/>
+            <a:off x="6500826" y="833090"/>
             <a:ext cx="1095172" cy="646331"/>
           </a:xfrm>
           <a:prstGeom prst="rect">
@@ -3103,21 +2927,21 @@
           <a:lstStyle/>
           <a:p>
             <a:r>
-              <a:rPr lang="en-GB" sz="1200" smtClean="0"/>
+              <a:rPr lang="en-GB" sz="1200" noProof="1" smtClean="0"/>
               <a:t>qb:dimension</a:t>
             </a:r>
             <a:br>
-              <a:rPr lang="en-GB" sz="1200" smtClean="0"/>
+              <a:rPr lang="en-GB" sz="1200" noProof="1" smtClean="0"/>
             </a:br>
             <a:r>
-              <a:rPr lang="en-GB" sz="1200" smtClean="0"/>
+              <a:rPr lang="en-GB" sz="1200" noProof="1" smtClean="0"/>
               <a:t>qb:attribute</a:t>
             </a:r>
             <a:br>
-              <a:rPr lang="en-GB" sz="1200" smtClean="0"/>
+              <a:rPr lang="en-GB" sz="1200" noProof="1" smtClean="0"/>
             </a:br>
             <a:r>
-              <a:rPr lang="en-GB" sz="1200" smtClean="0"/>
+              <a:rPr lang="en-GB" sz="1200" noProof="1" smtClean="0"/>
               <a:t>qb:measure</a:t>
             </a:r>
           </a:p>
@@ -3134,7 +2958,7 @@
         </p:nvCxnSpPr>
         <p:spPr>
           <a:xfrm>
-            <a:off x="6215074" y="1071546"/>
+            <a:off x="5929322" y="761652"/>
             <a:ext cx="571504" cy="394604"/>
           </a:xfrm>
           <a:prstGeom prst="bentConnector3">
@@ -3166,7 +2990,7 @@
         </p:nvSpPr>
         <p:spPr>
           <a:xfrm>
-            <a:off x="4071934" y="1524316"/>
+            <a:off x="3786182" y="1214422"/>
             <a:ext cx="1609736" cy="261610"/>
           </a:xfrm>
           <a:prstGeom prst="rect">
@@ -3183,81 +3007,83 @@
           <a:lstStyle/>
           <a:p>
             <a:r>
-              <a:rPr lang="en-GB" sz="1100" smtClean="0"/>
+              <a:rPr lang="en-GB" sz="1100" noProof="1" smtClean="0"/>
               <a:t>qb:componentProperty</a:t>
             </a:r>
-            <a:endParaRPr lang="en-GB" sz="1100"/>
-          </a:p>
-        </p:txBody>
-      </p:sp>
-      <p:sp>
-        <p:nvSpPr>
-          <p:cNvPr id="98" name="Freeform 97"/>
+            <a:endParaRPr lang="en-GB" sz="1100" noProof="1"/>
+          </a:p>
+        </p:txBody>
+      </p:sp>
+      <p:sp>
+        <p:nvSpPr>
+          <p:cNvPr id="81" name="Isosceles Triangle 80"/>
           <p:cNvSpPr/>
           <p:nvPr/>
         </p:nvSpPr>
         <p:spPr>
           <a:xfrm>
-            <a:off x="2571736" y="2678249"/>
-            <a:ext cx="433617" cy="393561"/>
-          </a:xfrm>
-          <a:custGeom>
-            <a:avLst/>
-            <a:gdLst>
-              <a:gd name="connsiteX0" fmla="*/ 294752 w 602901"/>
-              <a:gd name="connsiteY0" fmla="*/ 0 h 393561"/>
-              <a:gd name="connsiteX1" fmla="*/ 566057 w 602901"/>
-              <a:gd name="connsiteY1" fmla="*/ 231112 h 393561"/>
-              <a:gd name="connsiteX2" fmla="*/ 73688 w 602901"/>
-              <a:gd name="connsiteY2" fmla="*/ 361741 h 393561"/>
-              <a:gd name="connsiteX3" fmla="*/ 123930 w 602901"/>
-              <a:gd name="connsiteY3" fmla="*/ 40194 h 393561"/>
-            </a:gdLst>
-            <a:ahLst/>
-            <a:cxnLst>
-              <a:cxn ang="0">
-                <a:pos x="connsiteX0" y="connsiteY0"/>
-              </a:cxn>
-              <a:cxn ang="0">
-                <a:pos x="connsiteX1" y="connsiteY1"/>
-              </a:cxn>
-              <a:cxn ang="0">
-                <a:pos x="connsiteX2" y="connsiteY2"/>
-              </a:cxn>
-              <a:cxn ang="0">
-                <a:pos x="connsiteX3" y="connsiteY3"/>
-              </a:cxn>
-            </a:cxnLst>
-            <a:rect l="l" t="t" r="r" b="b"/>
-            <a:pathLst>
-              <a:path w="602901" h="393561">
-                <a:moveTo>
-                  <a:pt x="294752" y="0"/>
-                </a:moveTo>
-                <a:cubicBezTo>
-                  <a:pt x="448826" y="85411"/>
-                  <a:pt x="602901" y="170822"/>
-                  <a:pt x="566057" y="231112"/>
-                </a:cubicBezTo>
-                <a:cubicBezTo>
-                  <a:pt x="529213" y="291402"/>
-                  <a:pt x="147376" y="393561"/>
-                  <a:pt x="73688" y="361741"/>
-                </a:cubicBezTo>
-                <a:cubicBezTo>
-                  <a:pt x="0" y="329921"/>
-                  <a:pt x="123930" y="40194"/>
-                  <a:pt x="123930" y="40194"/>
-                </a:cubicBezTo>
-              </a:path>
-            </a:pathLst>
-          </a:custGeom>
+            <a:off x="5857884" y="4500570"/>
+            <a:ext cx="214314" cy="142876"/>
+          </a:xfrm>
+          <a:prstGeom prst="triangle">
+            <a:avLst/>
+          </a:prstGeom>
+          <a:solidFill>
+            <a:schemeClr val="bg1"/>
+          </a:solidFill>
+          <a:ln w="12700">
+            <a:solidFill>
+              <a:schemeClr val="tx1"/>
+            </a:solidFill>
+          </a:ln>
+        </p:spPr>
+        <p:style>
+          <a:lnRef idx="2">
+            <a:schemeClr val="accent1">
+              <a:shade val="50000"/>
+            </a:schemeClr>
+          </a:lnRef>
+          <a:fillRef idx="1">
+            <a:schemeClr val="accent1"/>
+          </a:fillRef>
+          <a:effectRef idx="0">
+            <a:schemeClr val="accent1"/>
+          </a:effectRef>
+          <a:fontRef idx="minor">
+            <a:schemeClr val="lt1"/>
+          </a:fontRef>
+        </p:style>
+        <p:txBody>
+          <a:bodyPr rtlCol="0" anchor="ctr"/>
+          <a:lstStyle/>
+          <a:p>
+            <a:pPr algn="ctr"/>
+            <a:endParaRPr lang="en-GB" noProof="1"/>
+          </a:p>
+        </p:txBody>
+      </p:sp>
+      <p:cxnSp>
+        <p:nvCxnSpPr>
+          <p:cNvPr id="82" name="Elbow Connector 42"/>
+          <p:cNvCxnSpPr>
+            <a:stCxn id="175" idx="1"/>
+            <a:endCxn id="81" idx="3"/>
+          </p:cNvCxnSpPr>
+          <p:nvPr/>
+        </p:nvCxnSpPr>
+        <p:spPr>
+          <a:xfrm rot="10800000">
+            <a:off x="5965042" y="4643446"/>
+            <a:ext cx="178595" cy="142200"/>
+          </a:xfrm>
+          <a:prstGeom prst="bentConnector2">
+            <a:avLst/>
+          </a:prstGeom>
           <a:ln>
             <a:solidFill>
               <a:schemeClr val="tx1"/>
             </a:solidFill>
-            <a:headEnd type="none" w="med" len="med"/>
-            <a:tailEnd type="triangle" w="med" len="med"/>
+            <a:tailEnd type="none"/>
           </a:ln>
         </p:spPr>
         <p:style>
@@ -3274,25 +3100,202 @@
             <a:schemeClr val="tx1"/>
           </a:fontRef>
         </p:style>
-        <p:txBody>
-          <a:bodyPr rtlCol="0" anchor="ctr"/>
+      </p:cxnSp>
+      <p:sp>
+        <p:nvSpPr>
+          <p:cNvPr id="85" name="CustomShape 1"/>
+          <p:cNvSpPr/>
+          <p:nvPr/>
+        </p:nvSpPr>
+        <p:spPr>
+          <a:xfrm>
+            <a:off x="6143636" y="5000636"/>
+            <a:ext cx="1285884" cy="284400"/>
+          </a:xfrm>
+          <a:prstGeom prst="rect">
+            <a:avLst/>
+          </a:prstGeom>
+          <a:solidFill>
+            <a:srgbClr val="FFFFFF"/>
+          </a:solidFill>
+          <a:ln w="12600">
+            <a:solidFill>
+              <a:srgbClr val="000000"/>
+            </a:solidFill>
+            <a:round/>
+          </a:ln>
+          <a:effectLst>
+            <a:outerShdw blurRad="50800" dist="38100" dir="2700000" algn="tl" rotWithShape="0">
+              <a:prstClr val="black">
+                <a:alpha val="40000"/>
+              </a:prstClr>
+            </a:outerShdw>
+          </a:effectLst>
+        </p:spPr>
+        <p:txBody>
+          <a:bodyPr lIns="90000" tIns="45000" rIns="90000" bIns="45000" anchor="ctr"/>
           <a:lstStyle/>
           <a:p>
             <a:pPr algn="ctr"/>
-            <a:endParaRPr lang="en-GB"/>
-          </a:p>
-        </p:txBody>
-      </p:sp>
-      <p:sp>
-        <p:nvSpPr>
-          <p:cNvPr id="99" name="TextBox 98"/>
+            <a:r>
+              <a:rPr lang="en-GB" sz="1400" noProof="1" smtClean="0">
+                <a:solidFill>
+                  <a:schemeClr val="bg1">
+                    <a:lumMod val="65000"/>
+                  </a:schemeClr>
+                </a:solidFill>
+                <a:latin typeface="Calibri"/>
+              </a:rPr>
+              <a:t>skos:Collection</a:t>
+            </a:r>
+            <a:endParaRPr lang="en-GB" sz="1600" noProof="1">
+              <a:solidFill>
+                <a:schemeClr val="bg1">
+                  <a:lumMod val="65000"/>
+                </a:schemeClr>
+              </a:solidFill>
+            </a:endParaRPr>
+          </a:p>
+        </p:txBody>
+      </p:sp>
+      <p:cxnSp>
+        <p:nvCxnSpPr>
+          <p:cNvPr id="86" name="Elbow Connector 42"/>
+          <p:cNvCxnSpPr>
+            <a:stCxn id="85" idx="1"/>
+            <a:endCxn id="81" idx="3"/>
+          </p:cNvCxnSpPr>
+          <p:nvPr/>
+        </p:nvCxnSpPr>
+        <p:spPr>
+          <a:xfrm rot="10800000">
+            <a:off x="5965042" y="4643446"/>
+            <a:ext cx="178595" cy="499390"/>
+          </a:xfrm>
+          <a:prstGeom prst="bentConnector2">
+            <a:avLst/>
+          </a:prstGeom>
+          <a:ln>
+            <a:solidFill>
+              <a:schemeClr val="tx1"/>
+            </a:solidFill>
+            <a:tailEnd type="none"/>
+          </a:ln>
+        </p:spPr>
+        <p:style>
+          <a:lnRef idx="1">
+            <a:schemeClr val="accent1"/>
+          </a:lnRef>
+          <a:fillRef idx="0">
+            <a:schemeClr val="accent1"/>
+          </a:fillRef>
+          <a:effectRef idx="0">
+            <a:schemeClr val="accent1"/>
+          </a:effectRef>
+          <a:fontRef idx="minor">
+            <a:schemeClr val="tx1"/>
+          </a:fontRef>
+        </p:style>
+      </p:cxnSp>
+      <p:sp>
+        <p:nvSpPr>
+          <p:cNvPr id="89" name="CustomShape 1"/>
+          <p:cNvSpPr/>
+          <p:nvPr/>
+        </p:nvSpPr>
+        <p:spPr>
+          <a:xfrm>
+            <a:off x="6143636" y="5357826"/>
+            <a:ext cx="2143140" cy="284400"/>
+          </a:xfrm>
+          <a:prstGeom prst="rect">
+            <a:avLst/>
+          </a:prstGeom>
+          <a:solidFill>
+            <a:srgbClr val="FFFFFF"/>
+          </a:solidFill>
+          <a:ln w="12600">
+            <a:solidFill>
+              <a:srgbClr val="000000"/>
+            </a:solidFill>
+            <a:prstDash val="solid"/>
+            <a:round/>
+          </a:ln>
+          <a:effectLst>
+            <a:outerShdw blurRad="50800" dist="38100" dir="2700000" algn="tl" rotWithShape="0">
+              <a:prstClr val="black">
+                <a:alpha val="40000"/>
+              </a:prstClr>
+            </a:outerShdw>
+          </a:effectLst>
+        </p:spPr>
+        <p:txBody>
+          <a:bodyPr lIns="90000" tIns="45000" rIns="90000" bIns="45000" anchor="ctr"/>
+          <a:lstStyle/>
+          <a:p>
+            <a:pPr algn="ctr"/>
+            <a:r>
+              <a:rPr lang="en-GB" sz="1400" noProof="1" smtClean="0">
+                <a:solidFill>
+                  <a:srgbClr val="000000"/>
+                </a:solidFill>
+                <a:latin typeface="Calibri"/>
+              </a:rPr>
+              <a:t>qb:HierarchicalCodeList</a:t>
+            </a:r>
+            <a:endParaRPr lang="en-GB" sz="1600" noProof="1"/>
+          </a:p>
+        </p:txBody>
+      </p:sp>
+      <p:cxnSp>
+        <p:nvCxnSpPr>
+          <p:cNvPr id="94" name="Elbow Connector 42"/>
+          <p:cNvCxnSpPr>
+            <a:stCxn id="89" idx="1"/>
+            <a:endCxn id="81" idx="3"/>
+          </p:cNvCxnSpPr>
+          <p:nvPr/>
+        </p:nvCxnSpPr>
+        <p:spPr>
+          <a:xfrm rot="10800000">
+            <a:off x="5965042" y="4643446"/>
+            <a:ext cx="178595" cy="856580"/>
+          </a:xfrm>
+          <a:prstGeom prst="bentConnector2">
+            <a:avLst/>
+          </a:prstGeom>
+          <a:ln>
+            <a:solidFill>
+              <a:schemeClr val="tx1"/>
+            </a:solidFill>
+            <a:tailEnd type="none"/>
+          </a:ln>
+        </p:spPr>
+        <p:style>
+          <a:lnRef idx="1">
+            <a:schemeClr val="accent1"/>
+          </a:lnRef>
+          <a:fillRef idx="0">
+            <a:schemeClr val="accent1"/>
+          </a:fillRef>
+          <a:effectRef idx="0">
+            <a:schemeClr val="accent1"/>
+          </a:effectRef>
+          <a:fontRef idx="minor">
+            <a:schemeClr val="tx1"/>
+          </a:fontRef>
+        </p:style>
+      </p:cxnSp>
+      <p:sp>
+        <p:nvSpPr>
+          <p:cNvPr id="100" name="TextBox 99"/>
           <p:cNvSpPr txBox="1"/>
           <p:nvPr/>
         </p:nvSpPr>
         <p:spPr>
           <a:xfrm>
-            <a:off x="2724136" y="2810200"/>
-            <a:ext cx="915635" cy="261610"/>
+            <a:off x="7528164" y="5786454"/>
+            <a:ext cx="1258678" cy="400110"/>
           </a:xfrm>
           <a:prstGeom prst="rect">
             <a:avLst/>
@@ -3308,10 +3311,489 @@
           <a:lstStyle/>
           <a:p>
             <a:r>
-              <a:rPr lang="en-GB" sz="1100" dirty="0" err="1" smtClean="0"/>
-              <a:t>qb:subSlice</a:t>
-            </a:r>
-            <a:endParaRPr lang="en-GB" sz="1100" dirty="0"/>
+              <a:rPr lang="en-GB" sz="1000" noProof="1" smtClean="0"/>
+              <a:t>qb:hierarchyRoot</a:t>
+            </a:r>
+          </a:p>
+          <a:p>
+            <a:r>
+              <a:rPr lang="en-GB" sz="1000" noProof="1" smtClean="0"/>
+              <a:t>qb:parentChildProperty</a:t>
+            </a:r>
+          </a:p>
+        </p:txBody>
+      </p:sp>
+      <p:cxnSp>
+        <p:nvCxnSpPr>
+          <p:cNvPr id="103" name="Elbow Connector 102"/>
+          <p:cNvCxnSpPr>
+            <a:stCxn id="89" idx="2"/>
+            <a:endCxn id="100" idx="1"/>
+          </p:cNvCxnSpPr>
+          <p:nvPr/>
+        </p:nvCxnSpPr>
+        <p:spPr>
+          <a:xfrm rot="16200000" flipH="1">
+            <a:off x="7199544" y="5657888"/>
+            <a:ext cx="344283" cy="312958"/>
+          </a:xfrm>
+          <a:prstGeom prst="bentConnector2">
+            <a:avLst/>
+          </a:prstGeom>
+          <a:ln>
+            <a:solidFill>
+              <a:schemeClr val="tx1"/>
+            </a:solidFill>
+            <a:headEnd type="none" w="med" len="med"/>
+            <a:tailEnd type="none" w="med" len="med"/>
+          </a:ln>
+        </p:spPr>
+        <p:style>
+          <a:lnRef idx="1">
+            <a:schemeClr val="accent1"/>
+          </a:lnRef>
+          <a:fillRef idx="0">
+            <a:schemeClr val="accent1"/>
+          </a:fillRef>
+          <a:effectRef idx="0">
+            <a:schemeClr val="accent1"/>
+          </a:effectRef>
+          <a:fontRef idx="minor">
+            <a:schemeClr val="tx1"/>
+          </a:fontRef>
+        </p:style>
+      </p:cxnSp>
+      <p:sp>
+        <p:nvSpPr>
+          <p:cNvPr id="78" name="TextBox 77"/>
+          <p:cNvSpPr txBox="1"/>
+          <p:nvPr/>
+        </p:nvSpPr>
+        <p:spPr>
+          <a:xfrm>
+            <a:off x="5572132" y="4214818"/>
+            <a:ext cx="857927" cy="261610"/>
+          </a:xfrm>
+          <a:prstGeom prst="rect">
+            <a:avLst/>
+          </a:prstGeom>
+          <a:solidFill>
+            <a:schemeClr val="bg1"/>
+          </a:solidFill>
+        </p:spPr>
+        <p:txBody>
+          <a:bodyPr wrap="none" rtlCol="0">
+            <a:spAutoFit/>
+          </a:bodyPr>
+          <a:lstStyle/>
+          <a:p>
+            <a:r>
+              <a:rPr lang="en-GB" sz="1100" noProof="1" smtClean="0"/>
+              <a:t>&lt;&lt;union&gt;&gt;</a:t>
+            </a:r>
+            <a:endParaRPr lang="en-GB" sz="1100" noProof="1"/>
+          </a:p>
+        </p:txBody>
+      </p:sp>
+      <p:sp>
+        <p:nvSpPr>
+          <p:cNvPr id="79" name="CustomShape 2"/>
+          <p:cNvSpPr/>
+          <p:nvPr/>
+        </p:nvSpPr>
+        <p:spPr>
+          <a:xfrm>
+            <a:off x="142844" y="4071942"/>
+            <a:ext cx="1857388" cy="284400"/>
+          </a:xfrm>
+          <a:prstGeom prst="rect">
+            <a:avLst/>
+          </a:prstGeom>
+          <a:solidFill>
+            <a:srgbClr val="FFFFFF"/>
+          </a:solidFill>
+          <a:ln w="12600">
+            <a:solidFill>
+              <a:srgbClr val="000000"/>
+            </a:solidFill>
+            <a:round/>
+          </a:ln>
+          <a:effectLst>
+            <a:outerShdw blurRad="50800" dist="38100" dir="2700000" algn="tl" rotWithShape="0">
+              <a:prstClr val="black">
+                <a:alpha val="40000"/>
+              </a:prstClr>
+            </a:outerShdw>
+          </a:effectLst>
+        </p:spPr>
+        <p:txBody>
+          <a:bodyPr lIns="90000" tIns="45000" rIns="90000" bIns="45000" anchor="ctr"/>
+          <a:lstStyle/>
+          <a:p>
+            <a:pPr algn="ctr"/>
+            <a:r>
+              <a:rPr lang="en-GB" sz="1400" noProof="1" smtClean="0">
+                <a:solidFill>
+                  <a:srgbClr val="000000"/>
+                </a:solidFill>
+                <a:latin typeface="Calibri"/>
+              </a:rPr>
+              <a:t>qb:ObservationGroup</a:t>
+            </a:r>
+            <a:endParaRPr lang="en-GB" sz="1600" noProof="1"/>
+          </a:p>
+        </p:txBody>
+      </p:sp>
+      <p:cxnSp>
+        <p:nvCxnSpPr>
+          <p:cNvPr id="83" name="Elbow Connector 22"/>
+          <p:cNvCxnSpPr>
+            <a:stCxn id="79" idx="3"/>
+            <a:endCxn id="99" idx="6"/>
+          </p:cNvCxnSpPr>
+          <p:nvPr/>
+        </p:nvCxnSpPr>
+        <p:spPr>
+          <a:xfrm flipH="1" flipV="1">
+            <a:off x="1528474" y="3560232"/>
+            <a:ext cx="471758" cy="653910"/>
+          </a:xfrm>
+          <a:prstGeom prst="bentConnector3">
+            <a:avLst>
+              <a:gd name="adj1" fmla="val -48457"/>
+            </a:avLst>
+          </a:prstGeom>
+          <a:ln>
+            <a:solidFill>
+              <a:schemeClr val="tx1"/>
+            </a:solidFill>
+            <a:tailEnd type="triangle"/>
+          </a:ln>
+        </p:spPr>
+        <p:style>
+          <a:lnRef idx="1">
+            <a:schemeClr val="accent1"/>
+          </a:lnRef>
+          <a:fillRef idx="0">
+            <a:schemeClr val="accent1"/>
+          </a:fillRef>
+          <a:effectRef idx="0">
+            <a:schemeClr val="accent1"/>
+          </a:effectRef>
+          <a:fontRef idx="minor">
+            <a:schemeClr val="tx1"/>
+          </a:fontRef>
+        </p:style>
+      </p:cxnSp>
+      <p:sp>
+        <p:nvSpPr>
+          <p:cNvPr id="88" name="TextBox 87"/>
+          <p:cNvSpPr txBox="1"/>
+          <p:nvPr/>
+        </p:nvSpPr>
+        <p:spPr>
+          <a:xfrm>
+            <a:off x="1643042" y="3643314"/>
+            <a:ext cx="1109599" cy="261610"/>
+          </a:xfrm>
+          <a:prstGeom prst="rect">
+            <a:avLst/>
+          </a:prstGeom>
+          <a:solidFill>
+            <a:schemeClr val="bg1"/>
+          </a:solidFill>
+        </p:spPr>
+        <p:txBody>
+          <a:bodyPr wrap="none" rtlCol="0">
+            <a:spAutoFit/>
+          </a:bodyPr>
+          <a:lstStyle/>
+          <a:p>
+            <a:r>
+              <a:rPr lang="en-GB" sz="1100" noProof="1" smtClean="0"/>
+              <a:t>qb:observation</a:t>
+            </a:r>
+            <a:endParaRPr lang="en-GB" sz="1100" noProof="1"/>
+          </a:p>
+        </p:txBody>
+      </p:sp>
+      <p:sp>
+        <p:nvSpPr>
+          <p:cNvPr id="76" name="Isosceles Triangle 75"/>
+          <p:cNvSpPr/>
+          <p:nvPr/>
+        </p:nvSpPr>
+        <p:spPr>
+          <a:xfrm>
+            <a:off x="928662" y="4357694"/>
+            <a:ext cx="214314" cy="142876"/>
+          </a:xfrm>
+          <a:prstGeom prst="triangle">
+            <a:avLst/>
+          </a:prstGeom>
+          <a:solidFill>
+            <a:schemeClr val="bg1"/>
+          </a:solidFill>
+          <a:ln w="12700">
+            <a:solidFill>
+              <a:schemeClr val="tx1"/>
+            </a:solidFill>
+          </a:ln>
+        </p:spPr>
+        <p:style>
+          <a:lnRef idx="2">
+            <a:schemeClr val="accent1">
+              <a:shade val="50000"/>
+            </a:schemeClr>
+          </a:lnRef>
+          <a:fillRef idx="1">
+            <a:schemeClr val="accent1"/>
+          </a:fillRef>
+          <a:effectRef idx="0">
+            <a:schemeClr val="accent1"/>
+          </a:effectRef>
+          <a:fontRef idx="minor">
+            <a:schemeClr val="lt1"/>
+          </a:fontRef>
+        </p:style>
+        <p:txBody>
+          <a:bodyPr rtlCol="0" anchor="ctr"/>
+          <a:lstStyle/>
+          <a:p>
+            <a:pPr algn="ctr"/>
+            <a:endParaRPr lang="en-GB" noProof="1">
+              <a:solidFill>
+                <a:schemeClr val="bg1">
+                  <a:lumMod val="65000"/>
+                </a:schemeClr>
+              </a:solidFill>
+            </a:endParaRPr>
+          </a:p>
+        </p:txBody>
+      </p:sp>
+      <p:cxnSp>
+        <p:nvCxnSpPr>
+          <p:cNvPr id="84" name="Elbow Connector 42"/>
+          <p:cNvCxnSpPr>
+            <a:stCxn id="95" idx="6"/>
+            <a:endCxn id="76" idx="3"/>
+          </p:cNvCxnSpPr>
+          <p:nvPr/>
+        </p:nvCxnSpPr>
+        <p:spPr>
+          <a:xfrm flipH="1">
+            <a:off x="1035819" y="2344254"/>
+            <a:ext cx="1496274" cy="2156316"/>
+          </a:xfrm>
+          <a:prstGeom prst="bentConnector4">
+            <a:avLst>
+              <a:gd name="adj1" fmla="val -15278"/>
+              <a:gd name="adj2" fmla="val 110601"/>
+            </a:avLst>
+          </a:prstGeom>
+          <a:ln>
+            <a:solidFill>
+              <a:schemeClr val="tx1"/>
+            </a:solidFill>
+            <a:tailEnd type="none"/>
+          </a:ln>
+        </p:spPr>
+        <p:style>
+          <a:lnRef idx="1">
+            <a:schemeClr val="accent1"/>
+          </a:lnRef>
+          <a:fillRef idx="0">
+            <a:schemeClr val="accent1"/>
+          </a:fillRef>
+          <a:effectRef idx="0">
+            <a:schemeClr val="accent1"/>
+          </a:effectRef>
+          <a:fontRef idx="minor">
+            <a:schemeClr val="tx1"/>
+          </a:fontRef>
+        </p:style>
+      </p:cxnSp>
+      <p:sp>
+        <p:nvSpPr>
+          <p:cNvPr id="93" name="Oval 92"/>
+          <p:cNvSpPr/>
+          <p:nvPr/>
+        </p:nvSpPr>
+        <p:spPr>
+          <a:xfrm>
+            <a:off x="2471990" y="2168994"/>
+            <a:ext cx="45719" cy="45719"/>
+          </a:xfrm>
+          <a:prstGeom prst="ellipse">
+            <a:avLst/>
+          </a:prstGeom>
+          <a:solidFill>
+            <a:schemeClr val="bg1"/>
+          </a:solidFill>
+          <a:ln>
+            <a:noFill/>
+          </a:ln>
+        </p:spPr>
+        <p:style>
+          <a:lnRef idx="2">
+            <a:schemeClr val="accent1">
+              <a:shade val="50000"/>
+            </a:schemeClr>
+          </a:lnRef>
+          <a:fillRef idx="1">
+            <a:schemeClr val="accent1"/>
+          </a:fillRef>
+          <a:effectRef idx="0">
+            <a:schemeClr val="accent1"/>
+          </a:effectRef>
+          <a:fontRef idx="minor">
+            <a:schemeClr val="lt1"/>
+          </a:fontRef>
+        </p:style>
+        <p:txBody>
+          <a:bodyPr rtlCol="0" anchor="ctr"/>
+          <a:lstStyle/>
+          <a:p>
+            <a:pPr algn="ctr"/>
+            <a:endParaRPr lang="en-GB"/>
+          </a:p>
+        </p:txBody>
+      </p:sp>
+      <p:sp>
+        <p:nvSpPr>
+          <p:cNvPr id="95" name="Oval 94"/>
+          <p:cNvSpPr/>
+          <p:nvPr/>
+        </p:nvSpPr>
+        <p:spPr>
+          <a:xfrm>
+            <a:off x="2486374" y="2321394"/>
+            <a:ext cx="45719" cy="45719"/>
+          </a:xfrm>
+          <a:prstGeom prst="ellipse">
+            <a:avLst/>
+          </a:prstGeom>
+          <a:solidFill>
+            <a:schemeClr val="bg1"/>
+          </a:solidFill>
+          <a:ln>
+            <a:noFill/>
+          </a:ln>
+        </p:spPr>
+        <p:style>
+          <a:lnRef idx="2">
+            <a:schemeClr val="accent1">
+              <a:shade val="50000"/>
+            </a:schemeClr>
+          </a:lnRef>
+          <a:fillRef idx="1">
+            <a:schemeClr val="accent1"/>
+          </a:fillRef>
+          <a:effectRef idx="0">
+            <a:schemeClr val="accent1"/>
+          </a:effectRef>
+          <a:fontRef idx="minor">
+            <a:schemeClr val="lt1"/>
+          </a:fontRef>
+        </p:style>
+        <p:txBody>
+          <a:bodyPr rtlCol="0" anchor="ctr"/>
+          <a:lstStyle/>
+          <a:p>
+            <a:pPr algn="ctr"/>
+            <a:endParaRPr lang="en-GB"/>
+          </a:p>
+        </p:txBody>
+      </p:sp>
+      <p:sp>
+        <p:nvSpPr>
+          <p:cNvPr id="98" name="Oval 97"/>
+          <p:cNvSpPr/>
+          <p:nvPr/>
+        </p:nvSpPr>
+        <p:spPr>
+          <a:xfrm>
+            <a:off x="1482755" y="3407982"/>
+            <a:ext cx="45719" cy="45719"/>
+          </a:xfrm>
+          <a:prstGeom prst="ellipse">
+            <a:avLst/>
+          </a:prstGeom>
+          <a:solidFill>
+            <a:schemeClr val="bg1"/>
+          </a:solidFill>
+          <a:ln>
+            <a:noFill/>
+          </a:ln>
+        </p:spPr>
+        <p:style>
+          <a:lnRef idx="2">
+            <a:schemeClr val="accent1">
+              <a:shade val="50000"/>
+            </a:schemeClr>
+          </a:lnRef>
+          <a:fillRef idx="1">
+            <a:schemeClr val="accent1"/>
+          </a:fillRef>
+          <a:effectRef idx="0">
+            <a:schemeClr val="accent1"/>
+          </a:effectRef>
+          <a:fontRef idx="minor">
+            <a:schemeClr val="lt1"/>
+          </a:fontRef>
+        </p:style>
+        <p:txBody>
+          <a:bodyPr rtlCol="0" anchor="ctr"/>
+          <a:lstStyle/>
+          <a:p>
+            <a:pPr algn="ctr"/>
+            <a:endParaRPr lang="en-GB"/>
+          </a:p>
+        </p:txBody>
+      </p:sp>
+      <p:sp>
+        <p:nvSpPr>
+          <p:cNvPr id="99" name="Oval 98"/>
+          <p:cNvSpPr/>
+          <p:nvPr/>
+        </p:nvSpPr>
+        <p:spPr>
+          <a:xfrm>
+            <a:off x="1482755" y="3537372"/>
+            <a:ext cx="45719" cy="45719"/>
+          </a:xfrm>
+          <a:prstGeom prst="ellipse">
+            <a:avLst/>
+          </a:prstGeom>
+          <a:solidFill>
+            <a:schemeClr val="bg1"/>
+          </a:solidFill>
+          <a:ln>
+            <a:noFill/>
+          </a:ln>
+        </p:spPr>
+        <p:style>
+          <a:lnRef idx="2">
+            <a:schemeClr val="accent1">
+              <a:shade val="50000"/>
+            </a:schemeClr>
+          </a:lnRef>
+          <a:fillRef idx="1">
+            <a:schemeClr val="accent1"/>
+          </a:fillRef>
+          <a:effectRef idx="0">
+            <a:schemeClr val="accent1"/>
+          </a:effectRef>
+          <a:fontRef idx="minor">
+            <a:schemeClr val="lt1"/>
+          </a:fontRef>
+        </p:style>
+        <p:txBody>
+          <a:bodyPr rtlCol="0" anchor="ctr"/>
+          <a:lstStyle/>
+          <a:p>
+            <a:pPr algn="ctr"/>
+            <a:endParaRPr lang="en-GB"/>
           </a:p>
         </p:txBody>
       </p:sp>

</xml_diff>